<commit_message>
made the 2D 20ahead file clusterready
</commit_message>
<xml_diff>
--- a/latex/figures/Figure_sliding_window.pptx
+++ b/latex/figures/Figure_sliding_window.pptx
@@ -7,6 +7,7 @@
   <p:sldIdLst>
     <p:sldId id="257" r:id="rId2"/>
     <p:sldId id="258" r:id="rId3"/>
+    <p:sldId id="259" r:id="rId4"/>
   </p:sldIdLst>
   <p:sldSz cx="12192000" cy="6858000"/>
   <p:notesSz cx="6858000" cy="9144000"/>
@@ -107,18 +108,7 @@
   </p:defaultTextStyle>
   <p:extLst>
     <p:ext uri="{EFAFB233-063F-42B5-8137-9DF3F51BA10A}">
-      <p15:sldGuideLst xmlns:p15="http://schemas.microsoft.com/office/powerpoint/2012/main">
-        <p15:guide id="1" orient="horz" pos="2160" userDrawn="1">
-          <p15:clr>
-            <a:srgbClr val="A4A3A4"/>
-          </p15:clr>
-        </p15:guide>
-        <p15:guide id="2" pos="3840" userDrawn="1">
-          <p15:clr>
-            <a:srgbClr val="A4A3A4"/>
-          </p15:clr>
-        </p15:guide>
-      </p15:sldGuideLst>
+      <p15:sldGuideLst xmlns:p15="http://schemas.microsoft.com/office/powerpoint/2012/main"/>
     </p:ext>
   </p:extLst>
 </p:presentation>
@@ -285,7 +275,7 @@
           <a:p>
             <a:fld id="{FE8B34FF-EFE3-4FA3-92AF-5A48E8DC23C8}" type="datetimeFigureOut">
               <a:rPr lang="en-GB" smtClean="0"/>
-              <a:t>15/02/2021</a:t>
+              <a:t>17/05/2021</a:t>
             </a:fld>
             <a:endParaRPr lang="en-GB"/>
           </a:p>
@@ -485,7 +475,7 @@
           <a:p>
             <a:fld id="{FE8B34FF-EFE3-4FA3-92AF-5A48E8DC23C8}" type="datetimeFigureOut">
               <a:rPr lang="en-GB" smtClean="0"/>
-              <a:t>15/02/2021</a:t>
+              <a:t>17/05/2021</a:t>
             </a:fld>
             <a:endParaRPr lang="en-GB"/>
           </a:p>
@@ -695,7 +685,7 @@
           <a:p>
             <a:fld id="{FE8B34FF-EFE3-4FA3-92AF-5A48E8DC23C8}" type="datetimeFigureOut">
               <a:rPr lang="en-GB" smtClean="0"/>
-              <a:t>15/02/2021</a:t>
+              <a:t>17/05/2021</a:t>
             </a:fld>
             <a:endParaRPr lang="en-GB"/>
           </a:p>
@@ -895,7 +885,7 @@
           <a:p>
             <a:fld id="{FE8B34FF-EFE3-4FA3-92AF-5A48E8DC23C8}" type="datetimeFigureOut">
               <a:rPr lang="en-GB" smtClean="0"/>
-              <a:t>15/02/2021</a:t>
+              <a:t>17/05/2021</a:t>
             </a:fld>
             <a:endParaRPr lang="en-GB"/>
           </a:p>
@@ -1171,7 +1161,7 @@
           <a:p>
             <a:fld id="{FE8B34FF-EFE3-4FA3-92AF-5A48E8DC23C8}" type="datetimeFigureOut">
               <a:rPr lang="en-GB" smtClean="0"/>
-              <a:t>15/02/2021</a:t>
+              <a:t>17/05/2021</a:t>
             </a:fld>
             <a:endParaRPr lang="en-GB"/>
           </a:p>
@@ -1439,7 +1429,7 @@
           <a:p>
             <a:fld id="{FE8B34FF-EFE3-4FA3-92AF-5A48E8DC23C8}" type="datetimeFigureOut">
               <a:rPr lang="en-GB" smtClean="0"/>
-              <a:t>15/02/2021</a:t>
+              <a:t>17/05/2021</a:t>
             </a:fld>
             <a:endParaRPr lang="en-GB"/>
           </a:p>
@@ -1854,7 +1844,7 @@
           <a:p>
             <a:fld id="{FE8B34FF-EFE3-4FA3-92AF-5A48E8DC23C8}" type="datetimeFigureOut">
               <a:rPr lang="en-GB" smtClean="0"/>
-              <a:t>15/02/2021</a:t>
+              <a:t>17/05/2021</a:t>
             </a:fld>
             <a:endParaRPr lang="en-GB"/>
           </a:p>
@@ -1996,7 +1986,7 @@
           <a:p>
             <a:fld id="{FE8B34FF-EFE3-4FA3-92AF-5A48E8DC23C8}" type="datetimeFigureOut">
               <a:rPr lang="en-GB" smtClean="0"/>
-              <a:t>15/02/2021</a:t>
+              <a:t>17/05/2021</a:t>
             </a:fld>
             <a:endParaRPr lang="en-GB"/>
           </a:p>
@@ -2109,7 +2099,7 @@
           <a:p>
             <a:fld id="{FE8B34FF-EFE3-4FA3-92AF-5A48E8DC23C8}" type="datetimeFigureOut">
               <a:rPr lang="en-GB" smtClean="0"/>
-              <a:t>15/02/2021</a:t>
+              <a:t>17/05/2021</a:t>
             </a:fld>
             <a:endParaRPr lang="en-GB"/>
           </a:p>
@@ -2422,7 +2412,7 @@
           <a:p>
             <a:fld id="{FE8B34FF-EFE3-4FA3-92AF-5A48E8DC23C8}" type="datetimeFigureOut">
               <a:rPr lang="en-GB" smtClean="0"/>
-              <a:t>15/02/2021</a:t>
+              <a:t>17/05/2021</a:t>
             </a:fld>
             <a:endParaRPr lang="en-GB"/>
           </a:p>
@@ -2711,7 +2701,7 @@
           <a:p>
             <a:fld id="{FE8B34FF-EFE3-4FA3-92AF-5A48E8DC23C8}" type="datetimeFigureOut">
               <a:rPr lang="en-GB" smtClean="0"/>
-              <a:t>15/02/2021</a:t>
+              <a:t>17/05/2021</a:t>
             </a:fld>
             <a:endParaRPr lang="en-GB"/>
           </a:p>
@@ -2954,7 +2944,7 @@
           <a:p>
             <a:fld id="{FE8B34FF-EFE3-4FA3-92AF-5A48E8DC23C8}" type="datetimeFigureOut">
               <a:rPr lang="en-GB" smtClean="0"/>
-              <a:t>15/02/2021</a:t>
+              <a:t>17/05/2021</a:t>
             </a:fld>
             <a:endParaRPr lang="en-GB"/>
           </a:p>
@@ -11910,6 +11900,2700 @@
     <p:extLst>
       <p:ext uri="{BB962C8B-B14F-4D97-AF65-F5344CB8AC3E}">
         <p14:creationId xmlns:p14="http://schemas.microsoft.com/office/powerpoint/2010/main" val="1992677142"/>
+      </p:ext>
+    </p:extLst>
+  </p:cSld>
+  <p:clrMapOvr>
+    <a:masterClrMapping/>
+  </p:clrMapOvr>
+</p:sld>
+</file>
+
+<file path=ppt/slides/slide3.xml><?xml version="1.0" encoding="utf-8"?>
+<p:sld xmlns:a="http://schemas.openxmlformats.org/drawingml/2006/main" xmlns:r="http://schemas.openxmlformats.org/officeDocument/2006/relationships" xmlns:p="http://schemas.openxmlformats.org/presentationml/2006/main">
+  <p:cSld>
+    <p:bg>
+      <p:bgPr>
+        <a:solidFill>
+          <a:schemeClr val="bg1"/>
+        </a:solidFill>
+        <a:effectLst/>
+      </p:bgPr>
+    </p:bg>
+    <p:spTree>
+      <p:nvGrpSpPr>
+        <p:cNvPr id="1" name=""/>
+        <p:cNvGrpSpPr/>
+        <p:nvPr/>
+      </p:nvGrpSpPr>
+      <p:grpSpPr>
+        <a:xfrm>
+          <a:off x="0" y="0"/>
+          <a:ext cx="0" cy="0"/>
+          <a:chOff x="0" y="0"/>
+          <a:chExt cx="0" cy="0"/>
+        </a:xfrm>
+      </p:grpSpPr>
+      <p:graphicFrame>
+        <p:nvGraphicFramePr>
+          <p:cNvPr id="2" name="Table 2">
+            <a:extLst>
+              <a:ext uri="{FF2B5EF4-FFF2-40B4-BE49-F238E27FC236}">
+                <a16:creationId xmlns:a16="http://schemas.microsoft.com/office/drawing/2014/main" id="{D3864694-339D-4312-9877-8393DF2AA470}"/>
+              </a:ext>
+            </a:extLst>
+          </p:cNvPr>
+          <p:cNvGraphicFramePr>
+            <a:graphicFrameLocks noGrp="1"/>
+          </p:cNvGraphicFramePr>
+          <p:nvPr>
+            <p:extLst>
+              <p:ext uri="{D42A27DB-BD31-4B8C-83A1-F6EECF244321}">
+                <p14:modId xmlns:p14="http://schemas.microsoft.com/office/powerpoint/2010/main" val="531923615"/>
+              </p:ext>
+            </p:extLst>
+          </p:nvPr>
+        </p:nvGraphicFramePr>
+        <p:xfrm>
+          <a:off x="734423" y="745794"/>
+          <a:ext cx="2056404" cy="882981"/>
+        </p:xfrm>
+        <a:graphic>
+          <a:graphicData uri="http://schemas.openxmlformats.org/drawingml/2006/table">
+            <a:tbl>
+              <a:tblPr>
+                <a:tableStyleId>{5C22544A-7EE6-4342-B048-85BDC9FD1C3A}</a:tableStyleId>
+              </a:tblPr>
+              <a:tblGrid>
+                <a:gridCol w="342734">
+                  <a:extLst>
+                    <a:ext uri="{9D8B030D-6E8A-4147-A177-3AD203B41FA5}">
+                      <a16:colId xmlns:a16="http://schemas.microsoft.com/office/drawing/2014/main" val="1560128604"/>
+                    </a:ext>
+                  </a:extLst>
+                </a:gridCol>
+                <a:gridCol w="342734">
+                  <a:extLst>
+                    <a:ext uri="{9D8B030D-6E8A-4147-A177-3AD203B41FA5}">
+                      <a16:colId xmlns:a16="http://schemas.microsoft.com/office/drawing/2014/main" val="102271791"/>
+                    </a:ext>
+                  </a:extLst>
+                </a:gridCol>
+                <a:gridCol w="342734">
+                  <a:extLst>
+                    <a:ext uri="{9D8B030D-6E8A-4147-A177-3AD203B41FA5}">
+                      <a16:colId xmlns:a16="http://schemas.microsoft.com/office/drawing/2014/main" val="2840650012"/>
+                    </a:ext>
+                  </a:extLst>
+                </a:gridCol>
+                <a:gridCol w="342734">
+                  <a:extLst>
+                    <a:ext uri="{9D8B030D-6E8A-4147-A177-3AD203B41FA5}">
+                      <a16:colId xmlns:a16="http://schemas.microsoft.com/office/drawing/2014/main" val="1125687892"/>
+                    </a:ext>
+                  </a:extLst>
+                </a:gridCol>
+                <a:gridCol w="342734">
+                  <a:extLst>
+                    <a:ext uri="{9D8B030D-6E8A-4147-A177-3AD203B41FA5}">
+                      <a16:colId xmlns:a16="http://schemas.microsoft.com/office/drawing/2014/main" val="2638207405"/>
+                    </a:ext>
+                  </a:extLst>
+                </a:gridCol>
+                <a:gridCol w="342734">
+                  <a:extLst>
+                    <a:ext uri="{9D8B030D-6E8A-4147-A177-3AD203B41FA5}">
+                      <a16:colId xmlns:a16="http://schemas.microsoft.com/office/drawing/2014/main" val="1005752336"/>
+                    </a:ext>
+                  </a:extLst>
+                </a:gridCol>
+              </a:tblGrid>
+              <a:tr h="294327">
+                <a:tc>
+                  <a:txBody>
+                    <a:bodyPr/>
+                    <a:lstStyle/>
+                    <a:p>
+                      <a:pPr algn="ctr"/>
+                      <a:r>
+                        <a:rPr lang="nl-NL" sz="900" dirty="0">
+                          <a:solidFill>
+                            <a:schemeClr val="bg1"/>
+                          </a:solidFill>
+                        </a:rPr>
+                        <a:t>1</a:t>
+                      </a:r>
+                      <a:endParaRPr lang="en-GB" sz="900" dirty="0">
+                        <a:solidFill>
+                          <a:schemeClr val="bg1"/>
+                        </a:solidFill>
+                      </a:endParaRPr>
+                    </a:p>
+                  </a:txBody>
+                  <a:tcPr>
+                    <a:solidFill>
+                      <a:srgbClr val="2A9D8F"/>
+                    </a:solidFill>
+                  </a:tcPr>
+                </a:tc>
+                <a:tc>
+                  <a:txBody>
+                    <a:bodyPr/>
+                    <a:lstStyle/>
+                    <a:p>
+                      <a:pPr algn="ctr"/>
+                      <a:r>
+                        <a:rPr lang="nl-NL" sz="900" dirty="0">
+                          <a:solidFill>
+                            <a:schemeClr val="bg1"/>
+                          </a:solidFill>
+                        </a:rPr>
+                        <a:t>/</a:t>
+                      </a:r>
+                      <a:endParaRPr lang="en-GB" sz="900" dirty="0">
+                        <a:solidFill>
+                          <a:schemeClr val="bg1"/>
+                        </a:solidFill>
+                      </a:endParaRPr>
+                    </a:p>
+                  </a:txBody>
+                  <a:tcPr>
+                    <a:solidFill>
+                      <a:srgbClr val="2A9D8F"/>
+                    </a:solidFill>
+                  </a:tcPr>
+                </a:tc>
+                <a:tc>
+                  <a:txBody>
+                    <a:bodyPr/>
+                    <a:lstStyle/>
+                    <a:p>
+                      <a:pPr algn="ctr"/>
+                      <a:r>
+                        <a:rPr kumimoji="0" lang="nl-NL" sz="900" b="1" i="0" u="none" strike="noStrike" kern="1200" cap="none" spc="0" normalizeH="0" baseline="0" noProof="0" dirty="0">
+                          <a:ln>
+                            <a:noFill/>
+                          </a:ln>
+                          <a:solidFill>
+                            <a:schemeClr val="bg1"/>
+                          </a:solidFill>
+                          <a:effectLst/>
+                          <a:uLnTx/>
+                          <a:uFillTx/>
+                          <a:latin typeface="+mn-lt"/>
+                          <a:ea typeface="+mn-ea"/>
+                          <a:cs typeface="+mn-cs"/>
+                        </a:rPr>
+                        <a:t>/</a:t>
+                      </a:r>
+                      <a:endParaRPr lang="en-GB" sz="900" dirty="0">
+                        <a:solidFill>
+                          <a:schemeClr val="bg1"/>
+                        </a:solidFill>
+                      </a:endParaRPr>
+                    </a:p>
+                  </a:txBody>
+                  <a:tcPr>
+                    <a:solidFill>
+                      <a:srgbClr val="2A9D8F"/>
+                    </a:solidFill>
+                  </a:tcPr>
+                </a:tc>
+                <a:tc>
+                  <a:txBody>
+                    <a:bodyPr/>
+                    <a:lstStyle/>
+                    <a:p>
+                      <a:pPr algn="ctr"/>
+                      <a:r>
+                        <a:rPr kumimoji="0" lang="nl-NL" sz="900" b="1" i="0" u="none" strike="noStrike" kern="1200" cap="none" spc="0" normalizeH="0" baseline="0" noProof="0" dirty="0">
+                          <a:ln>
+                            <a:noFill/>
+                          </a:ln>
+                          <a:solidFill>
+                            <a:schemeClr val="bg1"/>
+                          </a:solidFill>
+                          <a:effectLst/>
+                          <a:uLnTx/>
+                          <a:uFillTx/>
+                          <a:latin typeface="+mn-lt"/>
+                          <a:ea typeface="+mn-ea"/>
+                          <a:cs typeface="+mn-cs"/>
+                        </a:rPr>
+                        <a:t>6</a:t>
+                      </a:r>
+                      <a:endParaRPr lang="en-GB" sz="900" dirty="0">
+                        <a:solidFill>
+                          <a:schemeClr val="bg1"/>
+                        </a:solidFill>
+                      </a:endParaRPr>
+                    </a:p>
+                  </a:txBody>
+                  <a:tcPr>
+                    <a:solidFill>
+                      <a:srgbClr val="2A9D8F"/>
+                    </a:solidFill>
+                  </a:tcPr>
+                </a:tc>
+                <a:tc>
+                  <a:txBody>
+                    <a:bodyPr/>
+                    <a:lstStyle/>
+                    <a:p>
+                      <a:pPr algn="ctr"/>
+                      <a:r>
+                        <a:rPr kumimoji="0" lang="nl-NL" sz="900" b="1" i="0" u="none" strike="noStrike" kern="1200" cap="none" spc="0" normalizeH="0" baseline="0" noProof="0" dirty="0">
+                          <a:ln>
+                            <a:noFill/>
+                          </a:ln>
+                          <a:solidFill>
+                            <a:schemeClr val="bg1"/>
+                          </a:solidFill>
+                          <a:effectLst/>
+                          <a:uLnTx/>
+                          <a:uFillTx/>
+                          <a:latin typeface="+mn-lt"/>
+                          <a:ea typeface="+mn-ea"/>
+                          <a:cs typeface="+mn-cs"/>
+                        </a:rPr>
+                        <a:t>10</a:t>
+                      </a:r>
+                      <a:endParaRPr lang="en-GB" sz="900" dirty="0">
+                        <a:solidFill>
+                          <a:schemeClr val="bg1"/>
+                        </a:solidFill>
+                      </a:endParaRPr>
+                    </a:p>
+                  </a:txBody>
+                  <a:tcPr>
+                    <a:solidFill>
+                      <a:srgbClr val="2A9D8F"/>
+                    </a:solidFill>
+                  </a:tcPr>
+                </a:tc>
+                <a:tc>
+                  <a:txBody>
+                    <a:bodyPr/>
+                    <a:lstStyle/>
+                    <a:p>
+                      <a:pPr algn="ctr"/>
+                      <a:r>
+                        <a:rPr kumimoji="0" lang="nl-NL" sz="900" b="1" i="0" u="none" strike="noStrike" kern="1200" cap="none" spc="0" normalizeH="0" baseline="0" noProof="0" dirty="0">
+                          <a:ln>
+                            <a:noFill/>
+                          </a:ln>
+                          <a:solidFill>
+                            <a:prstClr val="white"/>
+                          </a:solidFill>
+                          <a:effectLst/>
+                          <a:uLnTx/>
+                          <a:uFillTx/>
+                          <a:latin typeface="+mn-lt"/>
+                          <a:ea typeface="+mn-ea"/>
+                          <a:cs typeface="+mn-cs"/>
+                        </a:rPr>
+                        <a:t>15</a:t>
+                      </a:r>
+                      <a:endParaRPr lang="en-GB" sz="900" dirty="0"/>
+                    </a:p>
+                  </a:txBody>
+                  <a:tcPr>
+                    <a:solidFill>
+                      <a:srgbClr val="2A9D8F"/>
+                    </a:solidFill>
+                  </a:tcPr>
+                </a:tc>
+                <a:extLst>
+                  <a:ext uri="{0D108BD9-81ED-4DB2-BD59-A6C34878D82A}">
+                    <a16:rowId xmlns:a16="http://schemas.microsoft.com/office/drawing/2014/main" val="893204045"/>
+                  </a:ext>
+                </a:extLst>
+              </a:tr>
+              <a:tr h="294327">
+                <a:tc>
+                  <a:txBody>
+                    <a:bodyPr/>
+                    <a:lstStyle/>
+                    <a:p>
+                      <a:pPr algn="ctr"/>
+                      <a:r>
+                        <a:rPr kumimoji="0" lang="nl-NL" sz="900" b="1" i="0" u="none" strike="noStrike" kern="1200" cap="none" spc="0" normalizeH="0" baseline="0" noProof="0" dirty="0">
+                          <a:ln>
+                            <a:noFill/>
+                          </a:ln>
+                          <a:solidFill>
+                            <a:prstClr val="white"/>
+                          </a:solidFill>
+                          <a:effectLst/>
+                          <a:uLnTx/>
+                          <a:uFillTx/>
+                          <a:latin typeface="+mn-lt"/>
+                          <a:ea typeface="+mn-ea"/>
+                          <a:cs typeface="+mn-cs"/>
+                        </a:rPr>
+                        <a:t>6</a:t>
+                      </a:r>
+                      <a:endParaRPr lang="en-GB" sz="900" dirty="0"/>
+                    </a:p>
+                  </a:txBody>
+                  <a:tcPr>
+                    <a:solidFill>
+                      <a:srgbClr val="2A9D8F"/>
+                    </a:solidFill>
+                  </a:tcPr>
+                </a:tc>
+                <a:tc>
+                  <a:txBody>
+                    <a:bodyPr/>
+                    <a:lstStyle/>
+                    <a:p>
+                      <a:pPr algn="ctr"/>
+                      <a:r>
+                        <a:rPr lang="nl-NL" sz="900" b="1" dirty="0">
+                          <a:solidFill>
+                            <a:schemeClr val="bg1"/>
+                          </a:solidFill>
+                        </a:rPr>
+                        <a:t>9</a:t>
+                      </a:r>
+                      <a:endParaRPr lang="en-GB" sz="900" b="1" dirty="0">
+                        <a:solidFill>
+                          <a:schemeClr val="bg1"/>
+                        </a:solidFill>
+                      </a:endParaRPr>
+                    </a:p>
+                  </a:txBody>
+                  <a:tcPr>
+                    <a:solidFill>
+                      <a:srgbClr val="2A9D8F"/>
+                    </a:solidFill>
+                  </a:tcPr>
+                </a:tc>
+                <a:tc>
+                  <a:txBody>
+                    <a:bodyPr/>
+                    <a:lstStyle/>
+                    <a:p>
+                      <a:pPr marL="0" marR="0" lvl="0" indent="0" algn="ctr" defTabSz="914400" rtl="0" eaLnBrk="1" fontAlgn="auto" latinLnBrk="0" hangingPunct="1">
+                        <a:lnSpc>
+                          <a:spcPct val="100000"/>
+                        </a:lnSpc>
+                        <a:spcBef>
+                          <a:spcPts val="0"/>
+                        </a:spcBef>
+                        <a:spcAft>
+                          <a:spcPts val="0"/>
+                        </a:spcAft>
+                        <a:buClrTx/>
+                        <a:buSzTx/>
+                        <a:buFontTx/>
+                        <a:buNone/>
+                        <a:tabLst/>
+                        <a:defRPr/>
+                      </a:pPr>
+                      <a:r>
+                        <a:rPr lang="nl-NL" sz="900" b="1" dirty="0">
+                          <a:solidFill>
+                            <a:schemeClr val="bg1"/>
+                          </a:solidFill>
+                        </a:rPr>
+                        <a:t>/</a:t>
+                      </a:r>
+                      <a:endParaRPr lang="en-GB" sz="900" b="1" dirty="0">
+                        <a:solidFill>
+                          <a:schemeClr val="bg1"/>
+                        </a:solidFill>
+                      </a:endParaRPr>
+                    </a:p>
+                  </a:txBody>
+                  <a:tcPr>
+                    <a:solidFill>
+                      <a:srgbClr val="2A9D8F"/>
+                    </a:solidFill>
+                  </a:tcPr>
+                </a:tc>
+                <a:tc>
+                  <a:txBody>
+                    <a:bodyPr/>
+                    <a:lstStyle/>
+                    <a:p>
+                      <a:pPr algn="ctr"/>
+                      <a:r>
+                        <a:rPr lang="nl-NL" sz="900" b="1" dirty="0">
+                          <a:solidFill>
+                            <a:schemeClr val="bg1"/>
+                          </a:solidFill>
+                        </a:rPr>
+                        <a:t>/</a:t>
+                      </a:r>
+                      <a:endParaRPr lang="en-GB" sz="900" b="1" dirty="0">
+                        <a:solidFill>
+                          <a:schemeClr val="bg1"/>
+                        </a:solidFill>
+                      </a:endParaRPr>
+                    </a:p>
+                  </a:txBody>
+                  <a:tcPr>
+                    <a:solidFill>
+                      <a:srgbClr val="2A9D8F"/>
+                    </a:solidFill>
+                  </a:tcPr>
+                </a:tc>
+                <a:tc>
+                  <a:txBody>
+                    <a:bodyPr/>
+                    <a:lstStyle/>
+                    <a:p>
+                      <a:pPr marL="0" marR="0" lvl="0" indent="0" algn="ctr" defTabSz="914400" rtl="0" eaLnBrk="1" fontAlgn="auto" latinLnBrk="0" hangingPunct="1">
+                        <a:lnSpc>
+                          <a:spcPct val="100000"/>
+                        </a:lnSpc>
+                        <a:spcBef>
+                          <a:spcPts val="0"/>
+                        </a:spcBef>
+                        <a:spcAft>
+                          <a:spcPts val="0"/>
+                        </a:spcAft>
+                        <a:buClrTx/>
+                        <a:buSzTx/>
+                        <a:buFontTx/>
+                        <a:buNone/>
+                        <a:tabLst/>
+                        <a:defRPr/>
+                      </a:pPr>
+                      <a:r>
+                        <a:rPr kumimoji="0" lang="nl-NL" sz="900" b="1" i="0" u="none" strike="noStrike" kern="1200" cap="none" spc="0" normalizeH="0" baseline="0" noProof="0" dirty="0">
+                          <a:ln>
+                            <a:noFill/>
+                          </a:ln>
+                          <a:solidFill>
+                            <a:prstClr val="white"/>
+                          </a:solidFill>
+                          <a:effectLst/>
+                          <a:uLnTx/>
+                          <a:uFillTx/>
+                          <a:latin typeface="+mn-lt"/>
+                          <a:ea typeface="+mn-ea"/>
+                          <a:cs typeface="+mn-cs"/>
+                        </a:rPr>
+                        <a:t>/</a:t>
+                      </a:r>
+                      <a:endParaRPr lang="en-GB" sz="900" dirty="0"/>
+                    </a:p>
+                  </a:txBody>
+                  <a:tcPr>
+                    <a:solidFill>
+                      <a:srgbClr val="2A9D8F"/>
+                    </a:solidFill>
+                  </a:tcPr>
+                </a:tc>
+                <a:tc>
+                  <a:txBody>
+                    <a:bodyPr/>
+                    <a:lstStyle/>
+                    <a:p>
+                      <a:pPr marL="0" marR="0" lvl="0" indent="0" algn="ctr" defTabSz="914400" rtl="0" eaLnBrk="1" fontAlgn="auto" latinLnBrk="0" hangingPunct="1">
+                        <a:lnSpc>
+                          <a:spcPct val="100000"/>
+                        </a:lnSpc>
+                        <a:spcBef>
+                          <a:spcPts val="0"/>
+                        </a:spcBef>
+                        <a:spcAft>
+                          <a:spcPts val="0"/>
+                        </a:spcAft>
+                        <a:buClrTx/>
+                        <a:buSzTx/>
+                        <a:buFontTx/>
+                        <a:buNone/>
+                        <a:tabLst/>
+                        <a:defRPr/>
+                      </a:pPr>
+                      <a:r>
+                        <a:rPr kumimoji="0" lang="nl-NL" sz="900" b="1" i="0" u="none" strike="noStrike" kern="1200" cap="none" spc="0" normalizeH="0" baseline="0" noProof="0" dirty="0">
+                          <a:ln>
+                            <a:noFill/>
+                          </a:ln>
+                          <a:solidFill>
+                            <a:prstClr val="white"/>
+                          </a:solidFill>
+                          <a:effectLst/>
+                          <a:uLnTx/>
+                          <a:uFillTx/>
+                          <a:latin typeface="+mn-lt"/>
+                          <a:ea typeface="+mn-ea"/>
+                          <a:cs typeface="+mn-cs"/>
+                        </a:rPr>
+                        <a:t>12</a:t>
+                      </a:r>
+                      <a:endParaRPr lang="en-GB" sz="900" dirty="0"/>
+                    </a:p>
+                  </a:txBody>
+                  <a:tcPr>
+                    <a:solidFill>
+                      <a:srgbClr val="2A9D8F"/>
+                    </a:solidFill>
+                  </a:tcPr>
+                </a:tc>
+                <a:extLst>
+                  <a:ext uri="{0D108BD9-81ED-4DB2-BD59-A6C34878D82A}">
+                    <a16:rowId xmlns:a16="http://schemas.microsoft.com/office/drawing/2014/main" val="2588751137"/>
+                  </a:ext>
+                </a:extLst>
+              </a:tr>
+              <a:tr h="294327">
+                <a:tc>
+                  <a:txBody>
+                    <a:bodyPr/>
+                    <a:lstStyle/>
+                    <a:p>
+                      <a:pPr algn="ctr"/>
+                      <a:r>
+                        <a:rPr lang="nl-NL" sz="900" b="1" dirty="0">
+                          <a:solidFill>
+                            <a:schemeClr val="bg1"/>
+                          </a:solidFill>
+                        </a:rPr>
+                        <a:t>/</a:t>
+                      </a:r>
+                      <a:endParaRPr lang="en-GB" sz="900" b="1" dirty="0">
+                        <a:solidFill>
+                          <a:schemeClr val="bg1"/>
+                        </a:solidFill>
+                      </a:endParaRPr>
+                    </a:p>
+                  </a:txBody>
+                  <a:tcPr>
+                    <a:solidFill>
+                      <a:srgbClr val="2A9D8F"/>
+                    </a:solidFill>
+                  </a:tcPr>
+                </a:tc>
+                <a:tc>
+                  <a:txBody>
+                    <a:bodyPr/>
+                    <a:lstStyle/>
+                    <a:p>
+                      <a:pPr algn="ctr"/>
+                      <a:r>
+                        <a:rPr kumimoji="0" lang="nl-NL" sz="900" b="1" i="0" u="none" strike="noStrike" kern="1200" cap="none" spc="0" normalizeH="0" baseline="0" noProof="0" dirty="0">
+                          <a:ln>
+                            <a:noFill/>
+                          </a:ln>
+                          <a:solidFill>
+                            <a:prstClr val="white"/>
+                          </a:solidFill>
+                          <a:effectLst/>
+                          <a:uLnTx/>
+                          <a:uFillTx/>
+                          <a:latin typeface="+mn-lt"/>
+                          <a:ea typeface="+mn-ea"/>
+                          <a:cs typeface="+mn-cs"/>
+                        </a:rPr>
+                        <a:t>10</a:t>
+                      </a:r>
+                      <a:endParaRPr lang="en-GB" sz="900" dirty="0"/>
+                    </a:p>
+                  </a:txBody>
+                  <a:tcPr>
+                    <a:solidFill>
+                      <a:srgbClr val="2A9D8F"/>
+                    </a:solidFill>
+                  </a:tcPr>
+                </a:tc>
+                <a:tc>
+                  <a:txBody>
+                    <a:bodyPr/>
+                    <a:lstStyle/>
+                    <a:p>
+                      <a:pPr algn="ctr"/>
+                      <a:r>
+                        <a:rPr lang="nl-NL" sz="900" b="1" dirty="0">
+                          <a:solidFill>
+                            <a:schemeClr val="bg1"/>
+                          </a:solidFill>
+                        </a:rPr>
+                        <a:t>/</a:t>
+                      </a:r>
+                      <a:endParaRPr lang="en-GB" sz="900" b="1" dirty="0">
+                        <a:solidFill>
+                          <a:schemeClr val="bg1"/>
+                        </a:solidFill>
+                      </a:endParaRPr>
+                    </a:p>
+                  </a:txBody>
+                  <a:tcPr>
+                    <a:solidFill>
+                      <a:srgbClr val="2A9D8F"/>
+                    </a:solidFill>
+                  </a:tcPr>
+                </a:tc>
+                <a:tc>
+                  <a:txBody>
+                    <a:bodyPr/>
+                    <a:lstStyle/>
+                    <a:p>
+                      <a:pPr algn="ctr"/>
+                      <a:r>
+                        <a:rPr kumimoji="0" lang="nl-NL" sz="900" b="1" i="0" u="none" strike="noStrike" kern="1200" cap="none" spc="0" normalizeH="0" baseline="0" noProof="0" dirty="0">
+                          <a:ln>
+                            <a:noFill/>
+                          </a:ln>
+                          <a:solidFill>
+                            <a:prstClr val="white"/>
+                          </a:solidFill>
+                          <a:effectLst/>
+                          <a:uLnTx/>
+                          <a:uFillTx/>
+                          <a:latin typeface="+mn-lt"/>
+                          <a:ea typeface="+mn-ea"/>
+                          <a:cs typeface="+mn-cs"/>
+                        </a:rPr>
+                        <a:t>9</a:t>
+                      </a:r>
+                      <a:endParaRPr lang="en-GB" sz="900" dirty="0"/>
+                    </a:p>
+                  </a:txBody>
+                  <a:tcPr>
+                    <a:solidFill>
+                      <a:srgbClr val="2A9D8F"/>
+                    </a:solidFill>
+                  </a:tcPr>
+                </a:tc>
+                <a:tc>
+                  <a:txBody>
+                    <a:bodyPr/>
+                    <a:lstStyle/>
+                    <a:p>
+                      <a:pPr algn="ctr"/>
+                      <a:r>
+                        <a:rPr kumimoji="0" lang="nl-NL" sz="900" b="1" i="0" u="none" strike="noStrike" kern="1200" cap="none" spc="0" normalizeH="0" baseline="0" noProof="0" dirty="0">
+                          <a:ln>
+                            <a:noFill/>
+                          </a:ln>
+                          <a:solidFill>
+                            <a:prstClr val="white"/>
+                          </a:solidFill>
+                          <a:effectLst/>
+                          <a:uLnTx/>
+                          <a:uFillTx/>
+                          <a:latin typeface="+mn-lt"/>
+                          <a:ea typeface="+mn-ea"/>
+                          <a:cs typeface="+mn-cs"/>
+                        </a:rPr>
+                        <a:t>10</a:t>
+                      </a:r>
+                      <a:endParaRPr lang="en-GB" sz="900" dirty="0"/>
+                    </a:p>
+                  </a:txBody>
+                  <a:tcPr>
+                    <a:solidFill>
+                      <a:srgbClr val="2A9D8F"/>
+                    </a:solidFill>
+                  </a:tcPr>
+                </a:tc>
+                <a:tc>
+                  <a:txBody>
+                    <a:bodyPr/>
+                    <a:lstStyle/>
+                    <a:p>
+                      <a:pPr algn="ctr"/>
+                      <a:r>
+                        <a:rPr kumimoji="0" lang="nl-NL" sz="900" b="1" i="0" u="none" strike="noStrike" kern="1200" cap="none" spc="0" normalizeH="0" baseline="0" noProof="0" dirty="0">
+                          <a:ln>
+                            <a:noFill/>
+                          </a:ln>
+                          <a:solidFill>
+                            <a:prstClr val="white"/>
+                          </a:solidFill>
+                          <a:effectLst/>
+                          <a:uLnTx/>
+                          <a:uFillTx/>
+                          <a:latin typeface="+mn-lt"/>
+                          <a:ea typeface="+mn-ea"/>
+                          <a:cs typeface="+mn-cs"/>
+                        </a:rPr>
+                        <a:t>11</a:t>
+                      </a:r>
+                      <a:endParaRPr lang="en-GB" sz="900" dirty="0"/>
+                    </a:p>
+                  </a:txBody>
+                  <a:tcPr>
+                    <a:solidFill>
+                      <a:srgbClr val="2A9D8F"/>
+                    </a:solidFill>
+                  </a:tcPr>
+                </a:tc>
+                <a:extLst>
+                  <a:ext uri="{0D108BD9-81ED-4DB2-BD59-A6C34878D82A}">
+                    <a16:rowId xmlns:a16="http://schemas.microsoft.com/office/drawing/2014/main" val="672492951"/>
+                  </a:ext>
+                </a:extLst>
+              </a:tr>
+            </a:tbl>
+          </a:graphicData>
+        </a:graphic>
+      </p:graphicFrame>
+      <p:sp>
+        <p:nvSpPr>
+          <p:cNvPr id="4" name="TextBox 3">
+            <a:extLst>
+              <a:ext uri="{FF2B5EF4-FFF2-40B4-BE49-F238E27FC236}">
+                <a16:creationId xmlns:a16="http://schemas.microsoft.com/office/drawing/2014/main" id="{89622DFF-48A0-407D-9B26-66779BCA8F72}"/>
+              </a:ext>
+            </a:extLst>
+          </p:cNvPr>
+          <p:cNvSpPr txBox="1"/>
+          <p:nvPr/>
+        </p:nvSpPr>
+        <p:spPr>
+          <a:xfrm>
+            <a:off x="3094919" y="3290500"/>
+            <a:ext cx="6096000" cy="276999"/>
+          </a:xfrm>
+          <a:prstGeom prst="rect">
+            <a:avLst/>
+          </a:prstGeom>
+          <a:noFill/>
+        </p:spPr>
+        <p:txBody>
+          <a:bodyPr wrap="square">
+            <a:spAutoFit/>
+          </a:bodyPr>
+          <a:lstStyle/>
+          <a:p>
+            <a:pPr marL="0" marR="0" lvl="0" indent="0" algn="l" defTabSz="914400" rtl="0" eaLnBrk="1" fontAlgn="auto" latinLnBrk="0" hangingPunct="1">
+              <a:lnSpc>
+                <a:spcPct val="100000"/>
+              </a:lnSpc>
+              <a:spcBef>
+                <a:spcPts val="0"/>
+              </a:spcBef>
+              <a:spcAft>
+                <a:spcPts val="0"/>
+              </a:spcAft>
+              <a:buClrTx/>
+              <a:buSzTx/>
+              <a:buFontTx/>
+              <a:buNone/>
+              <a:tabLst/>
+              <a:defRPr/>
+            </a:pPr>
+            <a:r>
+              <a:rPr kumimoji="0" lang="nl-NL" sz="1200" b="1" i="0" u="none" strike="noStrike" kern="1200" cap="none" spc="0" normalizeH="0" baseline="0" noProof="0" dirty="0">
+                <a:ln>
+                  <a:noFill/>
+                </a:ln>
+                <a:solidFill>
+                  <a:prstClr val="white"/>
+                </a:solidFill>
+                <a:effectLst/>
+                <a:uLnTx/>
+                <a:uFillTx/>
+                <a:latin typeface="Calibri" panose="020F0502020204030204"/>
+                <a:ea typeface="+mn-ea"/>
+                <a:cs typeface="+mn-cs"/>
+              </a:rPr>
+              <a:t>31</a:t>
+            </a:r>
+            <a:endParaRPr kumimoji="0" lang="en-GB" sz="1200" b="1" i="0" u="none" strike="noStrike" kern="1200" cap="none" spc="0" normalizeH="0" baseline="0" noProof="0" dirty="0">
+              <a:ln>
+                <a:noFill/>
+              </a:ln>
+              <a:solidFill>
+                <a:prstClr val="white"/>
+              </a:solidFill>
+              <a:effectLst/>
+              <a:uLnTx/>
+              <a:uFillTx/>
+              <a:latin typeface="Calibri" panose="020F0502020204030204"/>
+              <a:ea typeface="+mn-ea"/>
+              <a:cs typeface="+mn-cs"/>
+            </a:endParaRPr>
+          </a:p>
+        </p:txBody>
+      </p:sp>
+      <p:sp>
+        <p:nvSpPr>
+          <p:cNvPr id="5" name="TextBox 4">
+            <a:extLst>
+              <a:ext uri="{FF2B5EF4-FFF2-40B4-BE49-F238E27FC236}">
+                <a16:creationId xmlns:a16="http://schemas.microsoft.com/office/drawing/2014/main" id="{A9C446CF-C1CC-46B3-A394-4B12D83E496D}"/>
+              </a:ext>
+            </a:extLst>
+          </p:cNvPr>
+          <p:cNvSpPr txBox="1"/>
+          <p:nvPr/>
+        </p:nvSpPr>
+        <p:spPr>
+          <a:xfrm>
+            <a:off x="737543" y="1595437"/>
+            <a:ext cx="341902" cy="253916"/>
+          </a:xfrm>
+          <a:prstGeom prst="rect">
+            <a:avLst/>
+          </a:prstGeom>
+          <a:noFill/>
+        </p:spPr>
+        <p:txBody>
+          <a:bodyPr wrap="square" rtlCol="0">
+            <a:spAutoFit/>
+          </a:bodyPr>
+          <a:lstStyle/>
+          <a:p>
+            <a:r>
+              <a:rPr lang="nl-NL" sz="1050" dirty="0"/>
+              <a:t>x</a:t>
+            </a:r>
+            <a:r>
+              <a:rPr lang="nl-NL" sz="1050" baseline="-25000" dirty="0"/>
+              <a:t>1</a:t>
+            </a:r>
+            <a:endParaRPr lang="en-GB" sz="1050" baseline="-25000" dirty="0"/>
+          </a:p>
+        </p:txBody>
+      </p:sp>
+      <p:sp>
+        <p:nvSpPr>
+          <p:cNvPr id="6" name="TextBox 5">
+            <a:extLst>
+              <a:ext uri="{FF2B5EF4-FFF2-40B4-BE49-F238E27FC236}">
+                <a16:creationId xmlns:a16="http://schemas.microsoft.com/office/drawing/2014/main" id="{BE58C55A-3A25-4B41-99F0-D87612B011F5}"/>
+              </a:ext>
+            </a:extLst>
+          </p:cNvPr>
+          <p:cNvSpPr txBox="1"/>
+          <p:nvPr/>
+        </p:nvSpPr>
+        <p:spPr>
+          <a:xfrm>
+            <a:off x="1079445" y="1595437"/>
+            <a:ext cx="341902" cy="253916"/>
+          </a:xfrm>
+          <a:prstGeom prst="rect">
+            <a:avLst/>
+          </a:prstGeom>
+          <a:noFill/>
+        </p:spPr>
+        <p:txBody>
+          <a:bodyPr wrap="square" rtlCol="0">
+            <a:spAutoFit/>
+          </a:bodyPr>
+          <a:lstStyle/>
+          <a:p>
+            <a:pPr algn="ctr"/>
+            <a:r>
+              <a:rPr lang="nl-NL" sz="1050" dirty="0"/>
+              <a:t>x</a:t>
+            </a:r>
+            <a:r>
+              <a:rPr lang="nl-NL" sz="1050" baseline="-25000" dirty="0"/>
+              <a:t>2</a:t>
+            </a:r>
+            <a:endParaRPr lang="en-GB" sz="1050" baseline="-25000" dirty="0"/>
+          </a:p>
+        </p:txBody>
+      </p:sp>
+      <p:sp>
+        <p:nvSpPr>
+          <p:cNvPr id="10" name="TextBox 9">
+            <a:extLst>
+              <a:ext uri="{FF2B5EF4-FFF2-40B4-BE49-F238E27FC236}">
+                <a16:creationId xmlns:a16="http://schemas.microsoft.com/office/drawing/2014/main" id="{43C6B6AE-CACD-4747-A708-6EB5CFAFDCE6}"/>
+              </a:ext>
+            </a:extLst>
+          </p:cNvPr>
+          <p:cNvSpPr txBox="1"/>
+          <p:nvPr/>
+        </p:nvSpPr>
+        <p:spPr>
+          <a:xfrm>
+            <a:off x="2456413" y="1595437"/>
+            <a:ext cx="341902" cy="253916"/>
+          </a:xfrm>
+          <a:prstGeom prst="rect">
+            <a:avLst/>
+          </a:prstGeom>
+          <a:noFill/>
+        </p:spPr>
+        <p:txBody>
+          <a:bodyPr wrap="square" rtlCol="0">
+            <a:spAutoFit/>
+          </a:bodyPr>
+          <a:lstStyle/>
+          <a:p>
+            <a:pPr algn="ctr"/>
+            <a:r>
+              <a:rPr lang="nl-NL" sz="1050" dirty="0"/>
+              <a:t>x</a:t>
+            </a:r>
+            <a:r>
+              <a:rPr lang="nl-NL" sz="1050" baseline="-25000" dirty="0"/>
+              <a:t>6</a:t>
+            </a:r>
+            <a:endParaRPr lang="en-GB" sz="1050" baseline="-25000" dirty="0"/>
+          </a:p>
+        </p:txBody>
+      </p:sp>
+      <p:sp>
+        <p:nvSpPr>
+          <p:cNvPr id="11" name="TextBox 10">
+            <a:extLst>
+              <a:ext uri="{FF2B5EF4-FFF2-40B4-BE49-F238E27FC236}">
+                <a16:creationId xmlns:a16="http://schemas.microsoft.com/office/drawing/2014/main" id="{45484794-213A-493C-8FD3-C1422AE9A603}"/>
+              </a:ext>
+            </a:extLst>
+          </p:cNvPr>
+          <p:cNvSpPr txBox="1"/>
+          <p:nvPr/>
+        </p:nvSpPr>
+        <p:spPr>
+          <a:xfrm>
+            <a:off x="1424467" y="1595437"/>
+            <a:ext cx="1024458" cy="253916"/>
+          </a:xfrm>
+          <a:prstGeom prst="rect">
+            <a:avLst/>
+          </a:prstGeom>
+          <a:noFill/>
+        </p:spPr>
+        <p:txBody>
+          <a:bodyPr wrap="square" rtlCol="0">
+            <a:spAutoFit/>
+          </a:bodyPr>
+          <a:lstStyle/>
+          <a:p>
+            <a:pPr algn="ctr"/>
+            <a:r>
+              <a:rPr lang="nl-NL" sz="1050" dirty="0"/>
+              <a:t> ….</a:t>
+            </a:r>
+            <a:endParaRPr lang="en-GB" sz="1050" dirty="0"/>
+          </a:p>
+        </p:txBody>
+      </p:sp>
+      <p:graphicFrame>
+        <p:nvGraphicFramePr>
+          <p:cNvPr id="13" name="Table 2">
+            <a:extLst>
+              <a:ext uri="{FF2B5EF4-FFF2-40B4-BE49-F238E27FC236}">
+                <a16:creationId xmlns:a16="http://schemas.microsoft.com/office/drawing/2014/main" id="{0DFCF9C7-1898-46F8-BD7D-FA8A00A19B0E}"/>
+              </a:ext>
+            </a:extLst>
+          </p:cNvPr>
+          <p:cNvGraphicFramePr>
+            <a:graphicFrameLocks noGrp="1"/>
+          </p:cNvGraphicFramePr>
+          <p:nvPr>
+            <p:extLst>
+              <p:ext uri="{D42A27DB-BD31-4B8C-83A1-F6EECF244321}">
+                <p14:modId xmlns:p14="http://schemas.microsoft.com/office/powerpoint/2010/main" val="3226280945"/>
+              </p:ext>
+            </p:extLst>
+          </p:nvPr>
+        </p:nvGraphicFramePr>
+        <p:xfrm>
+          <a:off x="2981699" y="745794"/>
+          <a:ext cx="2056404" cy="882981"/>
+        </p:xfrm>
+        <a:graphic>
+          <a:graphicData uri="http://schemas.openxmlformats.org/drawingml/2006/table">
+            <a:tbl>
+              <a:tblPr>
+                <a:tableStyleId>{5C22544A-7EE6-4342-B048-85BDC9FD1C3A}</a:tableStyleId>
+              </a:tblPr>
+              <a:tblGrid>
+                <a:gridCol w="342734">
+                  <a:extLst>
+                    <a:ext uri="{9D8B030D-6E8A-4147-A177-3AD203B41FA5}">
+                      <a16:colId xmlns:a16="http://schemas.microsoft.com/office/drawing/2014/main" val="1560128604"/>
+                    </a:ext>
+                  </a:extLst>
+                </a:gridCol>
+                <a:gridCol w="342734">
+                  <a:extLst>
+                    <a:ext uri="{9D8B030D-6E8A-4147-A177-3AD203B41FA5}">
+                      <a16:colId xmlns:a16="http://schemas.microsoft.com/office/drawing/2014/main" val="102271791"/>
+                    </a:ext>
+                  </a:extLst>
+                </a:gridCol>
+                <a:gridCol w="342734">
+                  <a:extLst>
+                    <a:ext uri="{9D8B030D-6E8A-4147-A177-3AD203B41FA5}">
+                      <a16:colId xmlns:a16="http://schemas.microsoft.com/office/drawing/2014/main" val="2840650012"/>
+                    </a:ext>
+                  </a:extLst>
+                </a:gridCol>
+                <a:gridCol w="342734">
+                  <a:extLst>
+                    <a:ext uri="{9D8B030D-6E8A-4147-A177-3AD203B41FA5}">
+                      <a16:colId xmlns:a16="http://schemas.microsoft.com/office/drawing/2014/main" val="1125687892"/>
+                    </a:ext>
+                  </a:extLst>
+                </a:gridCol>
+                <a:gridCol w="342734">
+                  <a:extLst>
+                    <a:ext uri="{9D8B030D-6E8A-4147-A177-3AD203B41FA5}">
+                      <a16:colId xmlns:a16="http://schemas.microsoft.com/office/drawing/2014/main" val="2638207405"/>
+                    </a:ext>
+                  </a:extLst>
+                </a:gridCol>
+                <a:gridCol w="342734">
+                  <a:extLst>
+                    <a:ext uri="{9D8B030D-6E8A-4147-A177-3AD203B41FA5}">
+                      <a16:colId xmlns:a16="http://schemas.microsoft.com/office/drawing/2014/main" val="1005752336"/>
+                    </a:ext>
+                  </a:extLst>
+                </a:gridCol>
+              </a:tblGrid>
+              <a:tr h="294327">
+                <a:tc>
+                  <a:txBody>
+                    <a:bodyPr/>
+                    <a:lstStyle/>
+                    <a:p>
+                      <a:pPr algn="ctr"/>
+                      <a:r>
+                        <a:rPr lang="nl-NL" sz="900" dirty="0">
+                          <a:solidFill>
+                            <a:schemeClr val="bg1"/>
+                          </a:solidFill>
+                        </a:rPr>
+                        <a:t>1</a:t>
+                      </a:r>
+                      <a:endParaRPr lang="en-GB" sz="900" dirty="0">
+                        <a:solidFill>
+                          <a:schemeClr val="bg1"/>
+                        </a:solidFill>
+                      </a:endParaRPr>
+                    </a:p>
+                  </a:txBody>
+                  <a:tcPr>
+                    <a:solidFill>
+                      <a:srgbClr val="E9C46A"/>
+                    </a:solidFill>
+                  </a:tcPr>
+                </a:tc>
+                <a:tc>
+                  <a:txBody>
+                    <a:bodyPr/>
+                    <a:lstStyle/>
+                    <a:p>
+                      <a:pPr algn="ctr"/>
+                      <a:r>
+                        <a:rPr lang="nl-NL" sz="900" dirty="0">
+                          <a:solidFill>
+                            <a:schemeClr val="bg1"/>
+                          </a:solidFill>
+                        </a:rPr>
+                        <a:t>0</a:t>
+                      </a:r>
+                      <a:endParaRPr lang="en-GB" sz="900" dirty="0">
+                        <a:solidFill>
+                          <a:schemeClr val="bg1"/>
+                        </a:solidFill>
+                      </a:endParaRPr>
+                    </a:p>
+                  </a:txBody>
+                  <a:tcPr>
+                    <a:solidFill>
+                      <a:srgbClr val="E9C46A"/>
+                    </a:solidFill>
+                  </a:tcPr>
+                </a:tc>
+                <a:tc>
+                  <a:txBody>
+                    <a:bodyPr/>
+                    <a:lstStyle/>
+                    <a:p>
+                      <a:pPr algn="ctr"/>
+                      <a:r>
+                        <a:rPr kumimoji="0" lang="nl-NL" sz="900" b="1" i="0" u="none" strike="noStrike" kern="1200" cap="none" spc="0" normalizeH="0" baseline="0" noProof="0" dirty="0">
+                          <a:ln>
+                            <a:noFill/>
+                          </a:ln>
+                          <a:solidFill>
+                            <a:schemeClr val="bg1"/>
+                          </a:solidFill>
+                          <a:effectLst/>
+                          <a:uLnTx/>
+                          <a:uFillTx/>
+                          <a:latin typeface="+mn-lt"/>
+                          <a:ea typeface="+mn-ea"/>
+                          <a:cs typeface="+mn-cs"/>
+                        </a:rPr>
+                        <a:t>0</a:t>
+                      </a:r>
+                      <a:endParaRPr lang="en-GB" sz="900" dirty="0">
+                        <a:solidFill>
+                          <a:schemeClr val="bg1"/>
+                        </a:solidFill>
+                      </a:endParaRPr>
+                    </a:p>
+                  </a:txBody>
+                  <a:tcPr>
+                    <a:solidFill>
+                      <a:srgbClr val="E9C46A"/>
+                    </a:solidFill>
+                  </a:tcPr>
+                </a:tc>
+                <a:tc>
+                  <a:txBody>
+                    <a:bodyPr/>
+                    <a:lstStyle/>
+                    <a:p>
+                      <a:pPr algn="ctr"/>
+                      <a:r>
+                        <a:rPr kumimoji="0" lang="nl-NL" sz="900" b="1" i="0" u="none" strike="noStrike" kern="1200" cap="none" spc="0" normalizeH="0" baseline="0" noProof="0" dirty="0">
+                          <a:ln>
+                            <a:noFill/>
+                          </a:ln>
+                          <a:solidFill>
+                            <a:schemeClr val="bg1"/>
+                          </a:solidFill>
+                          <a:effectLst/>
+                          <a:uLnTx/>
+                          <a:uFillTx/>
+                          <a:latin typeface="+mn-lt"/>
+                          <a:ea typeface="+mn-ea"/>
+                          <a:cs typeface="+mn-cs"/>
+                        </a:rPr>
+                        <a:t>1</a:t>
+                      </a:r>
+                      <a:endParaRPr lang="en-GB" sz="900" dirty="0">
+                        <a:solidFill>
+                          <a:schemeClr val="bg1"/>
+                        </a:solidFill>
+                      </a:endParaRPr>
+                    </a:p>
+                  </a:txBody>
+                  <a:tcPr>
+                    <a:solidFill>
+                      <a:srgbClr val="E9C46A"/>
+                    </a:solidFill>
+                  </a:tcPr>
+                </a:tc>
+                <a:tc>
+                  <a:txBody>
+                    <a:bodyPr/>
+                    <a:lstStyle/>
+                    <a:p>
+                      <a:pPr algn="ctr"/>
+                      <a:r>
+                        <a:rPr kumimoji="0" lang="nl-NL" sz="900" b="1" i="0" u="none" strike="noStrike" kern="1200" cap="none" spc="0" normalizeH="0" baseline="0" noProof="0" dirty="0">
+                          <a:ln>
+                            <a:noFill/>
+                          </a:ln>
+                          <a:solidFill>
+                            <a:schemeClr val="bg1"/>
+                          </a:solidFill>
+                          <a:effectLst/>
+                          <a:uLnTx/>
+                          <a:uFillTx/>
+                          <a:latin typeface="+mn-lt"/>
+                          <a:ea typeface="+mn-ea"/>
+                          <a:cs typeface="+mn-cs"/>
+                        </a:rPr>
+                        <a:t>1</a:t>
+                      </a:r>
+                      <a:endParaRPr lang="en-GB" sz="900" dirty="0">
+                        <a:solidFill>
+                          <a:schemeClr val="bg1"/>
+                        </a:solidFill>
+                      </a:endParaRPr>
+                    </a:p>
+                  </a:txBody>
+                  <a:tcPr>
+                    <a:solidFill>
+                      <a:srgbClr val="E9C46A"/>
+                    </a:solidFill>
+                  </a:tcPr>
+                </a:tc>
+                <a:tc>
+                  <a:txBody>
+                    <a:bodyPr/>
+                    <a:lstStyle/>
+                    <a:p>
+                      <a:pPr algn="ctr"/>
+                      <a:r>
+                        <a:rPr kumimoji="0" lang="nl-NL" sz="900" b="1" i="0" u="none" strike="noStrike" kern="1200" cap="none" spc="0" normalizeH="0" baseline="0" noProof="0" dirty="0">
+                          <a:ln>
+                            <a:noFill/>
+                          </a:ln>
+                          <a:solidFill>
+                            <a:prstClr val="white"/>
+                          </a:solidFill>
+                          <a:effectLst/>
+                          <a:uLnTx/>
+                          <a:uFillTx/>
+                          <a:latin typeface="+mn-lt"/>
+                          <a:ea typeface="+mn-ea"/>
+                          <a:cs typeface="+mn-cs"/>
+                        </a:rPr>
+                        <a:t>1</a:t>
+                      </a:r>
+                      <a:endParaRPr lang="en-GB" sz="900" dirty="0"/>
+                    </a:p>
+                  </a:txBody>
+                  <a:tcPr>
+                    <a:solidFill>
+                      <a:srgbClr val="E9C46A"/>
+                    </a:solidFill>
+                  </a:tcPr>
+                </a:tc>
+                <a:extLst>
+                  <a:ext uri="{0D108BD9-81ED-4DB2-BD59-A6C34878D82A}">
+                    <a16:rowId xmlns:a16="http://schemas.microsoft.com/office/drawing/2014/main" val="893204045"/>
+                  </a:ext>
+                </a:extLst>
+              </a:tr>
+              <a:tr h="294327">
+                <a:tc>
+                  <a:txBody>
+                    <a:bodyPr/>
+                    <a:lstStyle/>
+                    <a:p>
+                      <a:pPr algn="ctr"/>
+                      <a:r>
+                        <a:rPr kumimoji="0" lang="nl-NL" sz="900" b="1" i="0" u="none" strike="noStrike" kern="1200" cap="none" spc="0" normalizeH="0" baseline="0" noProof="0" dirty="0">
+                          <a:ln>
+                            <a:noFill/>
+                          </a:ln>
+                          <a:solidFill>
+                            <a:prstClr val="white"/>
+                          </a:solidFill>
+                          <a:effectLst/>
+                          <a:uLnTx/>
+                          <a:uFillTx/>
+                          <a:latin typeface="+mn-lt"/>
+                          <a:ea typeface="+mn-ea"/>
+                          <a:cs typeface="+mn-cs"/>
+                        </a:rPr>
+                        <a:t>1</a:t>
+                      </a:r>
+                      <a:endParaRPr lang="en-GB" sz="900" dirty="0"/>
+                    </a:p>
+                  </a:txBody>
+                  <a:tcPr>
+                    <a:solidFill>
+                      <a:srgbClr val="E9C46A"/>
+                    </a:solidFill>
+                  </a:tcPr>
+                </a:tc>
+                <a:tc>
+                  <a:txBody>
+                    <a:bodyPr/>
+                    <a:lstStyle/>
+                    <a:p>
+                      <a:pPr algn="ctr"/>
+                      <a:r>
+                        <a:rPr lang="nl-NL" sz="900" b="1" dirty="0">
+                          <a:solidFill>
+                            <a:schemeClr val="bg1"/>
+                          </a:solidFill>
+                        </a:rPr>
+                        <a:t>1</a:t>
+                      </a:r>
+                      <a:endParaRPr lang="en-GB" sz="900" b="1" dirty="0">
+                        <a:solidFill>
+                          <a:schemeClr val="bg1"/>
+                        </a:solidFill>
+                      </a:endParaRPr>
+                    </a:p>
+                  </a:txBody>
+                  <a:tcPr>
+                    <a:solidFill>
+                      <a:srgbClr val="E9C46A"/>
+                    </a:solidFill>
+                  </a:tcPr>
+                </a:tc>
+                <a:tc>
+                  <a:txBody>
+                    <a:bodyPr/>
+                    <a:lstStyle/>
+                    <a:p>
+                      <a:pPr marL="0" marR="0" lvl="0" indent="0" algn="ctr" defTabSz="914400" rtl="0" eaLnBrk="1" fontAlgn="auto" latinLnBrk="0" hangingPunct="1">
+                        <a:lnSpc>
+                          <a:spcPct val="100000"/>
+                        </a:lnSpc>
+                        <a:spcBef>
+                          <a:spcPts val="0"/>
+                        </a:spcBef>
+                        <a:spcAft>
+                          <a:spcPts val="0"/>
+                        </a:spcAft>
+                        <a:buClrTx/>
+                        <a:buSzTx/>
+                        <a:buFontTx/>
+                        <a:buNone/>
+                        <a:tabLst/>
+                        <a:defRPr/>
+                      </a:pPr>
+                      <a:r>
+                        <a:rPr lang="nl-NL" sz="900" b="1" dirty="0">
+                          <a:solidFill>
+                            <a:schemeClr val="bg1"/>
+                          </a:solidFill>
+                        </a:rPr>
+                        <a:t>0</a:t>
+                      </a:r>
+                      <a:endParaRPr lang="en-GB" sz="900" b="1" dirty="0">
+                        <a:solidFill>
+                          <a:schemeClr val="bg1"/>
+                        </a:solidFill>
+                      </a:endParaRPr>
+                    </a:p>
+                  </a:txBody>
+                  <a:tcPr>
+                    <a:solidFill>
+                      <a:srgbClr val="E9C46A"/>
+                    </a:solidFill>
+                  </a:tcPr>
+                </a:tc>
+                <a:tc>
+                  <a:txBody>
+                    <a:bodyPr/>
+                    <a:lstStyle/>
+                    <a:p>
+                      <a:pPr algn="ctr"/>
+                      <a:r>
+                        <a:rPr lang="nl-NL" sz="900" b="1" dirty="0">
+                          <a:solidFill>
+                            <a:schemeClr val="bg1"/>
+                          </a:solidFill>
+                        </a:rPr>
+                        <a:t>0</a:t>
+                      </a:r>
+                      <a:endParaRPr lang="en-GB" sz="900" b="1" dirty="0">
+                        <a:solidFill>
+                          <a:schemeClr val="bg1"/>
+                        </a:solidFill>
+                      </a:endParaRPr>
+                    </a:p>
+                  </a:txBody>
+                  <a:tcPr>
+                    <a:solidFill>
+                      <a:srgbClr val="E9C46A"/>
+                    </a:solidFill>
+                  </a:tcPr>
+                </a:tc>
+                <a:tc>
+                  <a:txBody>
+                    <a:bodyPr/>
+                    <a:lstStyle/>
+                    <a:p>
+                      <a:pPr marL="0" marR="0" lvl="0" indent="0" algn="ctr" defTabSz="914400" rtl="0" eaLnBrk="1" fontAlgn="auto" latinLnBrk="0" hangingPunct="1">
+                        <a:lnSpc>
+                          <a:spcPct val="100000"/>
+                        </a:lnSpc>
+                        <a:spcBef>
+                          <a:spcPts val="0"/>
+                        </a:spcBef>
+                        <a:spcAft>
+                          <a:spcPts val="0"/>
+                        </a:spcAft>
+                        <a:buClrTx/>
+                        <a:buSzTx/>
+                        <a:buFontTx/>
+                        <a:buNone/>
+                        <a:tabLst/>
+                        <a:defRPr/>
+                      </a:pPr>
+                      <a:r>
+                        <a:rPr kumimoji="0" lang="nl-NL" sz="900" b="1" i="0" u="none" strike="noStrike" kern="1200" cap="none" spc="0" normalizeH="0" baseline="0" noProof="0" dirty="0">
+                          <a:ln>
+                            <a:noFill/>
+                          </a:ln>
+                          <a:solidFill>
+                            <a:prstClr val="white"/>
+                          </a:solidFill>
+                          <a:effectLst/>
+                          <a:uLnTx/>
+                          <a:uFillTx/>
+                          <a:latin typeface="+mn-lt"/>
+                          <a:ea typeface="+mn-ea"/>
+                          <a:cs typeface="+mn-cs"/>
+                        </a:rPr>
+                        <a:t>0</a:t>
+                      </a:r>
+                      <a:endParaRPr lang="en-GB" sz="900" dirty="0"/>
+                    </a:p>
+                  </a:txBody>
+                  <a:tcPr>
+                    <a:solidFill>
+                      <a:srgbClr val="E9C46A"/>
+                    </a:solidFill>
+                  </a:tcPr>
+                </a:tc>
+                <a:tc>
+                  <a:txBody>
+                    <a:bodyPr/>
+                    <a:lstStyle/>
+                    <a:p>
+                      <a:pPr marL="0" marR="0" lvl="0" indent="0" algn="ctr" defTabSz="914400" rtl="0" eaLnBrk="1" fontAlgn="auto" latinLnBrk="0" hangingPunct="1">
+                        <a:lnSpc>
+                          <a:spcPct val="100000"/>
+                        </a:lnSpc>
+                        <a:spcBef>
+                          <a:spcPts val="0"/>
+                        </a:spcBef>
+                        <a:spcAft>
+                          <a:spcPts val="0"/>
+                        </a:spcAft>
+                        <a:buClrTx/>
+                        <a:buSzTx/>
+                        <a:buFontTx/>
+                        <a:buNone/>
+                        <a:tabLst/>
+                        <a:defRPr/>
+                      </a:pPr>
+                      <a:r>
+                        <a:rPr kumimoji="0" lang="nl-NL" sz="900" b="1" i="0" u="none" strike="noStrike" kern="1200" cap="none" spc="0" normalizeH="0" baseline="0" noProof="0" dirty="0">
+                          <a:ln>
+                            <a:noFill/>
+                          </a:ln>
+                          <a:solidFill>
+                            <a:prstClr val="white"/>
+                          </a:solidFill>
+                          <a:effectLst/>
+                          <a:uLnTx/>
+                          <a:uFillTx/>
+                          <a:latin typeface="+mn-lt"/>
+                          <a:ea typeface="+mn-ea"/>
+                          <a:cs typeface="+mn-cs"/>
+                        </a:rPr>
+                        <a:t>1</a:t>
+                      </a:r>
+                      <a:endParaRPr lang="en-GB" sz="900" dirty="0"/>
+                    </a:p>
+                  </a:txBody>
+                  <a:tcPr>
+                    <a:solidFill>
+                      <a:srgbClr val="E9C46A"/>
+                    </a:solidFill>
+                  </a:tcPr>
+                </a:tc>
+                <a:extLst>
+                  <a:ext uri="{0D108BD9-81ED-4DB2-BD59-A6C34878D82A}">
+                    <a16:rowId xmlns:a16="http://schemas.microsoft.com/office/drawing/2014/main" val="2588751137"/>
+                  </a:ext>
+                </a:extLst>
+              </a:tr>
+              <a:tr h="294327">
+                <a:tc>
+                  <a:txBody>
+                    <a:bodyPr/>
+                    <a:lstStyle/>
+                    <a:p>
+                      <a:pPr algn="ctr"/>
+                      <a:r>
+                        <a:rPr lang="nl-NL" sz="900" b="1" dirty="0">
+                          <a:solidFill>
+                            <a:schemeClr val="bg1"/>
+                          </a:solidFill>
+                        </a:rPr>
+                        <a:t>0</a:t>
+                      </a:r>
+                      <a:endParaRPr lang="en-GB" sz="900" b="1" dirty="0">
+                        <a:solidFill>
+                          <a:schemeClr val="bg1"/>
+                        </a:solidFill>
+                      </a:endParaRPr>
+                    </a:p>
+                  </a:txBody>
+                  <a:tcPr>
+                    <a:solidFill>
+                      <a:srgbClr val="E9C46A"/>
+                    </a:solidFill>
+                  </a:tcPr>
+                </a:tc>
+                <a:tc>
+                  <a:txBody>
+                    <a:bodyPr/>
+                    <a:lstStyle/>
+                    <a:p>
+                      <a:pPr algn="ctr"/>
+                      <a:r>
+                        <a:rPr kumimoji="0" lang="nl-NL" sz="900" b="1" i="0" u="none" strike="noStrike" kern="1200" cap="none" spc="0" normalizeH="0" baseline="0" noProof="0" dirty="0">
+                          <a:ln>
+                            <a:noFill/>
+                          </a:ln>
+                          <a:solidFill>
+                            <a:prstClr val="white"/>
+                          </a:solidFill>
+                          <a:effectLst/>
+                          <a:uLnTx/>
+                          <a:uFillTx/>
+                          <a:latin typeface="+mn-lt"/>
+                          <a:ea typeface="+mn-ea"/>
+                          <a:cs typeface="+mn-cs"/>
+                        </a:rPr>
+                        <a:t>1</a:t>
+                      </a:r>
+                      <a:endParaRPr lang="en-GB" sz="900" dirty="0"/>
+                    </a:p>
+                  </a:txBody>
+                  <a:tcPr>
+                    <a:solidFill>
+                      <a:srgbClr val="E9C46A"/>
+                    </a:solidFill>
+                  </a:tcPr>
+                </a:tc>
+                <a:tc>
+                  <a:txBody>
+                    <a:bodyPr/>
+                    <a:lstStyle/>
+                    <a:p>
+                      <a:pPr algn="ctr"/>
+                      <a:r>
+                        <a:rPr lang="nl-NL" sz="900" b="1" dirty="0">
+                          <a:solidFill>
+                            <a:schemeClr val="bg1"/>
+                          </a:solidFill>
+                        </a:rPr>
+                        <a:t>0</a:t>
+                      </a:r>
+                      <a:endParaRPr lang="en-GB" sz="900" b="1" dirty="0">
+                        <a:solidFill>
+                          <a:schemeClr val="bg1"/>
+                        </a:solidFill>
+                      </a:endParaRPr>
+                    </a:p>
+                  </a:txBody>
+                  <a:tcPr>
+                    <a:solidFill>
+                      <a:srgbClr val="E9C46A"/>
+                    </a:solidFill>
+                  </a:tcPr>
+                </a:tc>
+                <a:tc>
+                  <a:txBody>
+                    <a:bodyPr/>
+                    <a:lstStyle/>
+                    <a:p>
+                      <a:pPr algn="ctr"/>
+                      <a:r>
+                        <a:rPr kumimoji="0" lang="nl-NL" sz="900" b="1" i="0" u="none" strike="noStrike" kern="1200" cap="none" spc="0" normalizeH="0" baseline="0" noProof="0" dirty="0">
+                          <a:ln>
+                            <a:noFill/>
+                          </a:ln>
+                          <a:solidFill>
+                            <a:prstClr val="white"/>
+                          </a:solidFill>
+                          <a:effectLst/>
+                          <a:uLnTx/>
+                          <a:uFillTx/>
+                          <a:latin typeface="+mn-lt"/>
+                          <a:ea typeface="+mn-ea"/>
+                          <a:cs typeface="+mn-cs"/>
+                        </a:rPr>
+                        <a:t>1</a:t>
+                      </a:r>
+                      <a:endParaRPr lang="en-GB" sz="900" dirty="0"/>
+                    </a:p>
+                  </a:txBody>
+                  <a:tcPr>
+                    <a:solidFill>
+                      <a:srgbClr val="E9C46A"/>
+                    </a:solidFill>
+                  </a:tcPr>
+                </a:tc>
+                <a:tc>
+                  <a:txBody>
+                    <a:bodyPr/>
+                    <a:lstStyle/>
+                    <a:p>
+                      <a:pPr algn="ctr"/>
+                      <a:r>
+                        <a:rPr kumimoji="0" lang="nl-NL" sz="900" b="1" i="0" u="none" strike="noStrike" kern="1200" cap="none" spc="0" normalizeH="0" baseline="0" noProof="0" dirty="0">
+                          <a:ln>
+                            <a:noFill/>
+                          </a:ln>
+                          <a:solidFill>
+                            <a:prstClr val="white"/>
+                          </a:solidFill>
+                          <a:effectLst/>
+                          <a:uLnTx/>
+                          <a:uFillTx/>
+                          <a:latin typeface="+mn-lt"/>
+                          <a:ea typeface="+mn-ea"/>
+                          <a:cs typeface="+mn-cs"/>
+                        </a:rPr>
+                        <a:t>1</a:t>
+                      </a:r>
+                      <a:endParaRPr lang="en-GB" sz="900" dirty="0"/>
+                    </a:p>
+                  </a:txBody>
+                  <a:tcPr>
+                    <a:solidFill>
+                      <a:srgbClr val="E9C46A"/>
+                    </a:solidFill>
+                  </a:tcPr>
+                </a:tc>
+                <a:tc>
+                  <a:txBody>
+                    <a:bodyPr/>
+                    <a:lstStyle/>
+                    <a:p>
+                      <a:pPr algn="ctr"/>
+                      <a:r>
+                        <a:rPr kumimoji="0" lang="nl-NL" sz="900" b="1" i="0" u="none" strike="noStrike" kern="1200" cap="none" spc="0" normalizeH="0" baseline="0" noProof="0" dirty="0">
+                          <a:ln>
+                            <a:noFill/>
+                          </a:ln>
+                          <a:solidFill>
+                            <a:prstClr val="white"/>
+                          </a:solidFill>
+                          <a:effectLst/>
+                          <a:uLnTx/>
+                          <a:uFillTx/>
+                          <a:latin typeface="+mn-lt"/>
+                          <a:ea typeface="+mn-ea"/>
+                          <a:cs typeface="+mn-cs"/>
+                        </a:rPr>
+                        <a:t>1</a:t>
+                      </a:r>
+                      <a:endParaRPr lang="en-GB" sz="900" dirty="0"/>
+                    </a:p>
+                  </a:txBody>
+                  <a:tcPr>
+                    <a:solidFill>
+                      <a:srgbClr val="E9C46A"/>
+                    </a:solidFill>
+                  </a:tcPr>
+                </a:tc>
+                <a:extLst>
+                  <a:ext uri="{0D108BD9-81ED-4DB2-BD59-A6C34878D82A}">
+                    <a16:rowId xmlns:a16="http://schemas.microsoft.com/office/drawing/2014/main" val="672492951"/>
+                  </a:ext>
+                </a:extLst>
+              </a:tr>
+            </a:tbl>
+          </a:graphicData>
+        </a:graphic>
+      </p:graphicFrame>
+      <p:sp>
+        <p:nvSpPr>
+          <p:cNvPr id="14" name="TextBox 13">
+            <a:extLst>
+              <a:ext uri="{FF2B5EF4-FFF2-40B4-BE49-F238E27FC236}">
+                <a16:creationId xmlns:a16="http://schemas.microsoft.com/office/drawing/2014/main" id="{F6259530-32CC-4176-946A-B0C41B5A6FF1}"/>
+              </a:ext>
+            </a:extLst>
+          </p:cNvPr>
+          <p:cNvSpPr txBox="1"/>
+          <p:nvPr/>
+        </p:nvSpPr>
+        <p:spPr>
+          <a:xfrm>
+            <a:off x="3051120" y="1595437"/>
+            <a:ext cx="341902" cy="253916"/>
+          </a:xfrm>
+          <a:prstGeom prst="rect">
+            <a:avLst/>
+          </a:prstGeom>
+          <a:noFill/>
+        </p:spPr>
+        <p:txBody>
+          <a:bodyPr wrap="square" rtlCol="0">
+            <a:spAutoFit/>
+          </a:bodyPr>
+          <a:lstStyle/>
+          <a:p>
+            <a:r>
+              <a:rPr lang="nl-NL" sz="1050" dirty="0"/>
+              <a:t>m</a:t>
+            </a:r>
+            <a:r>
+              <a:rPr lang="nl-NL" sz="1050" baseline="-25000" dirty="0"/>
+              <a:t>1</a:t>
+            </a:r>
+            <a:endParaRPr lang="en-GB" sz="1050" baseline="-25000" dirty="0"/>
+          </a:p>
+        </p:txBody>
+      </p:sp>
+      <p:sp>
+        <p:nvSpPr>
+          <p:cNvPr id="15" name="TextBox 14">
+            <a:extLst>
+              <a:ext uri="{FF2B5EF4-FFF2-40B4-BE49-F238E27FC236}">
+                <a16:creationId xmlns:a16="http://schemas.microsoft.com/office/drawing/2014/main" id="{A4DBCECE-4FE7-441D-B28A-34CBC7AE28CA}"/>
+              </a:ext>
+            </a:extLst>
+          </p:cNvPr>
+          <p:cNvSpPr txBox="1"/>
+          <p:nvPr/>
+        </p:nvSpPr>
+        <p:spPr>
+          <a:xfrm>
+            <a:off x="3393022" y="1595437"/>
+            <a:ext cx="341902" cy="253916"/>
+          </a:xfrm>
+          <a:prstGeom prst="rect">
+            <a:avLst/>
+          </a:prstGeom>
+          <a:noFill/>
+        </p:spPr>
+        <p:txBody>
+          <a:bodyPr wrap="square" rtlCol="0">
+            <a:spAutoFit/>
+          </a:bodyPr>
+          <a:lstStyle/>
+          <a:p>
+            <a:pPr algn="ctr"/>
+            <a:r>
+              <a:rPr lang="nl-NL" sz="1050" dirty="0"/>
+              <a:t>m</a:t>
+            </a:r>
+            <a:r>
+              <a:rPr lang="nl-NL" sz="1050" baseline="-25000" dirty="0"/>
+              <a:t>2</a:t>
+            </a:r>
+            <a:endParaRPr lang="en-GB" sz="1050" baseline="-25000" dirty="0"/>
+          </a:p>
+        </p:txBody>
+      </p:sp>
+      <p:sp>
+        <p:nvSpPr>
+          <p:cNvPr id="16" name="TextBox 15">
+            <a:extLst>
+              <a:ext uri="{FF2B5EF4-FFF2-40B4-BE49-F238E27FC236}">
+                <a16:creationId xmlns:a16="http://schemas.microsoft.com/office/drawing/2014/main" id="{BE60E6EA-9E2E-44F4-80D3-D95D5634D5B5}"/>
+              </a:ext>
+            </a:extLst>
+          </p:cNvPr>
+          <p:cNvSpPr txBox="1"/>
+          <p:nvPr/>
+        </p:nvSpPr>
+        <p:spPr>
+          <a:xfrm>
+            <a:off x="4769990" y="1595437"/>
+            <a:ext cx="341902" cy="253916"/>
+          </a:xfrm>
+          <a:prstGeom prst="rect">
+            <a:avLst/>
+          </a:prstGeom>
+          <a:noFill/>
+        </p:spPr>
+        <p:txBody>
+          <a:bodyPr wrap="square" rtlCol="0">
+            <a:spAutoFit/>
+          </a:bodyPr>
+          <a:lstStyle/>
+          <a:p>
+            <a:pPr algn="ctr"/>
+            <a:r>
+              <a:rPr lang="nl-NL" sz="1050" dirty="0"/>
+              <a:t>m</a:t>
+            </a:r>
+            <a:r>
+              <a:rPr lang="nl-NL" sz="1050" baseline="-25000" dirty="0"/>
+              <a:t>6</a:t>
+            </a:r>
+            <a:endParaRPr lang="en-GB" sz="1050" baseline="-25000" dirty="0"/>
+          </a:p>
+        </p:txBody>
+      </p:sp>
+      <p:sp>
+        <p:nvSpPr>
+          <p:cNvPr id="17" name="TextBox 16">
+            <a:extLst>
+              <a:ext uri="{FF2B5EF4-FFF2-40B4-BE49-F238E27FC236}">
+                <a16:creationId xmlns:a16="http://schemas.microsoft.com/office/drawing/2014/main" id="{91277762-9D4E-4C5C-86DA-CE6EBACF1AAC}"/>
+              </a:ext>
+            </a:extLst>
+          </p:cNvPr>
+          <p:cNvSpPr txBox="1"/>
+          <p:nvPr/>
+        </p:nvSpPr>
+        <p:spPr>
+          <a:xfrm>
+            <a:off x="3738044" y="1595437"/>
+            <a:ext cx="1024458" cy="253916"/>
+          </a:xfrm>
+          <a:prstGeom prst="rect">
+            <a:avLst/>
+          </a:prstGeom>
+          <a:noFill/>
+        </p:spPr>
+        <p:txBody>
+          <a:bodyPr wrap="square" rtlCol="0">
+            <a:spAutoFit/>
+          </a:bodyPr>
+          <a:lstStyle/>
+          <a:p>
+            <a:pPr algn="ctr"/>
+            <a:r>
+              <a:rPr lang="nl-NL" sz="1050" dirty="0"/>
+              <a:t> ….</a:t>
+            </a:r>
+            <a:endParaRPr lang="en-GB" sz="1050" dirty="0"/>
+          </a:p>
+        </p:txBody>
+      </p:sp>
+      <p:graphicFrame>
+        <p:nvGraphicFramePr>
+          <p:cNvPr id="18" name="Table 2">
+            <a:extLst>
+              <a:ext uri="{FF2B5EF4-FFF2-40B4-BE49-F238E27FC236}">
+                <a16:creationId xmlns:a16="http://schemas.microsoft.com/office/drawing/2014/main" id="{9ECCFC2A-E8CA-468D-834E-1B7654E0A593}"/>
+              </a:ext>
+            </a:extLst>
+          </p:cNvPr>
+          <p:cNvGraphicFramePr>
+            <a:graphicFrameLocks noGrp="1"/>
+          </p:cNvGraphicFramePr>
+          <p:nvPr>
+            <p:extLst>
+              <p:ext uri="{D42A27DB-BD31-4B8C-83A1-F6EECF244321}">
+                <p14:modId xmlns:p14="http://schemas.microsoft.com/office/powerpoint/2010/main" val="1335922009"/>
+              </p:ext>
+            </p:extLst>
+          </p:nvPr>
+        </p:nvGraphicFramePr>
+        <p:xfrm>
+          <a:off x="5228975" y="745794"/>
+          <a:ext cx="2056404" cy="882981"/>
+        </p:xfrm>
+        <a:graphic>
+          <a:graphicData uri="http://schemas.openxmlformats.org/drawingml/2006/table">
+            <a:tbl>
+              <a:tblPr>
+                <a:tableStyleId>{5C22544A-7EE6-4342-B048-85BDC9FD1C3A}</a:tableStyleId>
+              </a:tblPr>
+              <a:tblGrid>
+                <a:gridCol w="342734">
+                  <a:extLst>
+                    <a:ext uri="{9D8B030D-6E8A-4147-A177-3AD203B41FA5}">
+                      <a16:colId xmlns:a16="http://schemas.microsoft.com/office/drawing/2014/main" val="1560128604"/>
+                    </a:ext>
+                  </a:extLst>
+                </a:gridCol>
+                <a:gridCol w="342734">
+                  <a:extLst>
+                    <a:ext uri="{9D8B030D-6E8A-4147-A177-3AD203B41FA5}">
+                      <a16:colId xmlns:a16="http://schemas.microsoft.com/office/drawing/2014/main" val="102271791"/>
+                    </a:ext>
+                  </a:extLst>
+                </a:gridCol>
+                <a:gridCol w="342734">
+                  <a:extLst>
+                    <a:ext uri="{9D8B030D-6E8A-4147-A177-3AD203B41FA5}">
+                      <a16:colId xmlns:a16="http://schemas.microsoft.com/office/drawing/2014/main" val="2840650012"/>
+                    </a:ext>
+                  </a:extLst>
+                </a:gridCol>
+                <a:gridCol w="342734">
+                  <a:extLst>
+                    <a:ext uri="{9D8B030D-6E8A-4147-A177-3AD203B41FA5}">
+                      <a16:colId xmlns:a16="http://schemas.microsoft.com/office/drawing/2014/main" val="1125687892"/>
+                    </a:ext>
+                  </a:extLst>
+                </a:gridCol>
+                <a:gridCol w="342734">
+                  <a:extLst>
+                    <a:ext uri="{9D8B030D-6E8A-4147-A177-3AD203B41FA5}">
+                      <a16:colId xmlns:a16="http://schemas.microsoft.com/office/drawing/2014/main" val="2638207405"/>
+                    </a:ext>
+                  </a:extLst>
+                </a:gridCol>
+                <a:gridCol w="342734">
+                  <a:extLst>
+                    <a:ext uri="{9D8B030D-6E8A-4147-A177-3AD203B41FA5}">
+                      <a16:colId xmlns:a16="http://schemas.microsoft.com/office/drawing/2014/main" val="1005752336"/>
+                    </a:ext>
+                  </a:extLst>
+                </a:gridCol>
+              </a:tblGrid>
+              <a:tr h="294327">
+                <a:tc>
+                  <a:txBody>
+                    <a:bodyPr/>
+                    <a:lstStyle/>
+                    <a:p>
+                      <a:pPr algn="ctr"/>
+                      <a:r>
+                        <a:rPr lang="nl-NL" sz="900" dirty="0">
+                          <a:solidFill>
+                            <a:schemeClr val="bg1"/>
+                          </a:solidFill>
+                        </a:rPr>
+                        <a:t>0</a:t>
+                      </a:r>
+                      <a:endParaRPr lang="en-GB" sz="900" dirty="0">
+                        <a:solidFill>
+                          <a:schemeClr val="bg1"/>
+                        </a:solidFill>
+                      </a:endParaRPr>
+                    </a:p>
+                  </a:txBody>
+                  <a:tcPr>
+                    <a:solidFill>
+                      <a:srgbClr val="F4A261"/>
+                    </a:solidFill>
+                  </a:tcPr>
+                </a:tc>
+                <a:tc>
+                  <a:txBody>
+                    <a:bodyPr/>
+                    <a:lstStyle/>
+                    <a:p>
+                      <a:pPr algn="ctr"/>
+                      <a:r>
+                        <a:rPr lang="nl-NL" sz="900" dirty="0">
+                          <a:solidFill>
+                            <a:schemeClr val="bg1"/>
+                          </a:solidFill>
+                        </a:rPr>
+                        <a:t>1</a:t>
+                      </a:r>
+                      <a:endParaRPr lang="en-GB" sz="900" dirty="0">
+                        <a:solidFill>
+                          <a:schemeClr val="bg1"/>
+                        </a:solidFill>
+                      </a:endParaRPr>
+                    </a:p>
+                  </a:txBody>
+                  <a:tcPr>
+                    <a:solidFill>
+                      <a:srgbClr val="F4A261"/>
+                    </a:solidFill>
+                  </a:tcPr>
+                </a:tc>
+                <a:tc>
+                  <a:txBody>
+                    <a:bodyPr/>
+                    <a:lstStyle/>
+                    <a:p>
+                      <a:pPr algn="ctr"/>
+                      <a:r>
+                        <a:rPr kumimoji="0" lang="nl-NL" sz="900" b="1" i="0" u="none" strike="noStrike" kern="1200" cap="none" spc="0" normalizeH="0" baseline="0" noProof="0" dirty="0">
+                          <a:ln>
+                            <a:noFill/>
+                          </a:ln>
+                          <a:solidFill>
+                            <a:schemeClr val="bg1"/>
+                          </a:solidFill>
+                          <a:effectLst/>
+                          <a:uLnTx/>
+                          <a:uFillTx/>
+                          <a:latin typeface="+mn-lt"/>
+                          <a:ea typeface="+mn-ea"/>
+                          <a:cs typeface="+mn-cs"/>
+                        </a:rPr>
+                        <a:t>2</a:t>
+                      </a:r>
+                      <a:endParaRPr lang="en-GB" sz="900" dirty="0">
+                        <a:solidFill>
+                          <a:schemeClr val="bg1"/>
+                        </a:solidFill>
+                      </a:endParaRPr>
+                    </a:p>
+                  </a:txBody>
+                  <a:tcPr>
+                    <a:solidFill>
+                      <a:srgbClr val="F4A261"/>
+                    </a:solidFill>
+                  </a:tcPr>
+                </a:tc>
+                <a:tc>
+                  <a:txBody>
+                    <a:bodyPr/>
+                    <a:lstStyle/>
+                    <a:p>
+                      <a:pPr algn="ctr"/>
+                      <a:r>
+                        <a:rPr kumimoji="0" lang="nl-NL" sz="900" b="1" i="0" u="none" strike="noStrike" kern="1200" cap="none" spc="0" normalizeH="0" baseline="0" noProof="0" dirty="0">
+                          <a:ln>
+                            <a:noFill/>
+                          </a:ln>
+                          <a:solidFill>
+                            <a:schemeClr val="bg1"/>
+                          </a:solidFill>
+                          <a:effectLst/>
+                          <a:uLnTx/>
+                          <a:uFillTx/>
+                          <a:latin typeface="+mn-lt"/>
+                          <a:ea typeface="+mn-ea"/>
+                          <a:cs typeface="+mn-cs"/>
+                        </a:rPr>
+                        <a:t>3</a:t>
+                      </a:r>
+                      <a:endParaRPr lang="en-GB" sz="900" dirty="0">
+                        <a:solidFill>
+                          <a:schemeClr val="bg1"/>
+                        </a:solidFill>
+                      </a:endParaRPr>
+                    </a:p>
+                  </a:txBody>
+                  <a:tcPr>
+                    <a:solidFill>
+                      <a:srgbClr val="F4A261"/>
+                    </a:solidFill>
+                  </a:tcPr>
+                </a:tc>
+                <a:tc>
+                  <a:txBody>
+                    <a:bodyPr/>
+                    <a:lstStyle/>
+                    <a:p>
+                      <a:pPr algn="ctr"/>
+                      <a:r>
+                        <a:rPr kumimoji="0" lang="nl-NL" sz="900" b="1" i="0" u="none" strike="noStrike" kern="1200" cap="none" spc="0" normalizeH="0" baseline="0" noProof="0" dirty="0">
+                          <a:ln>
+                            <a:noFill/>
+                          </a:ln>
+                          <a:solidFill>
+                            <a:schemeClr val="bg1"/>
+                          </a:solidFill>
+                          <a:effectLst/>
+                          <a:uLnTx/>
+                          <a:uFillTx/>
+                          <a:latin typeface="+mn-lt"/>
+                          <a:ea typeface="+mn-ea"/>
+                          <a:cs typeface="+mn-cs"/>
+                        </a:rPr>
+                        <a:t>1</a:t>
+                      </a:r>
+                      <a:endParaRPr lang="en-GB" sz="900" dirty="0">
+                        <a:solidFill>
+                          <a:schemeClr val="bg1"/>
+                        </a:solidFill>
+                      </a:endParaRPr>
+                    </a:p>
+                  </a:txBody>
+                  <a:tcPr>
+                    <a:solidFill>
+                      <a:srgbClr val="F4A261"/>
+                    </a:solidFill>
+                  </a:tcPr>
+                </a:tc>
+                <a:tc>
+                  <a:txBody>
+                    <a:bodyPr/>
+                    <a:lstStyle/>
+                    <a:p>
+                      <a:pPr algn="ctr"/>
+                      <a:r>
+                        <a:rPr kumimoji="0" lang="nl-NL" sz="900" b="1" i="0" u="none" strike="noStrike" kern="1200" cap="none" spc="0" normalizeH="0" baseline="0" noProof="0" dirty="0">
+                          <a:ln>
+                            <a:noFill/>
+                          </a:ln>
+                          <a:solidFill>
+                            <a:prstClr val="white"/>
+                          </a:solidFill>
+                          <a:effectLst/>
+                          <a:uLnTx/>
+                          <a:uFillTx/>
+                          <a:latin typeface="+mn-lt"/>
+                          <a:ea typeface="+mn-ea"/>
+                          <a:cs typeface="+mn-cs"/>
+                        </a:rPr>
+                        <a:t>1</a:t>
+                      </a:r>
+                      <a:endParaRPr lang="en-GB" sz="900" dirty="0"/>
+                    </a:p>
+                  </a:txBody>
+                  <a:tcPr>
+                    <a:solidFill>
+                      <a:srgbClr val="F4A261"/>
+                    </a:solidFill>
+                  </a:tcPr>
+                </a:tc>
+                <a:extLst>
+                  <a:ext uri="{0D108BD9-81ED-4DB2-BD59-A6C34878D82A}">
+                    <a16:rowId xmlns:a16="http://schemas.microsoft.com/office/drawing/2014/main" val="893204045"/>
+                  </a:ext>
+                </a:extLst>
+              </a:tr>
+              <a:tr h="294327">
+                <a:tc>
+                  <a:txBody>
+                    <a:bodyPr/>
+                    <a:lstStyle/>
+                    <a:p>
+                      <a:pPr algn="ctr"/>
+                      <a:r>
+                        <a:rPr kumimoji="0" lang="nl-NL" sz="900" b="1" i="0" u="none" strike="noStrike" kern="1200" cap="none" spc="0" normalizeH="0" baseline="0" noProof="0" dirty="0">
+                          <a:ln>
+                            <a:noFill/>
+                          </a:ln>
+                          <a:solidFill>
+                            <a:prstClr val="white"/>
+                          </a:solidFill>
+                          <a:effectLst/>
+                          <a:uLnTx/>
+                          <a:uFillTx/>
+                          <a:latin typeface="+mn-lt"/>
+                          <a:ea typeface="+mn-ea"/>
+                          <a:cs typeface="+mn-cs"/>
+                        </a:rPr>
+                        <a:t>0</a:t>
+                      </a:r>
+                      <a:endParaRPr lang="en-GB" sz="900" dirty="0"/>
+                    </a:p>
+                  </a:txBody>
+                  <a:tcPr>
+                    <a:solidFill>
+                      <a:srgbClr val="F4A261"/>
+                    </a:solidFill>
+                  </a:tcPr>
+                </a:tc>
+                <a:tc>
+                  <a:txBody>
+                    <a:bodyPr/>
+                    <a:lstStyle/>
+                    <a:p>
+                      <a:pPr algn="ctr"/>
+                      <a:r>
+                        <a:rPr lang="nl-NL" sz="900" b="1" dirty="0">
+                          <a:solidFill>
+                            <a:schemeClr val="bg1"/>
+                          </a:solidFill>
+                        </a:rPr>
+                        <a:t>1</a:t>
+                      </a:r>
+                      <a:endParaRPr lang="en-GB" sz="900" b="1" dirty="0">
+                        <a:solidFill>
+                          <a:schemeClr val="bg1"/>
+                        </a:solidFill>
+                      </a:endParaRPr>
+                    </a:p>
+                  </a:txBody>
+                  <a:tcPr>
+                    <a:solidFill>
+                      <a:srgbClr val="F4A261"/>
+                    </a:solidFill>
+                  </a:tcPr>
+                </a:tc>
+                <a:tc>
+                  <a:txBody>
+                    <a:bodyPr/>
+                    <a:lstStyle/>
+                    <a:p>
+                      <a:pPr marL="0" marR="0" lvl="0" indent="0" algn="ctr" defTabSz="914400" rtl="0" eaLnBrk="1" fontAlgn="auto" latinLnBrk="0" hangingPunct="1">
+                        <a:lnSpc>
+                          <a:spcPct val="100000"/>
+                        </a:lnSpc>
+                        <a:spcBef>
+                          <a:spcPts val="0"/>
+                        </a:spcBef>
+                        <a:spcAft>
+                          <a:spcPts val="0"/>
+                        </a:spcAft>
+                        <a:buClrTx/>
+                        <a:buSzTx/>
+                        <a:buFontTx/>
+                        <a:buNone/>
+                        <a:tabLst/>
+                        <a:defRPr/>
+                      </a:pPr>
+                      <a:r>
+                        <a:rPr lang="nl-NL" sz="900" b="1" dirty="0">
+                          <a:solidFill>
+                            <a:schemeClr val="bg1"/>
+                          </a:solidFill>
+                        </a:rPr>
+                        <a:t>1</a:t>
+                      </a:r>
+                      <a:endParaRPr lang="en-GB" sz="900" b="1" dirty="0">
+                        <a:solidFill>
+                          <a:schemeClr val="bg1"/>
+                        </a:solidFill>
+                      </a:endParaRPr>
+                    </a:p>
+                  </a:txBody>
+                  <a:tcPr>
+                    <a:solidFill>
+                      <a:srgbClr val="F4A261"/>
+                    </a:solidFill>
+                  </a:tcPr>
+                </a:tc>
+                <a:tc>
+                  <a:txBody>
+                    <a:bodyPr/>
+                    <a:lstStyle/>
+                    <a:p>
+                      <a:pPr algn="ctr"/>
+                      <a:r>
+                        <a:rPr lang="nl-NL" sz="900" b="1" dirty="0">
+                          <a:solidFill>
+                            <a:schemeClr val="bg1"/>
+                          </a:solidFill>
+                        </a:rPr>
+                        <a:t>2</a:t>
+                      </a:r>
+                      <a:endParaRPr lang="en-GB" sz="900" b="1" dirty="0">
+                        <a:solidFill>
+                          <a:schemeClr val="bg1"/>
+                        </a:solidFill>
+                      </a:endParaRPr>
+                    </a:p>
+                  </a:txBody>
+                  <a:tcPr>
+                    <a:solidFill>
+                      <a:srgbClr val="F4A261"/>
+                    </a:solidFill>
+                  </a:tcPr>
+                </a:tc>
+                <a:tc>
+                  <a:txBody>
+                    <a:bodyPr/>
+                    <a:lstStyle/>
+                    <a:p>
+                      <a:pPr marL="0" marR="0" lvl="0" indent="0" algn="ctr" defTabSz="914400" rtl="0" eaLnBrk="1" fontAlgn="auto" latinLnBrk="0" hangingPunct="1">
+                        <a:lnSpc>
+                          <a:spcPct val="100000"/>
+                        </a:lnSpc>
+                        <a:spcBef>
+                          <a:spcPts val="0"/>
+                        </a:spcBef>
+                        <a:spcAft>
+                          <a:spcPts val="0"/>
+                        </a:spcAft>
+                        <a:buClrTx/>
+                        <a:buSzTx/>
+                        <a:buFontTx/>
+                        <a:buNone/>
+                        <a:tabLst/>
+                        <a:defRPr/>
+                      </a:pPr>
+                      <a:r>
+                        <a:rPr kumimoji="0" lang="nl-NL" sz="900" b="1" i="0" u="none" strike="noStrike" kern="1200" cap="none" spc="0" normalizeH="0" baseline="0" noProof="0" dirty="0">
+                          <a:ln>
+                            <a:noFill/>
+                          </a:ln>
+                          <a:solidFill>
+                            <a:prstClr val="white"/>
+                          </a:solidFill>
+                          <a:effectLst/>
+                          <a:uLnTx/>
+                          <a:uFillTx/>
+                          <a:latin typeface="+mn-lt"/>
+                          <a:ea typeface="+mn-ea"/>
+                          <a:cs typeface="+mn-cs"/>
+                        </a:rPr>
+                        <a:t>3</a:t>
+                      </a:r>
+                      <a:endParaRPr lang="en-GB" sz="900" dirty="0"/>
+                    </a:p>
+                  </a:txBody>
+                  <a:tcPr>
+                    <a:solidFill>
+                      <a:srgbClr val="F4A261"/>
+                    </a:solidFill>
+                  </a:tcPr>
+                </a:tc>
+                <a:tc>
+                  <a:txBody>
+                    <a:bodyPr/>
+                    <a:lstStyle/>
+                    <a:p>
+                      <a:pPr marL="0" marR="0" lvl="0" indent="0" algn="ctr" defTabSz="914400" rtl="0" eaLnBrk="1" fontAlgn="auto" latinLnBrk="0" hangingPunct="1">
+                        <a:lnSpc>
+                          <a:spcPct val="100000"/>
+                        </a:lnSpc>
+                        <a:spcBef>
+                          <a:spcPts val="0"/>
+                        </a:spcBef>
+                        <a:spcAft>
+                          <a:spcPts val="0"/>
+                        </a:spcAft>
+                        <a:buClrTx/>
+                        <a:buSzTx/>
+                        <a:buFontTx/>
+                        <a:buNone/>
+                        <a:tabLst/>
+                        <a:defRPr/>
+                      </a:pPr>
+                      <a:r>
+                        <a:rPr kumimoji="0" lang="nl-NL" sz="900" b="1" i="0" u="none" strike="noStrike" kern="1200" cap="none" spc="0" normalizeH="0" baseline="0" noProof="0" dirty="0">
+                          <a:ln>
+                            <a:noFill/>
+                          </a:ln>
+                          <a:solidFill>
+                            <a:prstClr val="white"/>
+                          </a:solidFill>
+                          <a:effectLst/>
+                          <a:uLnTx/>
+                          <a:uFillTx/>
+                          <a:latin typeface="+mn-lt"/>
+                          <a:ea typeface="+mn-ea"/>
+                          <a:cs typeface="+mn-cs"/>
+                        </a:rPr>
+                        <a:t>4</a:t>
+                      </a:r>
+                      <a:endParaRPr lang="en-GB" sz="900" dirty="0"/>
+                    </a:p>
+                  </a:txBody>
+                  <a:tcPr>
+                    <a:solidFill>
+                      <a:srgbClr val="F4A261"/>
+                    </a:solidFill>
+                  </a:tcPr>
+                </a:tc>
+                <a:extLst>
+                  <a:ext uri="{0D108BD9-81ED-4DB2-BD59-A6C34878D82A}">
+                    <a16:rowId xmlns:a16="http://schemas.microsoft.com/office/drawing/2014/main" val="2588751137"/>
+                  </a:ext>
+                </a:extLst>
+              </a:tr>
+              <a:tr h="294327">
+                <a:tc>
+                  <a:txBody>
+                    <a:bodyPr/>
+                    <a:lstStyle/>
+                    <a:p>
+                      <a:pPr algn="ctr"/>
+                      <a:r>
+                        <a:rPr lang="nl-NL" sz="900" b="1" dirty="0">
+                          <a:solidFill>
+                            <a:schemeClr val="bg1"/>
+                          </a:solidFill>
+                        </a:rPr>
+                        <a:t>0</a:t>
+                      </a:r>
+                      <a:endParaRPr lang="en-GB" sz="900" b="1" dirty="0">
+                        <a:solidFill>
+                          <a:schemeClr val="bg1"/>
+                        </a:solidFill>
+                      </a:endParaRPr>
+                    </a:p>
+                  </a:txBody>
+                  <a:tcPr>
+                    <a:solidFill>
+                      <a:srgbClr val="F4A261"/>
+                    </a:solidFill>
+                  </a:tcPr>
+                </a:tc>
+                <a:tc>
+                  <a:txBody>
+                    <a:bodyPr/>
+                    <a:lstStyle/>
+                    <a:p>
+                      <a:pPr algn="ctr"/>
+                      <a:r>
+                        <a:rPr kumimoji="0" lang="nl-NL" sz="900" b="1" i="0" u="none" strike="noStrike" kern="1200" cap="none" spc="0" normalizeH="0" baseline="0" noProof="0" dirty="0">
+                          <a:ln>
+                            <a:noFill/>
+                          </a:ln>
+                          <a:solidFill>
+                            <a:prstClr val="white"/>
+                          </a:solidFill>
+                          <a:effectLst/>
+                          <a:uLnTx/>
+                          <a:uFillTx/>
+                          <a:latin typeface="+mn-lt"/>
+                          <a:ea typeface="+mn-ea"/>
+                          <a:cs typeface="+mn-cs"/>
+                        </a:rPr>
+                        <a:t>1</a:t>
+                      </a:r>
+                      <a:endParaRPr lang="en-GB" sz="900" dirty="0"/>
+                    </a:p>
+                  </a:txBody>
+                  <a:tcPr>
+                    <a:solidFill>
+                      <a:srgbClr val="F4A261"/>
+                    </a:solidFill>
+                  </a:tcPr>
+                </a:tc>
+                <a:tc>
+                  <a:txBody>
+                    <a:bodyPr/>
+                    <a:lstStyle/>
+                    <a:p>
+                      <a:pPr algn="ctr"/>
+                      <a:r>
+                        <a:rPr lang="nl-NL" sz="900" b="1" dirty="0">
+                          <a:solidFill>
+                            <a:schemeClr val="bg1"/>
+                          </a:solidFill>
+                        </a:rPr>
+                        <a:t>1</a:t>
+                      </a:r>
+                      <a:endParaRPr lang="en-GB" sz="900" b="1" dirty="0">
+                        <a:solidFill>
+                          <a:schemeClr val="bg1"/>
+                        </a:solidFill>
+                      </a:endParaRPr>
+                    </a:p>
+                  </a:txBody>
+                  <a:tcPr>
+                    <a:solidFill>
+                      <a:srgbClr val="F4A261"/>
+                    </a:solidFill>
+                  </a:tcPr>
+                </a:tc>
+                <a:tc>
+                  <a:txBody>
+                    <a:bodyPr/>
+                    <a:lstStyle/>
+                    <a:p>
+                      <a:pPr algn="ctr"/>
+                      <a:r>
+                        <a:rPr kumimoji="0" lang="nl-NL" sz="900" b="1" i="0" u="none" strike="noStrike" kern="1200" cap="none" spc="0" normalizeH="0" baseline="0" noProof="0" dirty="0">
+                          <a:ln>
+                            <a:noFill/>
+                          </a:ln>
+                          <a:solidFill>
+                            <a:prstClr val="white"/>
+                          </a:solidFill>
+                          <a:effectLst/>
+                          <a:uLnTx/>
+                          <a:uFillTx/>
+                          <a:latin typeface="+mn-lt"/>
+                          <a:ea typeface="+mn-ea"/>
+                          <a:cs typeface="+mn-cs"/>
+                        </a:rPr>
+                        <a:t>2</a:t>
+                      </a:r>
+                      <a:endParaRPr lang="en-GB" sz="900" dirty="0"/>
+                    </a:p>
+                  </a:txBody>
+                  <a:tcPr>
+                    <a:solidFill>
+                      <a:srgbClr val="F4A261"/>
+                    </a:solidFill>
+                  </a:tcPr>
+                </a:tc>
+                <a:tc>
+                  <a:txBody>
+                    <a:bodyPr/>
+                    <a:lstStyle/>
+                    <a:p>
+                      <a:pPr algn="ctr"/>
+                      <a:r>
+                        <a:rPr kumimoji="0" lang="nl-NL" sz="900" b="1" i="0" u="none" strike="noStrike" kern="1200" cap="none" spc="0" normalizeH="0" baseline="0" noProof="0" dirty="0">
+                          <a:ln>
+                            <a:noFill/>
+                          </a:ln>
+                          <a:solidFill>
+                            <a:prstClr val="white"/>
+                          </a:solidFill>
+                          <a:effectLst/>
+                          <a:uLnTx/>
+                          <a:uFillTx/>
+                          <a:latin typeface="+mn-lt"/>
+                          <a:ea typeface="+mn-ea"/>
+                          <a:cs typeface="+mn-cs"/>
+                        </a:rPr>
+                        <a:t>1</a:t>
+                      </a:r>
+                      <a:endParaRPr lang="en-GB" sz="900" dirty="0"/>
+                    </a:p>
+                  </a:txBody>
+                  <a:tcPr>
+                    <a:solidFill>
+                      <a:srgbClr val="F4A261"/>
+                    </a:solidFill>
+                  </a:tcPr>
+                </a:tc>
+                <a:tc>
+                  <a:txBody>
+                    <a:bodyPr/>
+                    <a:lstStyle/>
+                    <a:p>
+                      <a:pPr algn="ctr"/>
+                      <a:r>
+                        <a:rPr kumimoji="0" lang="nl-NL" sz="900" b="1" i="0" u="none" strike="noStrike" kern="1200" cap="none" spc="0" normalizeH="0" baseline="0" noProof="0" dirty="0">
+                          <a:ln>
+                            <a:noFill/>
+                          </a:ln>
+                          <a:solidFill>
+                            <a:prstClr val="white"/>
+                          </a:solidFill>
+                          <a:effectLst/>
+                          <a:uLnTx/>
+                          <a:uFillTx/>
+                          <a:latin typeface="+mn-lt"/>
+                          <a:ea typeface="+mn-ea"/>
+                          <a:cs typeface="+mn-cs"/>
+                        </a:rPr>
+                        <a:t>1</a:t>
+                      </a:r>
+                      <a:endParaRPr lang="en-GB" sz="900" dirty="0"/>
+                    </a:p>
+                  </a:txBody>
+                  <a:tcPr>
+                    <a:solidFill>
+                      <a:srgbClr val="F4A261"/>
+                    </a:solidFill>
+                  </a:tcPr>
+                </a:tc>
+                <a:extLst>
+                  <a:ext uri="{0D108BD9-81ED-4DB2-BD59-A6C34878D82A}">
+                    <a16:rowId xmlns:a16="http://schemas.microsoft.com/office/drawing/2014/main" val="672492951"/>
+                  </a:ext>
+                </a:extLst>
+              </a:tr>
+            </a:tbl>
+          </a:graphicData>
+        </a:graphic>
+      </p:graphicFrame>
+      <p:sp>
+        <p:nvSpPr>
+          <p:cNvPr id="19" name="TextBox 18">
+            <a:extLst>
+              <a:ext uri="{FF2B5EF4-FFF2-40B4-BE49-F238E27FC236}">
+                <a16:creationId xmlns:a16="http://schemas.microsoft.com/office/drawing/2014/main" id="{95F3F483-3BB5-4B08-BD1A-301DE1D9F981}"/>
+              </a:ext>
+            </a:extLst>
+          </p:cNvPr>
+          <p:cNvSpPr txBox="1"/>
+          <p:nvPr/>
+        </p:nvSpPr>
+        <p:spPr>
+          <a:xfrm>
+            <a:off x="5263998" y="1595437"/>
+            <a:ext cx="341902" cy="253916"/>
+          </a:xfrm>
+          <a:prstGeom prst="rect">
+            <a:avLst/>
+          </a:prstGeom>
+          <a:noFill/>
+        </p:spPr>
+        <p:txBody>
+          <a:bodyPr wrap="square" rtlCol="0">
+            <a:spAutoFit/>
+          </a:bodyPr>
+          <a:lstStyle/>
+          <a:p>
+            <a:r>
+              <a:rPr lang="el-GR" sz="1050" dirty="0"/>
+              <a:t>δ</a:t>
+            </a:r>
+            <a:r>
+              <a:rPr lang="nl-NL" sz="1050" baseline="-25000" dirty="0"/>
+              <a:t>1</a:t>
+            </a:r>
+            <a:endParaRPr lang="en-GB" sz="1050" baseline="-25000" dirty="0"/>
+          </a:p>
+        </p:txBody>
+      </p:sp>
+      <p:sp>
+        <p:nvSpPr>
+          <p:cNvPr id="20" name="TextBox 19">
+            <a:extLst>
+              <a:ext uri="{FF2B5EF4-FFF2-40B4-BE49-F238E27FC236}">
+                <a16:creationId xmlns:a16="http://schemas.microsoft.com/office/drawing/2014/main" id="{DEB06901-DD32-4B15-8A18-853A1AC911FE}"/>
+              </a:ext>
+            </a:extLst>
+          </p:cNvPr>
+          <p:cNvSpPr txBox="1"/>
+          <p:nvPr/>
+        </p:nvSpPr>
+        <p:spPr>
+          <a:xfrm>
+            <a:off x="5640922" y="1595437"/>
+            <a:ext cx="341902" cy="253916"/>
+          </a:xfrm>
+          <a:prstGeom prst="rect">
+            <a:avLst/>
+          </a:prstGeom>
+          <a:noFill/>
+        </p:spPr>
+        <p:txBody>
+          <a:bodyPr wrap="square" rtlCol="0">
+            <a:spAutoFit/>
+          </a:bodyPr>
+          <a:lstStyle/>
+          <a:p>
+            <a:pPr algn="ctr"/>
+            <a:r>
+              <a:rPr lang="el-GR" sz="1050" dirty="0"/>
+              <a:t>δ</a:t>
+            </a:r>
+            <a:r>
+              <a:rPr lang="nl-NL" sz="1050" baseline="-25000" dirty="0"/>
+              <a:t>2</a:t>
+            </a:r>
+            <a:endParaRPr lang="en-GB" sz="1050" baseline="-25000" dirty="0"/>
+          </a:p>
+        </p:txBody>
+      </p:sp>
+      <p:sp>
+        <p:nvSpPr>
+          <p:cNvPr id="21" name="TextBox 20">
+            <a:extLst>
+              <a:ext uri="{FF2B5EF4-FFF2-40B4-BE49-F238E27FC236}">
+                <a16:creationId xmlns:a16="http://schemas.microsoft.com/office/drawing/2014/main" id="{6B3BBDC0-7975-4279-9033-F37A5F1DAD44}"/>
+              </a:ext>
+            </a:extLst>
+          </p:cNvPr>
+          <p:cNvSpPr txBox="1"/>
+          <p:nvPr/>
+        </p:nvSpPr>
+        <p:spPr>
+          <a:xfrm>
+            <a:off x="7017890" y="1595437"/>
+            <a:ext cx="341902" cy="253916"/>
+          </a:xfrm>
+          <a:prstGeom prst="rect">
+            <a:avLst/>
+          </a:prstGeom>
+          <a:noFill/>
+        </p:spPr>
+        <p:txBody>
+          <a:bodyPr wrap="square" rtlCol="0">
+            <a:spAutoFit/>
+          </a:bodyPr>
+          <a:lstStyle/>
+          <a:p>
+            <a:pPr algn="ctr"/>
+            <a:r>
+              <a:rPr lang="el-GR" sz="1050" dirty="0"/>
+              <a:t>δ</a:t>
+            </a:r>
+            <a:r>
+              <a:rPr lang="nl-NL" sz="1050" baseline="-25000" dirty="0"/>
+              <a:t>6</a:t>
+            </a:r>
+            <a:endParaRPr lang="en-GB" sz="1050" baseline="-25000" dirty="0"/>
+          </a:p>
+        </p:txBody>
+      </p:sp>
+      <p:sp>
+        <p:nvSpPr>
+          <p:cNvPr id="22" name="TextBox 21">
+            <a:extLst>
+              <a:ext uri="{FF2B5EF4-FFF2-40B4-BE49-F238E27FC236}">
+                <a16:creationId xmlns:a16="http://schemas.microsoft.com/office/drawing/2014/main" id="{26BEA48D-3B29-4932-97EE-30D76871255F}"/>
+              </a:ext>
+            </a:extLst>
+          </p:cNvPr>
+          <p:cNvSpPr txBox="1"/>
+          <p:nvPr/>
+        </p:nvSpPr>
+        <p:spPr>
+          <a:xfrm>
+            <a:off x="5985944" y="1595437"/>
+            <a:ext cx="1024458" cy="253916"/>
+          </a:xfrm>
+          <a:prstGeom prst="rect">
+            <a:avLst/>
+          </a:prstGeom>
+          <a:noFill/>
+        </p:spPr>
+        <p:txBody>
+          <a:bodyPr wrap="square" rtlCol="0">
+            <a:spAutoFit/>
+          </a:bodyPr>
+          <a:lstStyle/>
+          <a:p>
+            <a:pPr algn="ctr"/>
+            <a:r>
+              <a:rPr lang="nl-NL" sz="1050" dirty="0"/>
+              <a:t> ….</a:t>
+            </a:r>
+            <a:endParaRPr lang="en-GB" sz="1050" dirty="0"/>
+          </a:p>
+        </p:txBody>
+      </p:sp>
+    </p:spTree>
+    <p:extLst>
+      <p:ext uri="{BB962C8B-B14F-4D97-AF65-F5344CB8AC3E}">
+        <p14:creationId xmlns:p14="http://schemas.microsoft.com/office/powerpoint/2010/main" val="2530287577"/>
       </p:ext>
     </p:extLst>
   </p:cSld>

</xml_diff>

<commit_message>
finish code to run parameter optimizations
</commit_message>
<xml_diff>
--- a/latex/figures/Figure_sliding_window.pptx
+++ b/latex/figures/Figure_sliding_window.pptx
@@ -7,7 +7,8 @@
   <p:sldIdLst>
     <p:sldId id="257" r:id="rId2"/>
     <p:sldId id="258" r:id="rId3"/>
-    <p:sldId id="259" r:id="rId4"/>
+    <p:sldId id="260" r:id="rId4"/>
+    <p:sldId id="259" r:id="rId5"/>
   </p:sldIdLst>
   <p:sldSz cx="12192000" cy="6858000"/>
   <p:notesSz cx="6858000" cy="9144000"/>
@@ -275,7 +276,7 @@
           <a:p>
             <a:fld id="{FE8B34FF-EFE3-4FA3-92AF-5A48E8DC23C8}" type="datetimeFigureOut">
               <a:rPr lang="en-GB" smtClean="0"/>
-              <a:t>17/05/2021</a:t>
+              <a:t>23/07/2021</a:t>
             </a:fld>
             <a:endParaRPr lang="en-GB"/>
           </a:p>
@@ -475,7 +476,7 @@
           <a:p>
             <a:fld id="{FE8B34FF-EFE3-4FA3-92AF-5A48E8DC23C8}" type="datetimeFigureOut">
               <a:rPr lang="en-GB" smtClean="0"/>
-              <a:t>17/05/2021</a:t>
+              <a:t>23/07/2021</a:t>
             </a:fld>
             <a:endParaRPr lang="en-GB"/>
           </a:p>
@@ -685,7 +686,7 @@
           <a:p>
             <a:fld id="{FE8B34FF-EFE3-4FA3-92AF-5A48E8DC23C8}" type="datetimeFigureOut">
               <a:rPr lang="en-GB" smtClean="0"/>
-              <a:t>17/05/2021</a:t>
+              <a:t>23/07/2021</a:t>
             </a:fld>
             <a:endParaRPr lang="en-GB"/>
           </a:p>
@@ -885,7 +886,7 @@
           <a:p>
             <a:fld id="{FE8B34FF-EFE3-4FA3-92AF-5A48E8DC23C8}" type="datetimeFigureOut">
               <a:rPr lang="en-GB" smtClean="0"/>
-              <a:t>17/05/2021</a:t>
+              <a:t>23/07/2021</a:t>
             </a:fld>
             <a:endParaRPr lang="en-GB"/>
           </a:p>
@@ -1161,7 +1162,7 @@
           <a:p>
             <a:fld id="{FE8B34FF-EFE3-4FA3-92AF-5A48E8DC23C8}" type="datetimeFigureOut">
               <a:rPr lang="en-GB" smtClean="0"/>
-              <a:t>17/05/2021</a:t>
+              <a:t>23/07/2021</a:t>
             </a:fld>
             <a:endParaRPr lang="en-GB"/>
           </a:p>
@@ -1429,7 +1430,7 @@
           <a:p>
             <a:fld id="{FE8B34FF-EFE3-4FA3-92AF-5A48E8DC23C8}" type="datetimeFigureOut">
               <a:rPr lang="en-GB" smtClean="0"/>
-              <a:t>17/05/2021</a:t>
+              <a:t>23/07/2021</a:t>
             </a:fld>
             <a:endParaRPr lang="en-GB"/>
           </a:p>
@@ -1844,7 +1845,7 @@
           <a:p>
             <a:fld id="{FE8B34FF-EFE3-4FA3-92AF-5A48E8DC23C8}" type="datetimeFigureOut">
               <a:rPr lang="en-GB" smtClean="0"/>
-              <a:t>17/05/2021</a:t>
+              <a:t>23/07/2021</a:t>
             </a:fld>
             <a:endParaRPr lang="en-GB"/>
           </a:p>
@@ -1986,7 +1987,7 @@
           <a:p>
             <a:fld id="{FE8B34FF-EFE3-4FA3-92AF-5A48E8DC23C8}" type="datetimeFigureOut">
               <a:rPr lang="en-GB" smtClean="0"/>
-              <a:t>17/05/2021</a:t>
+              <a:t>23/07/2021</a:t>
             </a:fld>
             <a:endParaRPr lang="en-GB"/>
           </a:p>
@@ -2099,7 +2100,7 @@
           <a:p>
             <a:fld id="{FE8B34FF-EFE3-4FA3-92AF-5A48E8DC23C8}" type="datetimeFigureOut">
               <a:rPr lang="en-GB" smtClean="0"/>
-              <a:t>17/05/2021</a:t>
+              <a:t>23/07/2021</a:t>
             </a:fld>
             <a:endParaRPr lang="en-GB"/>
           </a:p>
@@ -2412,7 +2413,7 @@
           <a:p>
             <a:fld id="{FE8B34FF-EFE3-4FA3-92AF-5A48E8DC23C8}" type="datetimeFigureOut">
               <a:rPr lang="en-GB" smtClean="0"/>
-              <a:t>17/05/2021</a:t>
+              <a:t>23/07/2021</a:t>
             </a:fld>
             <a:endParaRPr lang="en-GB"/>
           </a:p>
@@ -2701,7 +2702,7 @@
           <a:p>
             <a:fld id="{FE8B34FF-EFE3-4FA3-92AF-5A48E8DC23C8}" type="datetimeFigureOut">
               <a:rPr lang="en-GB" smtClean="0"/>
-              <a:t>17/05/2021</a:t>
+              <a:t>23/07/2021</a:t>
             </a:fld>
             <a:endParaRPr lang="en-GB"/>
           </a:p>
@@ -2944,7 +2945,7 @@
           <a:p>
             <a:fld id="{FE8B34FF-EFE3-4FA3-92AF-5A48E8DC23C8}" type="datetimeFigureOut">
               <a:rPr lang="en-GB" smtClean="0"/>
-              <a:t>17/05/2021</a:t>
+              <a:t>23/07/2021</a:t>
             </a:fld>
             <a:endParaRPr lang="en-GB"/>
           </a:p>
@@ -11896,6 +11897,110 @@
           </a:p>
         </p:txBody>
       </p:sp>
+      <p:sp>
+        <p:nvSpPr>
+          <p:cNvPr id="107" name="Rectangle 106">
+            <a:extLst>
+              <a:ext uri="{FF2B5EF4-FFF2-40B4-BE49-F238E27FC236}">
+                <a16:creationId xmlns:a16="http://schemas.microsoft.com/office/drawing/2014/main" id="{8956AD73-B2E6-4844-96BF-2389F76B6622}"/>
+              </a:ext>
+            </a:extLst>
+          </p:cNvPr>
+          <p:cNvSpPr/>
+          <p:nvPr/>
+        </p:nvSpPr>
+        <p:spPr>
+          <a:xfrm>
+            <a:off x="3509697" y="2322396"/>
+            <a:ext cx="679720" cy="60171"/>
+          </a:xfrm>
+          <a:prstGeom prst="rect">
+            <a:avLst/>
+          </a:prstGeom>
+          <a:solidFill>
+            <a:srgbClr val="264653"/>
+          </a:solidFill>
+          <a:ln>
+            <a:noFill/>
+          </a:ln>
+        </p:spPr>
+        <p:style>
+          <a:lnRef idx="2">
+            <a:schemeClr val="accent1">
+              <a:shade val="50000"/>
+            </a:schemeClr>
+          </a:lnRef>
+          <a:fillRef idx="1">
+            <a:schemeClr val="accent1"/>
+          </a:fillRef>
+          <a:effectRef idx="0">
+            <a:schemeClr val="accent1"/>
+          </a:effectRef>
+          <a:fontRef idx="minor">
+            <a:schemeClr val="lt1"/>
+          </a:fontRef>
+        </p:style>
+        <p:txBody>
+          <a:bodyPr rtlCol="0" anchor="ctr"/>
+          <a:lstStyle/>
+          <a:p>
+            <a:pPr algn="ctr"/>
+            <a:endParaRPr lang="en-GB"/>
+          </a:p>
+        </p:txBody>
+      </p:sp>
+      <p:sp>
+        <p:nvSpPr>
+          <p:cNvPr id="108" name="Rectangle 107">
+            <a:extLst>
+              <a:ext uri="{FF2B5EF4-FFF2-40B4-BE49-F238E27FC236}">
+                <a16:creationId xmlns:a16="http://schemas.microsoft.com/office/drawing/2014/main" id="{D7E100C4-4514-4B06-BAE3-FC2F58CFCC66}"/>
+              </a:ext>
+            </a:extLst>
+          </p:cNvPr>
+          <p:cNvSpPr/>
+          <p:nvPr/>
+        </p:nvSpPr>
+        <p:spPr>
+          <a:xfrm>
+            <a:off x="3662097" y="2474796"/>
+            <a:ext cx="679720" cy="60171"/>
+          </a:xfrm>
+          <a:prstGeom prst="rect">
+            <a:avLst/>
+          </a:prstGeom>
+          <a:solidFill>
+            <a:srgbClr val="264653"/>
+          </a:solidFill>
+          <a:ln>
+            <a:noFill/>
+          </a:ln>
+        </p:spPr>
+        <p:style>
+          <a:lnRef idx="2">
+            <a:schemeClr val="accent1">
+              <a:shade val="50000"/>
+            </a:schemeClr>
+          </a:lnRef>
+          <a:fillRef idx="1">
+            <a:schemeClr val="accent1"/>
+          </a:fillRef>
+          <a:effectRef idx="0">
+            <a:schemeClr val="accent1"/>
+          </a:effectRef>
+          <a:fontRef idx="minor">
+            <a:schemeClr val="lt1"/>
+          </a:fontRef>
+        </p:style>
+        <p:txBody>
+          <a:bodyPr rtlCol="0" anchor="ctr"/>
+          <a:lstStyle/>
+          <a:p>
+            <a:pPr algn="ctr"/>
+            <a:endParaRPr lang="en-GB"/>
+          </a:p>
+        </p:txBody>
+      </p:sp>
     </p:spTree>
     <p:extLst>
       <p:ext uri="{BB962C8B-B14F-4D97-AF65-F5344CB8AC3E}">
@@ -11910,6 +12015,4470 @@
 </file>
 
 <file path=ppt/slides/slide3.xml><?xml version="1.0" encoding="utf-8"?>
+<p:sld xmlns:a="http://schemas.openxmlformats.org/drawingml/2006/main" xmlns:r="http://schemas.openxmlformats.org/officeDocument/2006/relationships" xmlns:p="http://schemas.openxmlformats.org/presentationml/2006/main">
+  <p:cSld>
+    <p:spTree>
+      <p:nvGrpSpPr>
+        <p:cNvPr id="1" name=""/>
+        <p:cNvGrpSpPr/>
+        <p:nvPr/>
+      </p:nvGrpSpPr>
+      <p:grpSpPr>
+        <a:xfrm>
+          <a:off x="0" y="0"/>
+          <a:ext cx="0" cy="0"/>
+          <a:chOff x="0" y="0"/>
+          <a:chExt cx="0" cy="0"/>
+        </a:xfrm>
+      </p:grpSpPr>
+      <p:sp>
+        <p:nvSpPr>
+          <p:cNvPr id="2" name="TextBox 1">
+            <a:extLst>
+              <a:ext uri="{FF2B5EF4-FFF2-40B4-BE49-F238E27FC236}">
+                <a16:creationId xmlns:a16="http://schemas.microsoft.com/office/drawing/2014/main" id="{6869EBC8-9AD3-46A1-B242-062B0E934282}"/>
+              </a:ext>
+            </a:extLst>
+          </p:cNvPr>
+          <p:cNvSpPr txBox="1"/>
+          <p:nvPr/>
+        </p:nvSpPr>
+        <p:spPr>
+          <a:xfrm>
+            <a:off x="1726163" y="531845"/>
+            <a:ext cx="653143" cy="307777"/>
+          </a:xfrm>
+          <a:prstGeom prst="rect">
+            <a:avLst/>
+          </a:prstGeom>
+          <a:noFill/>
+          <a:ln>
+            <a:noFill/>
+          </a:ln>
+        </p:spPr>
+        <p:txBody>
+          <a:bodyPr wrap="square" rtlCol="0">
+            <a:spAutoFit/>
+          </a:bodyPr>
+          <a:lstStyle/>
+          <a:p>
+            <a:r>
+              <a:rPr lang="nl-NL" sz="1400" dirty="0"/>
+              <a:t>Time</a:t>
+            </a:r>
+            <a:endParaRPr lang="en-GB" dirty="0"/>
+          </a:p>
+        </p:txBody>
+      </p:sp>
+      <p:cxnSp>
+        <p:nvCxnSpPr>
+          <p:cNvPr id="4" name="Straight Arrow Connector 3">
+            <a:extLst>
+              <a:ext uri="{FF2B5EF4-FFF2-40B4-BE49-F238E27FC236}">
+                <a16:creationId xmlns:a16="http://schemas.microsoft.com/office/drawing/2014/main" id="{15C8B1E4-EAE3-401F-96BD-4845D7337117}"/>
+              </a:ext>
+            </a:extLst>
+          </p:cNvPr>
+          <p:cNvCxnSpPr>
+            <a:cxnSpLocks/>
+          </p:cNvCxnSpPr>
+          <p:nvPr/>
+        </p:nvCxnSpPr>
+        <p:spPr>
+          <a:xfrm flipV="1">
+            <a:off x="1825804" y="895350"/>
+            <a:ext cx="6880046" cy="5827"/>
+          </a:xfrm>
+          <a:prstGeom prst="straightConnector1">
+            <a:avLst/>
+          </a:prstGeom>
+          <a:ln w="38100">
+            <a:solidFill>
+              <a:srgbClr val="264653"/>
+            </a:solidFill>
+            <a:tailEnd type="triangle"/>
+          </a:ln>
+        </p:spPr>
+        <p:style>
+          <a:lnRef idx="1">
+            <a:schemeClr val="accent1"/>
+          </a:lnRef>
+          <a:fillRef idx="0">
+            <a:schemeClr val="accent1"/>
+          </a:fillRef>
+          <a:effectRef idx="0">
+            <a:schemeClr val="accent1"/>
+          </a:effectRef>
+          <a:fontRef idx="minor">
+            <a:schemeClr val="tx1"/>
+          </a:fontRef>
+        </p:style>
+      </p:cxnSp>
+      <p:cxnSp>
+        <p:nvCxnSpPr>
+          <p:cNvPr id="5" name="Straight Arrow Connector 4">
+            <a:extLst>
+              <a:ext uri="{FF2B5EF4-FFF2-40B4-BE49-F238E27FC236}">
+                <a16:creationId xmlns:a16="http://schemas.microsoft.com/office/drawing/2014/main" id="{3F1A8B79-F805-4A5F-A773-0AD505998950}"/>
+              </a:ext>
+            </a:extLst>
+          </p:cNvPr>
+          <p:cNvCxnSpPr>
+            <a:cxnSpLocks/>
+          </p:cNvCxnSpPr>
+          <p:nvPr/>
+        </p:nvCxnSpPr>
+        <p:spPr>
+          <a:xfrm>
+            <a:off x="1825804" y="4148453"/>
+            <a:ext cx="5650504" cy="14651"/>
+          </a:xfrm>
+          <a:prstGeom prst="straightConnector1">
+            <a:avLst/>
+          </a:prstGeom>
+          <a:ln w="28575" cap="flat" cmpd="sng" algn="ctr">
+            <a:solidFill>
+              <a:srgbClr val="E76F51"/>
+            </a:solidFill>
+            <a:prstDash val="sysDot"/>
+            <a:round/>
+            <a:headEnd type="none" w="med" len="med"/>
+            <a:tailEnd type="arrow" w="med" len="med"/>
+          </a:ln>
+        </p:spPr>
+        <p:style>
+          <a:lnRef idx="0">
+            <a:scrgbClr r="0" g="0" b="0"/>
+          </a:lnRef>
+          <a:fillRef idx="0">
+            <a:scrgbClr r="0" g="0" b="0"/>
+          </a:fillRef>
+          <a:effectRef idx="0">
+            <a:scrgbClr r="0" g="0" b="0"/>
+          </a:effectRef>
+          <a:fontRef idx="minor">
+            <a:schemeClr val="tx1"/>
+          </a:fontRef>
+        </p:style>
+      </p:cxnSp>
+      <p:sp>
+        <p:nvSpPr>
+          <p:cNvPr id="6" name="TextBox 5">
+            <a:extLst>
+              <a:ext uri="{FF2B5EF4-FFF2-40B4-BE49-F238E27FC236}">
+                <a16:creationId xmlns:a16="http://schemas.microsoft.com/office/drawing/2014/main" id="{60FFE7C8-AEFA-4304-A188-0704D9A427C7}"/>
+              </a:ext>
+            </a:extLst>
+          </p:cNvPr>
+          <p:cNvSpPr txBox="1"/>
+          <p:nvPr/>
+        </p:nvSpPr>
+        <p:spPr>
+          <a:xfrm>
+            <a:off x="536412" y="1154093"/>
+            <a:ext cx="1250891" cy="2893100"/>
+          </a:xfrm>
+          <a:prstGeom prst="rect">
+            <a:avLst/>
+          </a:prstGeom>
+          <a:noFill/>
+          <a:ln>
+            <a:noFill/>
+          </a:ln>
+        </p:spPr>
+        <p:txBody>
+          <a:bodyPr wrap="square" rtlCol="0">
+            <a:spAutoFit/>
+          </a:bodyPr>
+          <a:lstStyle/>
+          <a:p>
+            <a:r>
+              <a:rPr lang="nl-NL" sz="1400" dirty="0"/>
+              <a:t>Train Set 1</a:t>
+            </a:r>
+          </a:p>
+          <a:p>
+            <a:r>
+              <a:rPr lang="en-GB" sz="1400" dirty="0"/>
+              <a:t>Train Set 2</a:t>
+            </a:r>
+          </a:p>
+          <a:p>
+            <a:r>
+              <a:rPr lang="nl-NL" sz="1400" dirty="0"/>
+              <a:t>Train Set 3</a:t>
+            </a:r>
+          </a:p>
+          <a:p>
+            <a:r>
+              <a:rPr lang="en-GB" sz="1400" dirty="0"/>
+              <a:t>Train Set 4</a:t>
+            </a:r>
+          </a:p>
+          <a:p>
+            <a:endParaRPr lang="nl-NL" sz="1400" dirty="0"/>
+          </a:p>
+          <a:p>
+            <a:r>
+              <a:rPr lang="nl-NL" sz="1400" dirty="0"/>
+              <a:t>      ***</a:t>
+            </a:r>
+          </a:p>
+          <a:p>
+            <a:endParaRPr lang="nl-NL" sz="1400" dirty="0"/>
+          </a:p>
+          <a:p>
+            <a:r>
+              <a:rPr lang="en-GB" sz="1400" dirty="0"/>
+              <a:t>Train Set 14</a:t>
+            </a:r>
+            <a:endParaRPr lang="nl-NL" sz="1400" dirty="0"/>
+          </a:p>
+          <a:p>
+            <a:r>
+              <a:rPr lang="nl-NL" sz="1400" dirty="0"/>
+              <a:t>Train Set 15</a:t>
+            </a:r>
+          </a:p>
+          <a:p>
+            <a:r>
+              <a:rPr lang="nl-NL" sz="1400" dirty="0"/>
+              <a:t>Forecast Set 1</a:t>
+            </a:r>
+          </a:p>
+          <a:p>
+            <a:r>
+              <a:rPr lang="nl-NL" sz="1400" dirty="0"/>
+              <a:t>Forecast Set 2</a:t>
+            </a:r>
+          </a:p>
+          <a:p>
+            <a:r>
+              <a:rPr lang="nl-NL" sz="1400" dirty="0"/>
+              <a:t>Forecast Set 3</a:t>
+            </a:r>
+          </a:p>
+          <a:p>
+            <a:r>
+              <a:rPr lang="nl-NL" sz="1400" dirty="0"/>
+              <a:t>Forecast Set 4</a:t>
+            </a:r>
+          </a:p>
+        </p:txBody>
+      </p:sp>
+      <p:sp>
+        <p:nvSpPr>
+          <p:cNvPr id="7" name="Rectangle 6">
+            <a:extLst>
+              <a:ext uri="{FF2B5EF4-FFF2-40B4-BE49-F238E27FC236}">
+                <a16:creationId xmlns:a16="http://schemas.microsoft.com/office/drawing/2014/main" id="{129A4CB0-87BD-4DB7-B084-C5614CFAD9A2}"/>
+              </a:ext>
+            </a:extLst>
+          </p:cNvPr>
+          <p:cNvSpPr/>
+          <p:nvPr/>
+        </p:nvSpPr>
+        <p:spPr>
+          <a:xfrm>
+            <a:off x="1833810" y="983732"/>
+            <a:ext cx="5672276" cy="162691"/>
+          </a:xfrm>
+          <a:prstGeom prst="rect">
+            <a:avLst/>
+          </a:prstGeom>
+          <a:solidFill>
+            <a:srgbClr val="E76F51"/>
+          </a:solidFill>
+          <a:ln>
+            <a:noFill/>
+          </a:ln>
+        </p:spPr>
+        <p:style>
+          <a:lnRef idx="2">
+            <a:schemeClr val="accent1">
+              <a:shade val="50000"/>
+            </a:schemeClr>
+          </a:lnRef>
+          <a:fillRef idx="1">
+            <a:schemeClr val="accent1"/>
+          </a:fillRef>
+          <a:effectRef idx="0">
+            <a:schemeClr val="accent1"/>
+          </a:effectRef>
+          <a:fontRef idx="minor">
+            <a:schemeClr val="lt1"/>
+          </a:fontRef>
+        </p:style>
+        <p:txBody>
+          <a:bodyPr rtlCol="0" anchor="ctr"/>
+          <a:lstStyle/>
+          <a:p>
+            <a:pPr algn="ctr"/>
+            <a:r>
+              <a:rPr lang="nl-NL" sz="1400" dirty="0"/>
+              <a:t>Observed Time Series</a:t>
+            </a:r>
+            <a:endParaRPr lang="en-GB" sz="1400" dirty="0"/>
+          </a:p>
+        </p:txBody>
+      </p:sp>
+      <p:sp>
+        <p:nvSpPr>
+          <p:cNvPr id="8" name="Rectangle 7">
+            <a:extLst>
+              <a:ext uri="{FF2B5EF4-FFF2-40B4-BE49-F238E27FC236}">
+                <a16:creationId xmlns:a16="http://schemas.microsoft.com/office/drawing/2014/main" id="{47C2A1BC-7898-4087-9984-81C2D49C2A09}"/>
+              </a:ext>
+            </a:extLst>
+          </p:cNvPr>
+          <p:cNvSpPr/>
+          <p:nvPr/>
+        </p:nvSpPr>
+        <p:spPr>
+          <a:xfrm>
+            <a:off x="7573654" y="983733"/>
+            <a:ext cx="1117910" cy="162690"/>
+          </a:xfrm>
+          <a:prstGeom prst="rect">
+            <a:avLst/>
+          </a:prstGeom>
+          <a:solidFill>
+            <a:srgbClr val="E76F51"/>
+          </a:solidFill>
+          <a:ln>
+            <a:noFill/>
+          </a:ln>
+        </p:spPr>
+        <p:style>
+          <a:lnRef idx="2">
+            <a:schemeClr val="accent1">
+              <a:shade val="50000"/>
+            </a:schemeClr>
+          </a:lnRef>
+          <a:fillRef idx="1">
+            <a:schemeClr val="accent1"/>
+          </a:fillRef>
+          <a:effectRef idx="0">
+            <a:schemeClr val="accent1"/>
+          </a:effectRef>
+          <a:fontRef idx="minor">
+            <a:schemeClr val="lt1"/>
+          </a:fontRef>
+        </p:style>
+        <p:txBody>
+          <a:bodyPr rtlCol="0" anchor="ctr"/>
+          <a:lstStyle/>
+          <a:p>
+            <a:pPr algn="ctr"/>
+            <a:r>
+              <a:rPr lang="nl-NL" sz="1400" dirty="0"/>
+              <a:t>Forecasting</a:t>
+            </a:r>
+            <a:endParaRPr lang="en-GB" sz="1400" dirty="0"/>
+          </a:p>
+        </p:txBody>
+      </p:sp>
+      <p:sp>
+        <p:nvSpPr>
+          <p:cNvPr id="9" name="Rectangle 8">
+            <a:extLst>
+              <a:ext uri="{FF2B5EF4-FFF2-40B4-BE49-F238E27FC236}">
+                <a16:creationId xmlns:a16="http://schemas.microsoft.com/office/drawing/2014/main" id="{A3FFB3BA-2706-4F32-91D6-ACB4B2502BED}"/>
+              </a:ext>
+            </a:extLst>
+          </p:cNvPr>
+          <p:cNvSpPr/>
+          <p:nvPr/>
+        </p:nvSpPr>
+        <p:spPr>
+          <a:xfrm>
+            <a:off x="1825803" y="1239173"/>
+            <a:ext cx="1658541" cy="60174"/>
+          </a:xfrm>
+          <a:prstGeom prst="rect">
+            <a:avLst/>
+          </a:prstGeom>
+          <a:solidFill>
+            <a:srgbClr val="2A9D8F"/>
+          </a:solidFill>
+          <a:ln>
+            <a:noFill/>
+          </a:ln>
+        </p:spPr>
+        <p:style>
+          <a:lnRef idx="2">
+            <a:schemeClr val="accent1">
+              <a:shade val="50000"/>
+            </a:schemeClr>
+          </a:lnRef>
+          <a:fillRef idx="1">
+            <a:schemeClr val="accent1"/>
+          </a:fillRef>
+          <a:effectRef idx="0">
+            <a:schemeClr val="accent1"/>
+          </a:effectRef>
+          <a:fontRef idx="minor">
+            <a:schemeClr val="lt1"/>
+          </a:fontRef>
+        </p:style>
+        <p:txBody>
+          <a:bodyPr rtlCol="0" anchor="ctr"/>
+          <a:lstStyle/>
+          <a:p>
+            <a:pPr algn="ctr"/>
+            <a:endParaRPr lang="en-GB"/>
+          </a:p>
+        </p:txBody>
+      </p:sp>
+      <p:sp>
+        <p:nvSpPr>
+          <p:cNvPr id="27" name="Rectangle 26">
+            <a:extLst>
+              <a:ext uri="{FF2B5EF4-FFF2-40B4-BE49-F238E27FC236}">
+                <a16:creationId xmlns:a16="http://schemas.microsoft.com/office/drawing/2014/main" id="{47251B0D-35A1-48DE-8F92-FFB9F701E8A0}"/>
+              </a:ext>
+            </a:extLst>
+          </p:cNvPr>
+          <p:cNvSpPr/>
+          <p:nvPr/>
+        </p:nvSpPr>
+        <p:spPr>
+          <a:xfrm>
+            <a:off x="1825803" y="1462243"/>
+            <a:ext cx="224483" cy="60171"/>
+          </a:xfrm>
+          <a:prstGeom prst="rect">
+            <a:avLst/>
+          </a:prstGeom>
+          <a:solidFill>
+            <a:srgbClr val="264653"/>
+          </a:solidFill>
+          <a:ln>
+            <a:noFill/>
+          </a:ln>
+        </p:spPr>
+        <p:style>
+          <a:lnRef idx="2">
+            <a:schemeClr val="accent1">
+              <a:shade val="50000"/>
+            </a:schemeClr>
+          </a:lnRef>
+          <a:fillRef idx="1">
+            <a:schemeClr val="accent1"/>
+          </a:fillRef>
+          <a:effectRef idx="0">
+            <a:schemeClr val="accent1"/>
+          </a:effectRef>
+          <a:fontRef idx="minor">
+            <a:schemeClr val="lt1"/>
+          </a:fontRef>
+        </p:style>
+        <p:txBody>
+          <a:bodyPr rtlCol="0" anchor="ctr"/>
+          <a:lstStyle/>
+          <a:p>
+            <a:pPr algn="ctr"/>
+            <a:endParaRPr lang="en-GB"/>
+          </a:p>
+        </p:txBody>
+      </p:sp>
+      <p:sp>
+        <p:nvSpPr>
+          <p:cNvPr id="28" name="Rectangle 27">
+            <a:extLst>
+              <a:ext uri="{FF2B5EF4-FFF2-40B4-BE49-F238E27FC236}">
+                <a16:creationId xmlns:a16="http://schemas.microsoft.com/office/drawing/2014/main" id="{70255F89-F65C-4DA9-98E6-E662C4113524}"/>
+              </a:ext>
+            </a:extLst>
+          </p:cNvPr>
+          <p:cNvSpPr/>
+          <p:nvPr/>
+        </p:nvSpPr>
+        <p:spPr>
+          <a:xfrm>
+            <a:off x="2093298" y="1461606"/>
+            <a:ext cx="1658541" cy="60174"/>
+          </a:xfrm>
+          <a:prstGeom prst="rect">
+            <a:avLst/>
+          </a:prstGeom>
+          <a:solidFill>
+            <a:srgbClr val="2A9D8F"/>
+          </a:solidFill>
+          <a:ln>
+            <a:noFill/>
+          </a:ln>
+        </p:spPr>
+        <p:style>
+          <a:lnRef idx="2">
+            <a:schemeClr val="accent1">
+              <a:shade val="50000"/>
+            </a:schemeClr>
+          </a:lnRef>
+          <a:fillRef idx="1">
+            <a:schemeClr val="accent1"/>
+          </a:fillRef>
+          <a:effectRef idx="0">
+            <a:schemeClr val="accent1"/>
+          </a:effectRef>
+          <a:fontRef idx="minor">
+            <a:schemeClr val="lt1"/>
+          </a:fontRef>
+        </p:style>
+        <p:txBody>
+          <a:bodyPr rtlCol="0" anchor="ctr"/>
+          <a:lstStyle/>
+          <a:p>
+            <a:pPr algn="ctr"/>
+            <a:endParaRPr lang="en-GB"/>
+          </a:p>
+        </p:txBody>
+      </p:sp>
+      <p:sp>
+        <p:nvSpPr>
+          <p:cNvPr id="31" name="Rectangle 30">
+            <a:extLst>
+              <a:ext uri="{FF2B5EF4-FFF2-40B4-BE49-F238E27FC236}">
+                <a16:creationId xmlns:a16="http://schemas.microsoft.com/office/drawing/2014/main" id="{8F38F7C1-22C7-4165-A754-916CCB3E480D}"/>
+              </a:ext>
+            </a:extLst>
+          </p:cNvPr>
+          <p:cNvSpPr/>
+          <p:nvPr/>
+        </p:nvSpPr>
+        <p:spPr>
+          <a:xfrm>
+            <a:off x="1825803" y="1709898"/>
+            <a:ext cx="454104" cy="60171"/>
+          </a:xfrm>
+          <a:prstGeom prst="rect">
+            <a:avLst/>
+          </a:prstGeom>
+          <a:solidFill>
+            <a:srgbClr val="264653"/>
+          </a:solidFill>
+          <a:ln>
+            <a:noFill/>
+          </a:ln>
+        </p:spPr>
+        <p:style>
+          <a:lnRef idx="2">
+            <a:schemeClr val="accent1">
+              <a:shade val="50000"/>
+            </a:schemeClr>
+          </a:lnRef>
+          <a:fillRef idx="1">
+            <a:schemeClr val="accent1"/>
+          </a:fillRef>
+          <a:effectRef idx="0">
+            <a:schemeClr val="accent1"/>
+          </a:effectRef>
+          <a:fontRef idx="minor">
+            <a:schemeClr val="lt1"/>
+          </a:fontRef>
+        </p:style>
+        <p:txBody>
+          <a:bodyPr rtlCol="0" anchor="ctr"/>
+          <a:lstStyle/>
+          <a:p>
+            <a:pPr algn="ctr"/>
+            <a:endParaRPr lang="en-GB"/>
+          </a:p>
+        </p:txBody>
+      </p:sp>
+      <p:sp>
+        <p:nvSpPr>
+          <p:cNvPr id="32" name="Rectangle 31">
+            <a:extLst>
+              <a:ext uri="{FF2B5EF4-FFF2-40B4-BE49-F238E27FC236}">
+                <a16:creationId xmlns:a16="http://schemas.microsoft.com/office/drawing/2014/main" id="{1026A93E-14E7-43BA-B4B9-3867A1A4E57E}"/>
+              </a:ext>
+            </a:extLst>
+          </p:cNvPr>
+          <p:cNvSpPr/>
+          <p:nvPr/>
+        </p:nvSpPr>
+        <p:spPr>
+          <a:xfrm>
+            <a:off x="2339600" y="1709261"/>
+            <a:ext cx="1658541" cy="60174"/>
+          </a:xfrm>
+          <a:prstGeom prst="rect">
+            <a:avLst/>
+          </a:prstGeom>
+          <a:solidFill>
+            <a:srgbClr val="2A9D8F"/>
+          </a:solidFill>
+          <a:ln>
+            <a:noFill/>
+          </a:ln>
+        </p:spPr>
+        <p:style>
+          <a:lnRef idx="2">
+            <a:schemeClr val="accent1">
+              <a:shade val="50000"/>
+            </a:schemeClr>
+          </a:lnRef>
+          <a:fillRef idx="1">
+            <a:schemeClr val="accent1"/>
+          </a:fillRef>
+          <a:effectRef idx="0">
+            <a:schemeClr val="accent1"/>
+          </a:effectRef>
+          <a:fontRef idx="minor">
+            <a:schemeClr val="lt1"/>
+          </a:fontRef>
+        </p:style>
+        <p:txBody>
+          <a:bodyPr rtlCol="0" anchor="ctr"/>
+          <a:lstStyle/>
+          <a:p>
+            <a:pPr algn="ctr"/>
+            <a:endParaRPr lang="en-GB"/>
+          </a:p>
+        </p:txBody>
+      </p:sp>
+      <p:sp>
+        <p:nvSpPr>
+          <p:cNvPr id="33" name="Rectangle 32">
+            <a:extLst>
+              <a:ext uri="{FF2B5EF4-FFF2-40B4-BE49-F238E27FC236}">
+                <a16:creationId xmlns:a16="http://schemas.microsoft.com/office/drawing/2014/main" id="{98660919-011C-4F4F-8A06-4670A59AE1E4}"/>
+              </a:ext>
+            </a:extLst>
+          </p:cNvPr>
+          <p:cNvSpPr/>
+          <p:nvPr/>
+        </p:nvSpPr>
+        <p:spPr>
+          <a:xfrm>
+            <a:off x="5057961" y="1937833"/>
+            <a:ext cx="213173" cy="60171"/>
+          </a:xfrm>
+          <a:prstGeom prst="rect">
+            <a:avLst/>
+          </a:prstGeom>
+          <a:solidFill>
+            <a:srgbClr val="E9C46A"/>
+          </a:solidFill>
+          <a:ln>
+            <a:noFill/>
+          </a:ln>
+        </p:spPr>
+        <p:style>
+          <a:lnRef idx="2">
+            <a:schemeClr val="accent1">
+              <a:shade val="50000"/>
+            </a:schemeClr>
+          </a:lnRef>
+          <a:fillRef idx="1">
+            <a:schemeClr val="accent1"/>
+          </a:fillRef>
+          <a:effectRef idx="0">
+            <a:schemeClr val="accent1"/>
+          </a:effectRef>
+          <a:fontRef idx="minor">
+            <a:schemeClr val="lt1"/>
+          </a:fontRef>
+        </p:style>
+        <p:txBody>
+          <a:bodyPr rtlCol="0" anchor="ctr"/>
+          <a:lstStyle/>
+          <a:p>
+            <a:pPr algn="ctr"/>
+            <a:endParaRPr lang="en-GB"/>
+          </a:p>
+        </p:txBody>
+      </p:sp>
+      <p:sp>
+        <p:nvSpPr>
+          <p:cNvPr id="34" name="Rectangle 33">
+            <a:extLst>
+              <a:ext uri="{FF2B5EF4-FFF2-40B4-BE49-F238E27FC236}">
+                <a16:creationId xmlns:a16="http://schemas.microsoft.com/office/drawing/2014/main" id="{10003090-5203-499A-BC63-CAF2BDF17337}"/>
+              </a:ext>
+            </a:extLst>
+          </p:cNvPr>
+          <p:cNvSpPr/>
+          <p:nvPr/>
+        </p:nvSpPr>
+        <p:spPr>
+          <a:xfrm>
+            <a:off x="5325303" y="1932339"/>
+            <a:ext cx="2172776" cy="60171"/>
+          </a:xfrm>
+          <a:prstGeom prst="rect">
+            <a:avLst/>
+          </a:prstGeom>
+          <a:solidFill>
+            <a:srgbClr val="264653"/>
+          </a:solidFill>
+          <a:ln>
+            <a:noFill/>
+          </a:ln>
+        </p:spPr>
+        <p:style>
+          <a:lnRef idx="2">
+            <a:schemeClr val="accent1">
+              <a:shade val="50000"/>
+            </a:schemeClr>
+          </a:lnRef>
+          <a:fillRef idx="1">
+            <a:schemeClr val="accent1"/>
+          </a:fillRef>
+          <a:effectRef idx="0">
+            <a:schemeClr val="accent1"/>
+          </a:effectRef>
+          <a:fontRef idx="minor">
+            <a:schemeClr val="lt1"/>
+          </a:fontRef>
+        </p:style>
+        <p:txBody>
+          <a:bodyPr rtlCol="0" anchor="ctr"/>
+          <a:lstStyle/>
+          <a:p>
+            <a:pPr algn="ctr"/>
+            <a:endParaRPr lang="en-GB"/>
+          </a:p>
+        </p:txBody>
+      </p:sp>
+      <p:sp>
+        <p:nvSpPr>
+          <p:cNvPr id="35" name="Rectangle 34">
+            <a:extLst>
+              <a:ext uri="{FF2B5EF4-FFF2-40B4-BE49-F238E27FC236}">
+                <a16:creationId xmlns:a16="http://schemas.microsoft.com/office/drawing/2014/main" id="{31D28B32-A820-46CD-A3B6-7334B1178134}"/>
+              </a:ext>
+            </a:extLst>
+          </p:cNvPr>
+          <p:cNvSpPr/>
+          <p:nvPr/>
+        </p:nvSpPr>
+        <p:spPr>
+          <a:xfrm>
+            <a:off x="1825803" y="1932340"/>
+            <a:ext cx="679720" cy="60171"/>
+          </a:xfrm>
+          <a:prstGeom prst="rect">
+            <a:avLst/>
+          </a:prstGeom>
+          <a:solidFill>
+            <a:srgbClr val="264653"/>
+          </a:solidFill>
+          <a:ln>
+            <a:noFill/>
+          </a:ln>
+        </p:spPr>
+        <p:style>
+          <a:lnRef idx="2">
+            <a:schemeClr val="accent1">
+              <a:shade val="50000"/>
+            </a:schemeClr>
+          </a:lnRef>
+          <a:fillRef idx="1">
+            <a:schemeClr val="accent1"/>
+          </a:fillRef>
+          <a:effectRef idx="0">
+            <a:schemeClr val="accent1"/>
+          </a:effectRef>
+          <a:fontRef idx="minor">
+            <a:schemeClr val="lt1"/>
+          </a:fontRef>
+        </p:style>
+        <p:txBody>
+          <a:bodyPr rtlCol="0" anchor="ctr"/>
+          <a:lstStyle/>
+          <a:p>
+            <a:pPr algn="ctr"/>
+            <a:endParaRPr lang="en-GB"/>
+          </a:p>
+        </p:txBody>
+      </p:sp>
+      <p:sp>
+        <p:nvSpPr>
+          <p:cNvPr id="36" name="Rectangle 35">
+            <a:extLst>
+              <a:ext uri="{FF2B5EF4-FFF2-40B4-BE49-F238E27FC236}">
+                <a16:creationId xmlns:a16="http://schemas.microsoft.com/office/drawing/2014/main" id="{46D7F34F-D11F-49BD-B6C8-2B1B2E0E42BA}"/>
+              </a:ext>
+            </a:extLst>
+          </p:cNvPr>
+          <p:cNvSpPr/>
+          <p:nvPr/>
+        </p:nvSpPr>
+        <p:spPr>
+          <a:xfrm>
+            <a:off x="2565400" y="1931703"/>
+            <a:ext cx="1705423" cy="60174"/>
+          </a:xfrm>
+          <a:prstGeom prst="rect">
+            <a:avLst/>
+          </a:prstGeom>
+          <a:solidFill>
+            <a:srgbClr val="2A9D8F"/>
+          </a:solidFill>
+          <a:ln>
+            <a:noFill/>
+          </a:ln>
+        </p:spPr>
+        <p:style>
+          <a:lnRef idx="2">
+            <a:schemeClr val="accent1">
+              <a:shade val="50000"/>
+            </a:schemeClr>
+          </a:lnRef>
+          <a:fillRef idx="1">
+            <a:schemeClr val="accent1"/>
+          </a:fillRef>
+          <a:effectRef idx="0">
+            <a:schemeClr val="accent1"/>
+          </a:effectRef>
+          <a:fontRef idx="minor">
+            <a:schemeClr val="lt1"/>
+          </a:fontRef>
+        </p:style>
+        <p:txBody>
+          <a:bodyPr rtlCol="0" anchor="ctr"/>
+          <a:lstStyle/>
+          <a:p>
+            <a:pPr algn="ctr"/>
+            <a:endParaRPr lang="en-GB"/>
+          </a:p>
+        </p:txBody>
+      </p:sp>
+      <p:sp>
+        <p:nvSpPr>
+          <p:cNvPr id="37" name="Rectangle 36">
+            <a:extLst>
+              <a:ext uri="{FF2B5EF4-FFF2-40B4-BE49-F238E27FC236}">
+                <a16:creationId xmlns:a16="http://schemas.microsoft.com/office/drawing/2014/main" id="{22433428-B3E0-4246-AC63-29D0BB6F7BEE}"/>
+              </a:ext>
+            </a:extLst>
+          </p:cNvPr>
+          <p:cNvSpPr/>
+          <p:nvPr/>
+        </p:nvSpPr>
+        <p:spPr>
+          <a:xfrm>
+            <a:off x="6999090" y="2757956"/>
+            <a:ext cx="213173" cy="60171"/>
+          </a:xfrm>
+          <a:prstGeom prst="rect">
+            <a:avLst/>
+          </a:prstGeom>
+          <a:solidFill>
+            <a:srgbClr val="E9C46A"/>
+          </a:solidFill>
+          <a:ln>
+            <a:noFill/>
+          </a:ln>
+        </p:spPr>
+        <p:style>
+          <a:lnRef idx="2">
+            <a:schemeClr val="accent1">
+              <a:shade val="50000"/>
+            </a:schemeClr>
+          </a:lnRef>
+          <a:fillRef idx="1">
+            <a:schemeClr val="accent1"/>
+          </a:fillRef>
+          <a:effectRef idx="0">
+            <a:schemeClr val="accent1"/>
+          </a:effectRef>
+          <a:fontRef idx="minor">
+            <a:schemeClr val="lt1"/>
+          </a:fontRef>
+        </p:style>
+        <p:txBody>
+          <a:bodyPr rtlCol="0" anchor="ctr"/>
+          <a:lstStyle/>
+          <a:p>
+            <a:pPr algn="ctr"/>
+            <a:endParaRPr lang="en-GB"/>
+          </a:p>
+        </p:txBody>
+      </p:sp>
+      <p:sp>
+        <p:nvSpPr>
+          <p:cNvPr id="38" name="Rectangle 37">
+            <a:extLst>
+              <a:ext uri="{FF2B5EF4-FFF2-40B4-BE49-F238E27FC236}">
+                <a16:creationId xmlns:a16="http://schemas.microsoft.com/office/drawing/2014/main" id="{3DD83320-EA28-4FB7-A2FC-B8B5039A7C7E}"/>
+              </a:ext>
+            </a:extLst>
+          </p:cNvPr>
+          <p:cNvSpPr/>
+          <p:nvPr/>
+        </p:nvSpPr>
+        <p:spPr>
+          <a:xfrm>
+            <a:off x="7271252" y="2758582"/>
+            <a:ext cx="213173" cy="60171"/>
+          </a:xfrm>
+          <a:prstGeom prst="rect">
+            <a:avLst/>
+          </a:prstGeom>
+          <a:solidFill>
+            <a:srgbClr val="264653"/>
+          </a:solidFill>
+          <a:ln>
+            <a:noFill/>
+          </a:ln>
+        </p:spPr>
+        <p:style>
+          <a:lnRef idx="2">
+            <a:schemeClr val="accent1">
+              <a:shade val="50000"/>
+            </a:schemeClr>
+          </a:lnRef>
+          <a:fillRef idx="1">
+            <a:schemeClr val="accent1"/>
+          </a:fillRef>
+          <a:effectRef idx="0">
+            <a:schemeClr val="accent1"/>
+          </a:effectRef>
+          <a:fontRef idx="minor">
+            <a:schemeClr val="lt1"/>
+          </a:fontRef>
+        </p:style>
+        <p:txBody>
+          <a:bodyPr rtlCol="0" anchor="ctr"/>
+          <a:lstStyle/>
+          <a:p>
+            <a:pPr algn="ctr"/>
+            <a:endParaRPr lang="en-GB"/>
+          </a:p>
+        </p:txBody>
+      </p:sp>
+      <p:sp>
+        <p:nvSpPr>
+          <p:cNvPr id="39" name="Rectangle 38">
+            <a:extLst>
+              <a:ext uri="{FF2B5EF4-FFF2-40B4-BE49-F238E27FC236}">
+                <a16:creationId xmlns:a16="http://schemas.microsoft.com/office/drawing/2014/main" id="{927C7422-DED4-4195-92CC-E74C31E4AFA6}"/>
+              </a:ext>
+            </a:extLst>
+          </p:cNvPr>
+          <p:cNvSpPr/>
+          <p:nvPr/>
+        </p:nvSpPr>
+        <p:spPr>
+          <a:xfrm>
+            <a:off x="1833809" y="2758583"/>
+            <a:ext cx="2616394" cy="61200"/>
+          </a:xfrm>
+          <a:prstGeom prst="rect">
+            <a:avLst/>
+          </a:prstGeom>
+          <a:solidFill>
+            <a:srgbClr val="264653"/>
+          </a:solidFill>
+          <a:ln>
+            <a:noFill/>
+          </a:ln>
+        </p:spPr>
+        <p:style>
+          <a:lnRef idx="2">
+            <a:schemeClr val="accent1">
+              <a:shade val="50000"/>
+            </a:schemeClr>
+          </a:lnRef>
+          <a:fillRef idx="1">
+            <a:schemeClr val="accent1"/>
+          </a:fillRef>
+          <a:effectRef idx="0">
+            <a:schemeClr val="accent1"/>
+          </a:effectRef>
+          <a:fontRef idx="minor">
+            <a:schemeClr val="lt1"/>
+          </a:fontRef>
+        </p:style>
+        <p:txBody>
+          <a:bodyPr rtlCol="0" anchor="ctr"/>
+          <a:lstStyle/>
+          <a:p>
+            <a:pPr algn="ctr"/>
+            <a:endParaRPr lang="en-GB"/>
+          </a:p>
+        </p:txBody>
+      </p:sp>
+      <p:sp>
+        <p:nvSpPr>
+          <p:cNvPr id="40" name="Rectangle 39">
+            <a:extLst>
+              <a:ext uri="{FF2B5EF4-FFF2-40B4-BE49-F238E27FC236}">
+                <a16:creationId xmlns:a16="http://schemas.microsoft.com/office/drawing/2014/main" id="{0731CEBF-FC15-4C75-93F6-67E7F979C59B}"/>
+              </a:ext>
+            </a:extLst>
+          </p:cNvPr>
+          <p:cNvSpPr/>
+          <p:nvPr/>
+        </p:nvSpPr>
+        <p:spPr>
+          <a:xfrm>
+            <a:off x="4482250" y="2755847"/>
+            <a:ext cx="1705423" cy="60174"/>
+          </a:xfrm>
+          <a:prstGeom prst="rect">
+            <a:avLst/>
+          </a:prstGeom>
+          <a:solidFill>
+            <a:srgbClr val="2A9D8F"/>
+          </a:solidFill>
+          <a:ln>
+            <a:noFill/>
+          </a:ln>
+        </p:spPr>
+        <p:style>
+          <a:lnRef idx="2">
+            <a:schemeClr val="accent1">
+              <a:shade val="50000"/>
+            </a:schemeClr>
+          </a:lnRef>
+          <a:fillRef idx="1">
+            <a:schemeClr val="accent1"/>
+          </a:fillRef>
+          <a:effectRef idx="0">
+            <a:schemeClr val="accent1"/>
+          </a:effectRef>
+          <a:fontRef idx="minor">
+            <a:schemeClr val="lt1"/>
+          </a:fontRef>
+        </p:style>
+        <p:txBody>
+          <a:bodyPr rtlCol="0" anchor="ctr"/>
+          <a:lstStyle/>
+          <a:p>
+            <a:pPr algn="ctr"/>
+            <a:endParaRPr lang="en-GB"/>
+          </a:p>
+        </p:txBody>
+      </p:sp>
+      <p:sp>
+        <p:nvSpPr>
+          <p:cNvPr id="41" name="Rectangle 40">
+            <a:extLst>
+              <a:ext uri="{FF2B5EF4-FFF2-40B4-BE49-F238E27FC236}">
+                <a16:creationId xmlns:a16="http://schemas.microsoft.com/office/drawing/2014/main" id="{159E357D-0635-4C11-B9EE-5B7738991A3C}"/>
+              </a:ext>
+            </a:extLst>
+          </p:cNvPr>
+          <p:cNvSpPr/>
+          <p:nvPr/>
+        </p:nvSpPr>
+        <p:spPr>
+          <a:xfrm>
+            <a:off x="7271252" y="2967864"/>
+            <a:ext cx="213173" cy="60171"/>
+          </a:xfrm>
+          <a:prstGeom prst="rect">
+            <a:avLst/>
+          </a:prstGeom>
+          <a:solidFill>
+            <a:srgbClr val="E9C46A"/>
+          </a:solidFill>
+          <a:ln>
+            <a:noFill/>
+          </a:ln>
+        </p:spPr>
+        <p:style>
+          <a:lnRef idx="2">
+            <a:schemeClr val="accent1">
+              <a:shade val="50000"/>
+            </a:schemeClr>
+          </a:lnRef>
+          <a:fillRef idx="1">
+            <a:schemeClr val="accent1"/>
+          </a:fillRef>
+          <a:effectRef idx="0">
+            <a:schemeClr val="accent1"/>
+          </a:effectRef>
+          <a:fontRef idx="minor">
+            <a:schemeClr val="lt1"/>
+          </a:fontRef>
+        </p:style>
+        <p:txBody>
+          <a:bodyPr rtlCol="0" anchor="ctr"/>
+          <a:lstStyle/>
+          <a:p>
+            <a:pPr algn="ctr"/>
+            <a:endParaRPr lang="en-GB"/>
+          </a:p>
+        </p:txBody>
+      </p:sp>
+      <p:sp>
+        <p:nvSpPr>
+          <p:cNvPr id="43" name="Rectangle 42">
+            <a:extLst>
+              <a:ext uri="{FF2B5EF4-FFF2-40B4-BE49-F238E27FC236}">
+                <a16:creationId xmlns:a16="http://schemas.microsoft.com/office/drawing/2014/main" id="{1C197514-1DB0-4F53-B76B-13F83F87F014}"/>
+              </a:ext>
+            </a:extLst>
+          </p:cNvPr>
+          <p:cNvSpPr/>
+          <p:nvPr/>
+        </p:nvSpPr>
+        <p:spPr>
+          <a:xfrm>
+            <a:off x="1825803" y="2969126"/>
+            <a:ext cx="2912400" cy="60171"/>
+          </a:xfrm>
+          <a:prstGeom prst="rect">
+            <a:avLst/>
+          </a:prstGeom>
+          <a:solidFill>
+            <a:srgbClr val="264653"/>
+          </a:solidFill>
+          <a:ln>
+            <a:noFill/>
+          </a:ln>
+        </p:spPr>
+        <p:style>
+          <a:lnRef idx="2">
+            <a:schemeClr val="accent1">
+              <a:shade val="50000"/>
+            </a:schemeClr>
+          </a:lnRef>
+          <a:fillRef idx="1">
+            <a:schemeClr val="accent1"/>
+          </a:fillRef>
+          <a:effectRef idx="0">
+            <a:schemeClr val="accent1"/>
+          </a:effectRef>
+          <a:fontRef idx="minor">
+            <a:schemeClr val="lt1"/>
+          </a:fontRef>
+        </p:style>
+        <p:txBody>
+          <a:bodyPr rtlCol="0" anchor="ctr"/>
+          <a:lstStyle/>
+          <a:p>
+            <a:pPr algn="ctr"/>
+            <a:endParaRPr lang="en-GB"/>
+          </a:p>
+        </p:txBody>
+      </p:sp>
+      <p:sp>
+        <p:nvSpPr>
+          <p:cNvPr id="44" name="Rectangle 43">
+            <a:extLst>
+              <a:ext uri="{FF2B5EF4-FFF2-40B4-BE49-F238E27FC236}">
+                <a16:creationId xmlns:a16="http://schemas.microsoft.com/office/drawing/2014/main" id="{3DF3280B-D6C7-4FE4-9EDE-8BDDCD4B7EF9}"/>
+              </a:ext>
+            </a:extLst>
+          </p:cNvPr>
+          <p:cNvSpPr/>
+          <p:nvPr/>
+        </p:nvSpPr>
+        <p:spPr>
+          <a:xfrm>
+            <a:off x="4776702" y="2970383"/>
+            <a:ext cx="1670515" cy="60174"/>
+          </a:xfrm>
+          <a:prstGeom prst="rect">
+            <a:avLst/>
+          </a:prstGeom>
+          <a:solidFill>
+            <a:srgbClr val="2A9D8F"/>
+          </a:solidFill>
+          <a:ln>
+            <a:noFill/>
+          </a:ln>
+        </p:spPr>
+        <p:style>
+          <a:lnRef idx="2">
+            <a:schemeClr val="accent1">
+              <a:shade val="50000"/>
+            </a:schemeClr>
+          </a:lnRef>
+          <a:fillRef idx="1">
+            <a:schemeClr val="accent1"/>
+          </a:fillRef>
+          <a:effectRef idx="0">
+            <a:schemeClr val="accent1"/>
+          </a:effectRef>
+          <a:fontRef idx="minor">
+            <a:schemeClr val="lt1"/>
+          </a:fontRef>
+        </p:style>
+        <p:txBody>
+          <a:bodyPr rtlCol="0" anchor="ctr"/>
+          <a:lstStyle/>
+          <a:p>
+            <a:pPr algn="ctr"/>
+            <a:endParaRPr lang="en-GB"/>
+          </a:p>
+        </p:txBody>
+      </p:sp>
+      <p:sp>
+        <p:nvSpPr>
+          <p:cNvPr id="45" name="Rectangle 44">
+            <a:extLst>
+              <a:ext uri="{FF2B5EF4-FFF2-40B4-BE49-F238E27FC236}">
+                <a16:creationId xmlns:a16="http://schemas.microsoft.com/office/drawing/2014/main" id="{3845B1B4-F4F9-416C-AAFB-AF1C9F7D3E8C}"/>
+              </a:ext>
+            </a:extLst>
+          </p:cNvPr>
+          <p:cNvSpPr/>
+          <p:nvPr/>
+        </p:nvSpPr>
+        <p:spPr>
+          <a:xfrm>
+            <a:off x="7538747" y="3185825"/>
+            <a:ext cx="213173" cy="60171"/>
+          </a:xfrm>
+          <a:prstGeom prst="rect">
+            <a:avLst/>
+          </a:prstGeom>
+          <a:solidFill>
+            <a:srgbClr val="E9C46A"/>
+          </a:solidFill>
+          <a:ln>
+            <a:noFill/>
+          </a:ln>
+        </p:spPr>
+        <p:style>
+          <a:lnRef idx="2">
+            <a:schemeClr val="accent1">
+              <a:shade val="50000"/>
+            </a:schemeClr>
+          </a:lnRef>
+          <a:fillRef idx="1">
+            <a:schemeClr val="accent1"/>
+          </a:fillRef>
+          <a:effectRef idx="0">
+            <a:schemeClr val="accent1"/>
+          </a:effectRef>
+          <a:fontRef idx="minor">
+            <a:schemeClr val="lt1"/>
+          </a:fontRef>
+        </p:style>
+        <p:txBody>
+          <a:bodyPr rtlCol="0" anchor="ctr"/>
+          <a:lstStyle/>
+          <a:p>
+            <a:pPr algn="ctr"/>
+            <a:endParaRPr lang="en-GB"/>
+          </a:p>
+        </p:txBody>
+      </p:sp>
+      <p:sp>
+        <p:nvSpPr>
+          <p:cNvPr id="46" name="Rectangle 45">
+            <a:extLst>
+              <a:ext uri="{FF2B5EF4-FFF2-40B4-BE49-F238E27FC236}">
+                <a16:creationId xmlns:a16="http://schemas.microsoft.com/office/drawing/2014/main" id="{06C76DB0-5401-4883-BFC0-1FEC8C709FD6}"/>
+              </a:ext>
+            </a:extLst>
+          </p:cNvPr>
+          <p:cNvSpPr/>
+          <p:nvPr/>
+        </p:nvSpPr>
+        <p:spPr>
+          <a:xfrm>
+            <a:off x="1825803" y="3185825"/>
+            <a:ext cx="3276000" cy="60171"/>
+          </a:xfrm>
+          <a:prstGeom prst="rect">
+            <a:avLst/>
+          </a:prstGeom>
+          <a:solidFill>
+            <a:srgbClr val="264653"/>
+          </a:solidFill>
+          <a:ln>
+            <a:noFill/>
+          </a:ln>
+        </p:spPr>
+        <p:style>
+          <a:lnRef idx="2">
+            <a:schemeClr val="accent1">
+              <a:shade val="50000"/>
+            </a:schemeClr>
+          </a:lnRef>
+          <a:fillRef idx="1">
+            <a:schemeClr val="accent1"/>
+          </a:fillRef>
+          <a:effectRef idx="0">
+            <a:schemeClr val="accent1"/>
+          </a:effectRef>
+          <a:fontRef idx="minor">
+            <a:schemeClr val="lt1"/>
+          </a:fontRef>
+        </p:style>
+        <p:txBody>
+          <a:bodyPr rtlCol="0" anchor="ctr"/>
+          <a:lstStyle/>
+          <a:p>
+            <a:pPr algn="ctr"/>
+            <a:endParaRPr lang="en-GB"/>
+          </a:p>
+        </p:txBody>
+      </p:sp>
+      <p:sp>
+        <p:nvSpPr>
+          <p:cNvPr id="47" name="Rectangle 46">
+            <a:extLst>
+              <a:ext uri="{FF2B5EF4-FFF2-40B4-BE49-F238E27FC236}">
+                <a16:creationId xmlns:a16="http://schemas.microsoft.com/office/drawing/2014/main" id="{7D2CE144-ED95-4437-9CAD-349BA2D5B038}"/>
+              </a:ext>
+            </a:extLst>
+          </p:cNvPr>
+          <p:cNvSpPr/>
+          <p:nvPr/>
+        </p:nvSpPr>
+        <p:spPr>
+          <a:xfrm>
+            <a:off x="5136593" y="3183304"/>
+            <a:ext cx="1607108" cy="60174"/>
+          </a:xfrm>
+          <a:prstGeom prst="rect">
+            <a:avLst/>
+          </a:prstGeom>
+          <a:solidFill>
+            <a:srgbClr val="2A9D8F"/>
+          </a:solidFill>
+          <a:ln>
+            <a:noFill/>
+          </a:ln>
+        </p:spPr>
+        <p:style>
+          <a:lnRef idx="2">
+            <a:schemeClr val="accent1">
+              <a:shade val="50000"/>
+            </a:schemeClr>
+          </a:lnRef>
+          <a:fillRef idx="1">
+            <a:schemeClr val="accent1"/>
+          </a:fillRef>
+          <a:effectRef idx="0">
+            <a:schemeClr val="accent1"/>
+          </a:effectRef>
+          <a:fontRef idx="minor">
+            <a:schemeClr val="lt1"/>
+          </a:fontRef>
+        </p:style>
+        <p:txBody>
+          <a:bodyPr rtlCol="0" anchor="ctr"/>
+          <a:lstStyle/>
+          <a:p>
+            <a:pPr algn="ctr"/>
+            <a:endParaRPr lang="en-GB"/>
+          </a:p>
+        </p:txBody>
+      </p:sp>
+      <p:sp>
+        <p:nvSpPr>
+          <p:cNvPr id="49" name="Rectangle 48">
+            <a:extLst>
+              <a:ext uri="{FF2B5EF4-FFF2-40B4-BE49-F238E27FC236}">
+                <a16:creationId xmlns:a16="http://schemas.microsoft.com/office/drawing/2014/main" id="{5200BB06-B843-43E9-BD7E-7533D832551F}"/>
+              </a:ext>
+            </a:extLst>
+          </p:cNvPr>
+          <p:cNvSpPr/>
+          <p:nvPr/>
+        </p:nvSpPr>
+        <p:spPr>
+          <a:xfrm>
+            <a:off x="7824755" y="3407090"/>
+            <a:ext cx="213173" cy="60171"/>
+          </a:xfrm>
+          <a:prstGeom prst="rect">
+            <a:avLst/>
+          </a:prstGeom>
+          <a:solidFill>
+            <a:srgbClr val="E9C46A"/>
+          </a:solidFill>
+          <a:ln>
+            <a:noFill/>
+          </a:ln>
+        </p:spPr>
+        <p:style>
+          <a:lnRef idx="2">
+            <a:schemeClr val="accent1">
+              <a:shade val="50000"/>
+            </a:schemeClr>
+          </a:lnRef>
+          <a:fillRef idx="1">
+            <a:schemeClr val="accent1"/>
+          </a:fillRef>
+          <a:effectRef idx="0">
+            <a:schemeClr val="accent1"/>
+          </a:effectRef>
+          <a:fontRef idx="minor">
+            <a:schemeClr val="lt1"/>
+          </a:fontRef>
+        </p:style>
+        <p:txBody>
+          <a:bodyPr rtlCol="0" anchor="ctr"/>
+          <a:lstStyle/>
+          <a:p>
+            <a:pPr algn="ctr"/>
+            <a:endParaRPr lang="en-GB"/>
+          </a:p>
+        </p:txBody>
+      </p:sp>
+      <p:sp>
+        <p:nvSpPr>
+          <p:cNvPr id="50" name="Rectangle 49">
+            <a:extLst>
+              <a:ext uri="{FF2B5EF4-FFF2-40B4-BE49-F238E27FC236}">
+                <a16:creationId xmlns:a16="http://schemas.microsoft.com/office/drawing/2014/main" id="{FF4BC855-1BDD-4FB4-9BA1-3E0DED3AA649}"/>
+              </a:ext>
+            </a:extLst>
+          </p:cNvPr>
+          <p:cNvSpPr/>
+          <p:nvPr/>
+        </p:nvSpPr>
+        <p:spPr>
+          <a:xfrm>
+            <a:off x="1825803" y="3392635"/>
+            <a:ext cx="3596400" cy="60171"/>
+          </a:xfrm>
+          <a:prstGeom prst="rect">
+            <a:avLst/>
+          </a:prstGeom>
+          <a:solidFill>
+            <a:srgbClr val="264653"/>
+          </a:solidFill>
+          <a:ln>
+            <a:noFill/>
+          </a:ln>
+        </p:spPr>
+        <p:style>
+          <a:lnRef idx="2">
+            <a:schemeClr val="accent1">
+              <a:shade val="50000"/>
+            </a:schemeClr>
+          </a:lnRef>
+          <a:fillRef idx="1">
+            <a:schemeClr val="accent1"/>
+          </a:fillRef>
+          <a:effectRef idx="0">
+            <a:schemeClr val="accent1"/>
+          </a:effectRef>
+          <a:fontRef idx="minor">
+            <a:schemeClr val="lt1"/>
+          </a:fontRef>
+        </p:style>
+        <p:txBody>
+          <a:bodyPr rtlCol="0" anchor="ctr"/>
+          <a:lstStyle/>
+          <a:p>
+            <a:pPr algn="ctr"/>
+            <a:endParaRPr lang="en-GB"/>
+          </a:p>
+        </p:txBody>
+      </p:sp>
+      <p:sp>
+        <p:nvSpPr>
+          <p:cNvPr id="51" name="Rectangle 50">
+            <a:extLst>
+              <a:ext uri="{FF2B5EF4-FFF2-40B4-BE49-F238E27FC236}">
+                <a16:creationId xmlns:a16="http://schemas.microsoft.com/office/drawing/2014/main" id="{6EBAB1AC-202A-41D4-8917-6C7B8DBABE4A}"/>
+              </a:ext>
+            </a:extLst>
+          </p:cNvPr>
+          <p:cNvSpPr/>
+          <p:nvPr/>
+        </p:nvSpPr>
+        <p:spPr>
+          <a:xfrm>
+            <a:off x="5460703" y="3393809"/>
+            <a:ext cx="1477968" cy="60174"/>
+          </a:xfrm>
+          <a:prstGeom prst="rect">
+            <a:avLst/>
+          </a:prstGeom>
+          <a:solidFill>
+            <a:srgbClr val="2A9D8F"/>
+          </a:solidFill>
+          <a:ln>
+            <a:noFill/>
+          </a:ln>
+        </p:spPr>
+        <p:style>
+          <a:lnRef idx="2">
+            <a:schemeClr val="accent1">
+              <a:shade val="50000"/>
+            </a:schemeClr>
+          </a:lnRef>
+          <a:fillRef idx="1">
+            <a:schemeClr val="accent1"/>
+          </a:fillRef>
+          <a:effectRef idx="0">
+            <a:schemeClr val="accent1"/>
+          </a:effectRef>
+          <a:fontRef idx="minor">
+            <a:schemeClr val="lt1"/>
+          </a:fontRef>
+        </p:style>
+        <p:txBody>
+          <a:bodyPr rtlCol="0" anchor="ctr"/>
+          <a:lstStyle/>
+          <a:p>
+            <a:pPr algn="ctr"/>
+            <a:endParaRPr lang="en-GB"/>
+          </a:p>
+        </p:txBody>
+      </p:sp>
+      <p:sp>
+        <p:nvSpPr>
+          <p:cNvPr id="53" name="Rectangle 52">
+            <a:extLst>
+              <a:ext uri="{FF2B5EF4-FFF2-40B4-BE49-F238E27FC236}">
+                <a16:creationId xmlns:a16="http://schemas.microsoft.com/office/drawing/2014/main" id="{123B3B5E-0B79-4B46-850E-0049BD6A999F}"/>
+              </a:ext>
+            </a:extLst>
+          </p:cNvPr>
+          <p:cNvSpPr/>
+          <p:nvPr/>
+        </p:nvSpPr>
+        <p:spPr>
+          <a:xfrm>
+            <a:off x="8097017" y="3620692"/>
+            <a:ext cx="213173" cy="60171"/>
+          </a:xfrm>
+          <a:prstGeom prst="rect">
+            <a:avLst/>
+          </a:prstGeom>
+          <a:solidFill>
+            <a:srgbClr val="E9C46A"/>
+          </a:solidFill>
+          <a:ln>
+            <a:noFill/>
+          </a:ln>
+        </p:spPr>
+        <p:style>
+          <a:lnRef idx="2">
+            <a:schemeClr val="accent1">
+              <a:shade val="50000"/>
+            </a:schemeClr>
+          </a:lnRef>
+          <a:fillRef idx="1">
+            <a:schemeClr val="accent1"/>
+          </a:fillRef>
+          <a:effectRef idx="0">
+            <a:schemeClr val="accent1"/>
+          </a:effectRef>
+          <a:fontRef idx="minor">
+            <a:schemeClr val="lt1"/>
+          </a:fontRef>
+        </p:style>
+        <p:txBody>
+          <a:bodyPr rtlCol="0" anchor="ctr"/>
+          <a:lstStyle/>
+          <a:p>
+            <a:pPr algn="ctr"/>
+            <a:endParaRPr lang="en-GB"/>
+          </a:p>
+        </p:txBody>
+      </p:sp>
+      <p:sp>
+        <p:nvSpPr>
+          <p:cNvPr id="54" name="Rectangle 53">
+            <a:extLst>
+              <a:ext uri="{FF2B5EF4-FFF2-40B4-BE49-F238E27FC236}">
+                <a16:creationId xmlns:a16="http://schemas.microsoft.com/office/drawing/2014/main" id="{63B1B806-DF1C-4E11-A866-DA9497601472}"/>
+              </a:ext>
+            </a:extLst>
+          </p:cNvPr>
+          <p:cNvSpPr/>
+          <p:nvPr/>
+        </p:nvSpPr>
+        <p:spPr>
+          <a:xfrm>
+            <a:off x="1825803" y="3606237"/>
+            <a:ext cx="3924000" cy="60171"/>
+          </a:xfrm>
+          <a:prstGeom prst="rect">
+            <a:avLst/>
+          </a:prstGeom>
+          <a:solidFill>
+            <a:srgbClr val="264653"/>
+          </a:solidFill>
+          <a:ln>
+            <a:noFill/>
+          </a:ln>
+        </p:spPr>
+        <p:style>
+          <a:lnRef idx="2">
+            <a:schemeClr val="accent1">
+              <a:shade val="50000"/>
+            </a:schemeClr>
+          </a:lnRef>
+          <a:fillRef idx="1">
+            <a:schemeClr val="accent1"/>
+          </a:fillRef>
+          <a:effectRef idx="0">
+            <a:schemeClr val="accent1"/>
+          </a:effectRef>
+          <a:fontRef idx="minor">
+            <a:schemeClr val="lt1"/>
+          </a:fontRef>
+        </p:style>
+        <p:txBody>
+          <a:bodyPr rtlCol="0" anchor="ctr"/>
+          <a:lstStyle/>
+          <a:p>
+            <a:pPr algn="ctr"/>
+            <a:endParaRPr lang="en-GB"/>
+          </a:p>
+        </p:txBody>
+      </p:sp>
+      <p:sp>
+        <p:nvSpPr>
+          <p:cNvPr id="55" name="Rectangle 54">
+            <a:extLst>
+              <a:ext uri="{FF2B5EF4-FFF2-40B4-BE49-F238E27FC236}">
+                <a16:creationId xmlns:a16="http://schemas.microsoft.com/office/drawing/2014/main" id="{80311018-C60B-459F-9D83-215D113A0379}"/>
+              </a:ext>
+            </a:extLst>
+          </p:cNvPr>
+          <p:cNvSpPr/>
+          <p:nvPr/>
+        </p:nvSpPr>
+        <p:spPr>
+          <a:xfrm>
+            <a:off x="5791199" y="3614527"/>
+            <a:ext cx="1421063" cy="60174"/>
+          </a:xfrm>
+          <a:prstGeom prst="rect">
+            <a:avLst/>
+          </a:prstGeom>
+          <a:solidFill>
+            <a:srgbClr val="2A9D8F"/>
+          </a:solidFill>
+          <a:ln>
+            <a:noFill/>
+          </a:ln>
+        </p:spPr>
+        <p:style>
+          <a:lnRef idx="2">
+            <a:schemeClr val="accent1">
+              <a:shade val="50000"/>
+            </a:schemeClr>
+          </a:lnRef>
+          <a:fillRef idx="1">
+            <a:schemeClr val="accent1"/>
+          </a:fillRef>
+          <a:effectRef idx="0">
+            <a:schemeClr val="accent1"/>
+          </a:effectRef>
+          <a:fontRef idx="minor">
+            <a:schemeClr val="lt1"/>
+          </a:fontRef>
+        </p:style>
+        <p:txBody>
+          <a:bodyPr rtlCol="0" anchor="ctr"/>
+          <a:lstStyle/>
+          <a:p>
+            <a:pPr algn="ctr"/>
+            <a:endParaRPr lang="en-GB"/>
+          </a:p>
+        </p:txBody>
+      </p:sp>
+      <p:sp>
+        <p:nvSpPr>
+          <p:cNvPr id="68" name="TextBox 67">
+            <a:extLst>
+              <a:ext uri="{FF2B5EF4-FFF2-40B4-BE49-F238E27FC236}">
+                <a16:creationId xmlns:a16="http://schemas.microsoft.com/office/drawing/2014/main" id="{36AC6BF6-BE72-460A-B91A-06DDF26E660F}"/>
+              </a:ext>
+            </a:extLst>
+          </p:cNvPr>
+          <p:cNvSpPr txBox="1"/>
+          <p:nvPr/>
+        </p:nvSpPr>
+        <p:spPr>
+          <a:xfrm>
+            <a:off x="4387748" y="2240527"/>
+            <a:ext cx="1477706" cy="307777"/>
+          </a:xfrm>
+          <a:prstGeom prst="rect">
+            <a:avLst/>
+          </a:prstGeom>
+          <a:noFill/>
+          <a:ln>
+            <a:noFill/>
+          </a:ln>
+        </p:spPr>
+        <p:txBody>
+          <a:bodyPr wrap="square" rtlCol="0">
+            <a:spAutoFit/>
+          </a:bodyPr>
+          <a:lstStyle/>
+          <a:p>
+            <a:r>
+              <a:rPr lang="nl-NL" sz="1400" dirty="0"/>
+              <a:t>***</a:t>
+            </a:r>
+            <a:endParaRPr lang="en-GB" sz="1400" dirty="0"/>
+          </a:p>
+        </p:txBody>
+      </p:sp>
+      <p:sp>
+        <p:nvSpPr>
+          <p:cNvPr id="70" name="Rectangle 69">
+            <a:extLst>
+              <a:ext uri="{FF2B5EF4-FFF2-40B4-BE49-F238E27FC236}">
+                <a16:creationId xmlns:a16="http://schemas.microsoft.com/office/drawing/2014/main" id="{BA440C59-CF27-4654-9642-75BCA2AEF3A6}"/>
+              </a:ext>
+            </a:extLst>
+          </p:cNvPr>
+          <p:cNvSpPr/>
+          <p:nvPr/>
+        </p:nvSpPr>
+        <p:spPr>
+          <a:xfrm>
+            <a:off x="1825803" y="4455566"/>
+            <a:ext cx="224483" cy="162633"/>
+          </a:xfrm>
+          <a:prstGeom prst="rect">
+            <a:avLst/>
+          </a:prstGeom>
+          <a:solidFill>
+            <a:srgbClr val="2A9D8F"/>
+          </a:solidFill>
+          <a:ln>
+            <a:noFill/>
+          </a:ln>
+        </p:spPr>
+        <p:style>
+          <a:lnRef idx="2">
+            <a:schemeClr val="accent1">
+              <a:shade val="50000"/>
+            </a:schemeClr>
+          </a:lnRef>
+          <a:fillRef idx="1">
+            <a:schemeClr val="accent1"/>
+          </a:fillRef>
+          <a:effectRef idx="0">
+            <a:schemeClr val="accent1"/>
+          </a:effectRef>
+          <a:fontRef idx="minor">
+            <a:schemeClr val="lt1"/>
+          </a:fontRef>
+        </p:style>
+        <p:txBody>
+          <a:bodyPr rtlCol="0" anchor="ctr"/>
+          <a:lstStyle/>
+          <a:p>
+            <a:pPr algn="ctr"/>
+            <a:endParaRPr lang="en-GB"/>
+          </a:p>
+        </p:txBody>
+      </p:sp>
+      <p:sp>
+        <p:nvSpPr>
+          <p:cNvPr id="72" name="TextBox 71">
+            <a:extLst>
+              <a:ext uri="{FF2B5EF4-FFF2-40B4-BE49-F238E27FC236}">
+                <a16:creationId xmlns:a16="http://schemas.microsoft.com/office/drawing/2014/main" id="{A5A99290-10A7-4466-B74D-A80C3F4ABE61}"/>
+              </a:ext>
+            </a:extLst>
+          </p:cNvPr>
+          <p:cNvSpPr txBox="1"/>
+          <p:nvPr/>
+        </p:nvSpPr>
+        <p:spPr>
+          <a:xfrm>
+            <a:off x="2050286" y="4382993"/>
+            <a:ext cx="3354553" cy="307777"/>
+          </a:xfrm>
+          <a:prstGeom prst="rect">
+            <a:avLst/>
+          </a:prstGeom>
+          <a:noFill/>
+          <a:ln>
+            <a:noFill/>
+          </a:ln>
+        </p:spPr>
+        <p:txBody>
+          <a:bodyPr wrap="square" rtlCol="0">
+            <a:spAutoFit/>
+          </a:bodyPr>
+          <a:lstStyle/>
+          <a:p>
+            <a:r>
+              <a:rPr lang="nl-NL" sz="1400" dirty="0"/>
+              <a:t>Sequence with input values</a:t>
+            </a:r>
+          </a:p>
+        </p:txBody>
+      </p:sp>
+      <p:sp>
+        <p:nvSpPr>
+          <p:cNvPr id="74" name="Rectangle 73">
+            <a:extLst>
+              <a:ext uri="{FF2B5EF4-FFF2-40B4-BE49-F238E27FC236}">
+                <a16:creationId xmlns:a16="http://schemas.microsoft.com/office/drawing/2014/main" id="{12DF08B2-3090-4347-9A0C-7B95D3EAEB92}"/>
+              </a:ext>
+            </a:extLst>
+          </p:cNvPr>
+          <p:cNvSpPr/>
+          <p:nvPr/>
+        </p:nvSpPr>
+        <p:spPr>
+          <a:xfrm>
+            <a:off x="1825803" y="4913981"/>
+            <a:ext cx="224483" cy="162633"/>
+          </a:xfrm>
+          <a:prstGeom prst="rect">
+            <a:avLst/>
+          </a:prstGeom>
+          <a:solidFill>
+            <a:srgbClr val="E9C46A"/>
+          </a:solidFill>
+          <a:ln>
+            <a:noFill/>
+          </a:ln>
+        </p:spPr>
+        <p:style>
+          <a:lnRef idx="2">
+            <a:schemeClr val="accent1">
+              <a:shade val="50000"/>
+            </a:schemeClr>
+          </a:lnRef>
+          <a:fillRef idx="1">
+            <a:schemeClr val="accent1"/>
+          </a:fillRef>
+          <a:effectRef idx="0">
+            <a:schemeClr val="accent1"/>
+          </a:effectRef>
+          <a:fontRef idx="minor">
+            <a:schemeClr val="lt1"/>
+          </a:fontRef>
+        </p:style>
+        <p:txBody>
+          <a:bodyPr rtlCol="0" anchor="ctr"/>
+          <a:lstStyle/>
+          <a:p>
+            <a:pPr algn="ctr"/>
+            <a:endParaRPr lang="en-GB"/>
+          </a:p>
+        </p:txBody>
+      </p:sp>
+      <p:sp>
+        <p:nvSpPr>
+          <p:cNvPr id="76" name="TextBox 75">
+            <a:extLst>
+              <a:ext uri="{FF2B5EF4-FFF2-40B4-BE49-F238E27FC236}">
+                <a16:creationId xmlns:a16="http://schemas.microsoft.com/office/drawing/2014/main" id="{88576A91-3BA1-4A52-8CC2-D19F0CBFD7BF}"/>
+              </a:ext>
+            </a:extLst>
+          </p:cNvPr>
+          <p:cNvSpPr txBox="1"/>
+          <p:nvPr/>
+        </p:nvSpPr>
+        <p:spPr>
+          <a:xfrm>
+            <a:off x="2050286" y="4841408"/>
+            <a:ext cx="3354553" cy="307777"/>
+          </a:xfrm>
+          <a:prstGeom prst="rect">
+            <a:avLst/>
+          </a:prstGeom>
+          <a:noFill/>
+          <a:ln>
+            <a:noFill/>
+          </a:ln>
+        </p:spPr>
+        <p:txBody>
+          <a:bodyPr wrap="square" rtlCol="0">
+            <a:spAutoFit/>
+          </a:bodyPr>
+          <a:lstStyle/>
+          <a:p>
+            <a:r>
+              <a:rPr lang="nl-NL" sz="1400" dirty="0"/>
+              <a:t>Output/Predicted values</a:t>
+            </a:r>
+          </a:p>
+        </p:txBody>
+      </p:sp>
+      <p:sp>
+        <p:nvSpPr>
+          <p:cNvPr id="122" name="Rectangle 121">
+            <a:extLst>
+              <a:ext uri="{FF2B5EF4-FFF2-40B4-BE49-F238E27FC236}">
+                <a16:creationId xmlns:a16="http://schemas.microsoft.com/office/drawing/2014/main" id="{A7B3DDB0-B2F9-4FB9-A4AE-5FCD15584C36}"/>
+              </a:ext>
+            </a:extLst>
+          </p:cNvPr>
+          <p:cNvSpPr/>
+          <p:nvPr/>
+        </p:nvSpPr>
+        <p:spPr>
+          <a:xfrm>
+            <a:off x="1825803" y="1335153"/>
+            <a:ext cx="1658541" cy="60174"/>
+          </a:xfrm>
+          <a:prstGeom prst="rect">
+            <a:avLst/>
+          </a:prstGeom>
+          <a:solidFill>
+            <a:srgbClr val="2A9D8F"/>
+          </a:solidFill>
+          <a:ln>
+            <a:noFill/>
+          </a:ln>
+        </p:spPr>
+        <p:style>
+          <a:lnRef idx="2">
+            <a:schemeClr val="accent1">
+              <a:shade val="50000"/>
+            </a:schemeClr>
+          </a:lnRef>
+          <a:fillRef idx="1">
+            <a:schemeClr val="accent1"/>
+          </a:fillRef>
+          <a:effectRef idx="0">
+            <a:schemeClr val="accent1"/>
+          </a:effectRef>
+          <a:fontRef idx="minor">
+            <a:schemeClr val="lt1"/>
+          </a:fontRef>
+        </p:style>
+        <p:txBody>
+          <a:bodyPr rtlCol="0" anchor="ctr"/>
+          <a:lstStyle/>
+          <a:p>
+            <a:pPr algn="ctr"/>
+            <a:endParaRPr lang="en-GB"/>
+          </a:p>
+        </p:txBody>
+      </p:sp>
+      <p:sp>
+        <p:nvSpPr>
+          <p:cNvPr id="127" name="Rectangle 126">
+            <a:extLst>
+              <a:ext uri="{FF2B5EF4-FFF2-40B4-BE49-F238E27FC236}">
+                <a16:creationId xmlns:a16="http://schemas.microsoft.com/office/drawing/2014/main" id="{1146E7AA-593D-42A9-9D29-AB94CE892F9D}"/>
+              </a:ext>
+            </a:extLst>
+          </p:cNvPr>
+          <p:cNvSpPr/>
+          <p:nvPr/>
+        </p:nvSpPr>
+        <p:spPr>
+          <a:xfrm>
+            <a:off x="1825803" y="1558223"/>
+            <a:ext cx="224483" cy="60171"/>
+          </a:xfrm>
+          <a:prstGeom prst="rect">
+            <a:avLst/>
+          </a:prstGeom>
+          <a:solidFill>
+            <a:srgbClr val="264653"/>
+          </a:solidFill>
+          <a:ln>
+            <a:noFill/>
+          </a:ln>
+        </p:spPr>
+        <p:style>
+          <a:lnRef idx="2">
+            <a:schemeClr val="accent1">
+              <a:shade val="50000"/>
+            </a:schemeClr>
+          </a:lnRef>
+          <a:fillRef idx="1">
+            <a:schemeClr val="accent1"/>
+          </a:fillRef>
+          <a:effectRef idx="0">
+            <a:schemeClr val="accent1"/>
+          </a:effectRef>
+          <a:fontRef idx="minor">
+            <a:schemeClr val="lt1"/>
+          </a:fontRef>
+        </p:style>
+        <p:txBody>
+          <a:bodyPr rtlCol="0" anchor="ctr"/>
+          <a:lstStyle/>
+          <a:p>
+            <a:pPr algn="ctr"/>
+            <a:endParaRPr lang="en-GB"/>
+          </a:p>
+        </p:txBody>
+      </p:sp>
+      <p:sp>
+        <p:nvSpPr>
+          <p:cNvPr id="128" name="Rectangle 127">
+            <a:extLst>
+              <a:ext uri="{FF2B5EF4-FFF2-40B4-BE49-F238E27FC236}">
+                <a16:creationId xmlns:a16="http://schemas.microsoft.com/office/drawing/2014/main" id="{A8FFF985-04FB-4B42-922B-48BC61078943}"/>
+              </a:ext>
+            </a:extLst>
+          </p:cNvPr>
+          <p:cNvSpPr/>
+          <p:nvPr/>
+        </p:nvSpPr>
+        <p:spPr>
+          <a:xfrm>
+            <a:off x="2093298" y="1557586"/>
+            <a:ext cx="1658541" cy="60174"/>
+          </a:xfrm>
+          <a:prstGeom prst="rect">
+            <a:avLst/>
+          </a:prstGeom>
+          <a:solidFill>
+            <a:srgbClr val="2A9D8F"/>
+          </a:solidFill>
+          <a:ln>
+            <a:noFill/>
+          </a:ln>
+        </p:spPr>
+        <p:style>
+          <a:lnRef idx="2">
+            <a:schemeClr val="accent1">
+              <a:shade val="50000"/>
+            </a:schemeClr>
+          </a:lnRef>
+          <a:fillRef idx="1">
+            <a:schemeClr val="accent1"/>
+          </a:fillRef>
+          <a:effectRef idx="0">
+            <a:schemeClr val="accent1"/>
+          </a:effectRef>
+          <a:fontRef idx="minor">
+            <a:schemeClr val="lt1"/>
+          </a:fontRef>
+        </p:style>
+        <p:txBody>
+          <a:bodyPr rtlCol="0" anchor="ctr"/>
+          <a:lstStyle/>
+          <a:p>
+            <a:pPr algn="ctr"/>
+            <a:endParaRPr lang="en-GB"/>
+          </a:p>
+        </p:txBody>
+      </p:sp>
+      <p:sp>
+        <p:nvSpPr>
+          <p:cNvPr id="131" name="Rectangle 130">
+            <a:extLst>
+              <a:ext uri="{FF2B5EF4-FFF2-40B4-BE49-F238E27FC236}">
+                <a16:creationId xmlns:a16="http://schemas.microsoft.com/office/drawing/2014/main" id="{B6662A0E-EC99-4928-88E6-71A5E66D3250}"/>
+              </a:ext>
+            </a:extLst>
+          </p:cNvPr>
+          <p:cNvSpPr/>
+          <p:nvPr/>
+        </p:nvSpPr>
+        <p:spPr>
+          <a:xfrm>
+            <a:off x="1825803" y="1805878"/>
+            <a:ext cx="454104" cy="60171"/>
+          </a:xfrm>
+          <a:prstGeom prst="rect">
+            <a:avLst/>
+          </a:prstGeom>
+          <a:solidFill>
+            <a:srgbClr val="264653"/>
+          </a:solidFill>
+          <a:ln>
+            <a:noFill/>
+          </a:ln>
+        </p:spPr>
+        <p:style>
+          <a:lnRef idx="2">
+            <a:schemeClr val="accent1">
+              <a:shade val="50000"/>
+            </a:schemeClr>
+          </a:lnRef>
+          <a:fillRef idx="1">
+            <a:schemeClr val="accent1"/>
+          </a:fillRef>
+          <a:effectRef idx="0">
+            <a:schemeClr val="accent1"/>
+          </a:effectRef>
+          <a:fontRef idx="minor">
+            <a:schemeClr val="lt1"/>
+          </a:fontRef>
+        </p:style>
+        <p:txBody>
+          <a:bodyPr rtlCol="0" anchor="ctr"/>
+          <a:lstStyle/>
+          <a:p>
+            <a:pPr algn="ctr"/>
+            <a:endParaRPr lang="en-GB"/>
+          </a:p>
+        </p:txBody>
+      </p:sp>
+      <p:sp>
+        <p:nvSpPr>
+          <p:cNvPr id="132" name="Rectangle 131">
+            <a:extLst>
+              <a:ext uri="{FF2B5EF4-FFF2-40B4-BE49-F238E27FC236}">
+                <a16:creationId xmlns:a16="http://schemas.microsoft.com/office/drawing/2014/main" id="{71FB684F-B4B3-43DF-B96C-E64864D1CB49}"/>
+              </a:ext>
+            </a:extLst>
+          </p:cNvPr>
+          <p:cNvSpPr/>
+          <p:nvPr/>
+        </p:nvSpPr>
+        <p:spPr>
+          <a:xfrm>
+            <a:off x="2339600" y="1805241"/>
+            <a:ext cx="1658541" cy="60174"/>
+          </a:xfrm>
+          <a:prstGeom prst="rect">
+            <a:avLst/>
+          </a:prstGeom>
+          <a:solidFill>
+            <a:srgbClr val="2A9D8F"/>
+          </a:solidFill>
+          <a:ln>
+            <a:noFill/>
+          </a:ln>
+        </p:spPr>
+        <p:style>
+          <a:lnRef idx="2">
+            <a:schemeClr val="accent1">
+              <a:shade val="50000"/>
+            </a:schemeClr>
+          </a:lnRef>
+          <a:fillRef idx="1">
+            <a:schemeClr val="accent1"/>
+          </a:fillRef>
+          <a:effectRef idx="0">
+            <a:schemeClr val="accent1"/>
+          </a:effectRef>
+          <a:fontRef idx="minor">
+            <a:schemeClr val="lt1"/>
+          </a:fontRef>
+        </p:style>
+        <p:txBody>
+          <a:bodyPr rtlCol="0" anchor="ctr"/>
+          <a:lstStyle/>
+          <a:p>
+            <a:pPr algn="ctr"/>
+            <a:endParaRPr lang="en-GB"/>
+          </a:p>
+        </p:txBody>
+      </p:sp>
+      <p:sp>
+        <p:nvSpPr>
+          <p:cNvPr id="134" name="Rectangle 133">
+            <a:extLst>
+              <a:ext uri="{FF2B5EF4-FFF2-40B4-BE49-F238E27FC236}">
+                <a16:creationId xmlns:a16="http://schemas.microsoft.com/office/drawing/2014/main" id="{A3905574-C1CD-4537-B6B4-9B36281D5934}"/>
+              </a:ext>
+            </a:extLst>
+          </p:cNvPr>
+          <p:cNvSpPr/>
+          <p:nvPr/>
+        </p:nvSpPr>
+        <p:spPr>
+          <a:xfrm>
+            <a:off x="4323165" y="2028090"/>
+            <a:ext cx="3174913" cy="62670"/>
+          </a:xfrm>
+          <a:prstGeom prst="rect">
+            <a:avLst/>
+          </a:prstGeom>
+          <a:solidFill>
+            <a:srgbClr val="264653"/>
+          </a:solidFill>
+          <a:ln>
+            <a:noFill/>
+          </a:ln>
+        </p:spPr>
+        <p:style>
+          <a:lnRef idx="2">
+            <a:schemeClr val="accent1">
+              <a:shade val="50000"/>
+            </a:schemeClr>
+          </a:lnRef>
+          <a:fillRef idx="1">
+            <a:schemeClr val="accent1"/>
+          </a:fillRef>
+          <a:effectRef idx="0">
+            <a:schemeClr val="accent1"/>
+          </a:effectRef>
+          <a:fontRef idx="minor">
+            <a:schemeClr val="lt1"/>
+          </a:fontRef>
+        </p:style>
+        <p:txBody>
+          <a:bodyPr rtlCol="0" anchor="ctr"/>
+          <a:lstStyle/>
+          <a:p>
+            <a:pPr algn="ctr"/>
+            <a:endParaRPr lang="en-GB"/>
+          </a:p>
+        </p:txBody>
+      </p:sp>
+      <p:sp>
+        <p:nvSpPr>
+          <p:cNvPr id="135" name="Rectangle 134">
+            <a:extLst>
+              <a:ext uri="{FF2B5EF4-FFF2-40B4-BE49-F238E27FC236}">
+                <a16:creationId xmlns:a16="http://schemas.microsoft.com/office/drawing/2014/main" id="{DADABAF5-3D5F-4555-901E-AE08CA14AFE0}"/>
+              </a:ext>
+            </a:extLst>
+          </p:cNvPr>
+          <p:cNvSpPr/>
+          <p:nvPr/>
+        </p:nvSpPr>
+        <p:spPr>
+          <a:xfrm>
+            <a:off x="1825803" y="2028320"/>
+            <a:ext cx="679720" cy="60171"/>
+          </a:xfrm>
+          <a:prstGeom prst="rect">
+            <a:avLst/>
+          </a:prstGeom>
+          <a:solidFill>
+            <a:srgbClr val="264653"/>
+          </a:solidFill>
+          <a:ln>
+            <a:noFill/>
+          </a:ln>
+        </p:spPr>
+        <p:style>
+          <a:lnRef idx="2">
+            <a:schemeClr val="accent1">
+              <a:shade val="50000"/>
+            </a:schemeClr>
+          </a:lnRef>
+          <a:fillRef idx="1">
+            <a:schemeClr val="accent1"/>
+          </a:fillRef>
+          <a:effectRef idx="0">
+            <a:schemeClr val="accent1"/>
+          </a:effectRef>
+          <a:fontRef idx="minor">
+            <a:schemeClr val="lt1"/>
+          </a:fontRef>
+        </p:style>
+        <p:txBody>
+          <a:bodyPr rtlCol="0" anchor="ctr"/>
+          <a:lstStyle/>
+          <a:p>
+            <a:pPr algn="ctr"/>
+            <a:endParaRPr lang="en-GB"/>
+          </a:p>
+        </p:txBody>
+      </p:sp>
+      <p:sp>
+        <p:nvSpPr>
+          <p:cNvPr id="136" name="Rectangle 135">
+            <a:extLst>
+              <a:ext uri="{FF2B5EF4-FFF2-40B4-BE49-F238E27FC236}">
+                <a16:creationId xmlns:a16="http://schemas.microsoft.com/office/drawing/2014/main" id="{D9FA9818-F329-4A9C-995E-3B47CBE6C476}"/>
+              </a:ext>
+            </a:extLst>
+          </p:cNvPr>
+          <p:cNvSpPr/>
+          <p:nvPr/>
+        </p:nvSpPr>
+        <p:spPr>
+          <a:xfrm>
+            <a:off x="2565400" y="2027683"/>
+            <a:ext cx="1705423" cy="60174"/>
+          </a:xfrm>
+          <a:prstGeom prst="rect">
+            <a:avLst/>
+          </a:prstGeom>
+          <a:solidFill>
+            <a:srgbClr val="2A9D8F"/>
+          </a:solidFill>
+          <a:ln>
+            <a:noFill/>
+          </a:ln>
+        </p:spPr>
+        <p:style>
+          <a:lnRef idx="2">
+            <a:schemeClr val="accent1">
+              <a:shade val="50000"/>
+            </a:schemeClr>
+          </a:lnRef>
+          <a:fillRef idx="1">
+            <a:schemeClr val="accent1"/>
+          </a:fillRef>
+          <a:effectRef idx="0">
+            <a:schemeClr val="accent1"/>
+          </a:effectRef>
+          <a:fontRef idx="minor">
+            <a:schemeClr val="lt1"/>
+          </a:fontRef>
+        </p:style>
+        <p:txBody>
+          <a:bodyPr rtlCol="0" anchor="ctr"/>
+          <a:lstStyle/>
+          <a:p>
+            <a:pPr algn="ctr"/>
+            <a:endParaRPr lang="en-GB"/>
+          </a:p>
+        </p:txBody>
+      </p:sp>
+      <p:sp>
+        <p:nvSpPr>
+          <p:cNvPr id="139" name="Rectangle 138">
+            <a:extLst>
+              <a:ext uri="{FF2B5EF4-FFF2-40B4-BE49-F238E27FC236}">
+                <a16:creationId xmlns:a16="http://schemas.microsoft.com/office/drawing/2014/main" id="{E09D9221-50F5-4A50-80F5-D84EBAE28099}"/>
+              </a:ext>
+            </a:extLst>
+          </p:cNvPr>
+          <p:cNvSpPr/>
+          <p:nvPr/>
+        </p:nvSpPr>
+        <p:spPr>
+          <a:xfrm>
+            <a:off x="1825803" y="2854562"/>
+            <a:ext cx="2624400" cy="61200"/>
+          </a:xfrm>
+          <a:prstGeom prst="rect">
+            <a:avLst/>
+          </a:prstGeom>
+          <a:solidFill>
+            <a:srgbClr val="264653"/>
+          </a:solidFill>
+          <a:ln>
+            <a:noFill/>
+          </a:ln>
+        </p:spPr>
+        <p:style>
+          <a:lnRef idx="2">
+            <a:schemeClr val="accent1">
+              <a:shade val="50000"/>
+            </a:schemeClr>
+          </a:lnRef>
+          <a:fillRef idx="1">
+            <a:schemeClr val="accent1"/>
+          </a:fillRef>
+          <a:effectRef idx="0">
+            <a:schemeClr val="accent1"/>
+          </a:effectRef>
+          <a:fontRef idx="minor">
+            <a:schemeClr val="lt1"/>
+          </a:fontRef>
+        </p:style>
+        <p:txBody>
+          <a:bodyPr rtlCol="0" anchor="ctr"/>
+          <a:lstStyle/>
+          <a:p>
+            <a:pPr algn="ctr"/>
+            <a:endParaRPr lang="en-GB"/>
+          </a:p>
+        </p:txBody>
+      </p:sp>
+      <p:sp>
+        <p:nvSpPr>
+          <p:cNvPr id="140" name="Rectangle 139">
+            <a:extLst>
+              <a:ext uri="{FF2B5EF4-FFF2-40B4-BE49-F238E27FC236}">
+                <a16:creationId xmlns:a16="http://schemas.microsoft.com/office/drawing/2014/main" id="{FD181F60-274B-48F6-9914-507A16514744}"/>
+              </a:ext>
+            </a:extLst>
+          </p:cNvPr>
+          <p:cNvSpPr/>
+          <p:nvPr/>
+        </p:nvSpPr>
+        <p:spPr>
+          <a:xfrm>
+            <a:off x="4482250" y="2854093"/>
+            <a:ext cx="1705423" cy="60174"/>
+          </a:xfrm>
+          <a:prstGeom prst="rect">
+            <a:avLst/>
+          </a:prstGeom>
+          <a:solidFill>
+            <a:srgbClr val="2A9D8F"/>
+          </a:solidFill>
+          <a:ln>
+            <a:noFill/>
+          </a:ln>
+        </p:spPr>
+        <p:style>
+          <a:lnRef idx="2">
+            <a:schemeClr val="accent1">
+              <a:shade val="50000"/>
+            </a:schemeClr>
+          </a:lnRef>
+          <a:fillRef idx="1">
+            <a:schemeClr val="accent1"/>
+          </a:fillRef>
+          <a:effectRef idx="0">
+            <a:schemeClr val="accent1"/>
+          </a:effectRef>
+          <a:fontRef idx="minor">
+            <a:schemeClr val="lt1"/>
+          </a:fontRef>
+        </p:style>
+        <p:txBody>
+          <a:bodyPr rtlCol="0" anchor="ctr"/>
+          <a:lstStyle/>
+          <a:p>
+            <a:pPr algn="ctr"/>
+            <a:endParaRPr lang="en-GB"/>
+          </a:p>
+        </p:txBody>
+      </p:sp>
+      <p:sp>
+        <p:nvSpPr>
+          <p:cNvPr id="142" name="Rectangle 141">
+            <a:extLst>
+              <a:ext uri="{FF2B5EF4-FFF2-40B4-BE49-F238E27FC236}">
+                <a16:creationId xmlns:a16="http://schemas.microsoft.com/office/drawing/2014/main" id="{CB0F9E2D-80B3-40E9-91CE-AE50FA40246D}"/>
+              </a:ext>
+            </a:extLst>
+          </p:cNvPr>
+          <p:cNvSpPr/>
+          <p:nvPr/>
+        </p:nvSpPr>
+        <p:spPr>
+          <a:xfrm>
+            <a:off x="1825803" y="3065106"/>
+            <a:ext cx="2912400" cy="60171"/>
+          </a:xfrm>
+          <a:prstGeom prst="rect">
+            <a:avLst/>
+          </a:prstGeom>
+          <a:solidFill>
+            <a:srgbClr val="264653"/>
+          </a:solidFill>
+          <a:ln>
+            <a:noFill/>
+          </a:ln>
+        </p:spPr>
+        <p:style>
+          <a:lnRef idx="2">
+            <a:schemeClr val="accent1">
+              <a:shade val="50000"/>
+            </a:schemeClr>
+          </a:lnRef>
+          <a:fillRef idx="1">
+            <a:schemeClr val="accent1"/>
+          </a:fillRef>
+          <a:effectRef idx="0">
+            <a:schemeClr val="accent1"/>
+          </a:effectRef>
+          <a:fontRef idx="minor">
+            <a:schemeClr val="lt1"/>
+          </a:fontRef>
+        </p:style>
+        <p:txBody>
+          <a:bodyPr rtlCol="0" anchor="ctr"/>
+          <a:lstStyle/>
+          <a:p>
+            <a:pPr algn="ctr"/>
+            <a:endParaRPr lang="en-GB"/>
+          </a:p>
+        </p:txBody>
+      </p:sp>
+      <p:sp>
+        <p:nvSpPr>
+          <p:cNvPr id="143" name="Rectangle 142">
+            <a:extLst>
+              <a:ext uri="{FF2B5EF4-FFF2-40B4-BE49-F238E27FC236}">
+                <a16:creationId xmlns:a16="http://schemas.microsoft.com/office/drawing/2014/main" id="{E34D2DE2-480D-431F-A411-EABE75E0DD5B}"/>
+              </a:ext>
+            </a:extLst>
+          </p:cNvPr>
+          <p:cNvSpPr/>
+          <p:nvPr/>
+        </p:nvSpPr>
+        <p:spPr>
+          <a:xfrm>
+            <a:off x="4776704" y="3065104"/>
+            <a:ext cx="1670513" cy="60174"/>
+          </a:xfrm>
+          <a:prstGeom prst="rect">
+            <a:avLst/>
+          </a:prstGeom>
+          <a:solidFill>
+            <a:srgbClr val="2A9D8F"/>
+          </a:solidFill>
+          <a:ln>
+            <a:noFill/>
+          </a:ln>
+        </p:spPr>
+        <p:style>
+          <a:lnRef idx="2">
+            <a:schemeClr val="accent1">
+              <a:shade val="50000"/>
+            </a:schemeClr>
+          </a:lnRef>
+          <a:fillRef idx="1">
+            <a:schemeClr val="accent1"/>
+          </a:fillRef>
+          <a:effectRef idx="0">
+            <a:schemeClr val="accent1"/>
+          </a:effectRef>
+          <a:fontRef idx="minor">
+            <a:schemeClr val="lt1"/>
+          </a:fontRef>
+        </p:style>
+        <p:txBody>
+          <a:bodyPr rtlCol="0" anchor="ctr"/>
+          <a:lstStyle/>
+          <a:p>
+            <a:pPr algn="ctr"/>
+            <a:endParaRPr lang="en-GB"/>
+          </a:p>
+        </p:txBody>
+      </p:sp>
+      <p:sp>
+        <p:nvSpPr>
+          <p:cNvPr id="145" name="Rectangle 144">
+            <a:extLst>
+              <a:ext uri="{FF2B5EF4-FFF2-40B4-BE49-F238E27FC236}">
+                <a16:creationId xmlns:a16="http://schemas.microsoft.com/office/drawing/2014/main" id="{FF1AB6B3-A748-40A2-B8DF-C80547CFF95C}"/>
+              </a:ext>
+            </a:extLst>
+          </p:cNvPr>
+          <p:cNvSpPr/>
+          <p:nvPr/>
+        </p:nvSpPr>
+        <p:spPr>
+          <a:xfrm>
+            <a:off x="1825803" y="3281805"/>
+            <a:ext cx="3276000" cy="60171"/>
+          </a:xfrm>
+          <a:prstGeom prst="rect">
+            <a:avLst/>
+          </a:prstGeom>
+          <a:solidFill>
+            <a:srgbClr val="264653"/>
+          </a:solidFill>
+          <a:ln>
+            <a:noFill/>
+          </a:ln>
+        </p:spPr>
+        <p:style>
+          <a:lnRef idx="2">
+            <a:schemeClr val="accent1">
+              <a:shade val="50000"/>
+            </a:schemeClr>
+          </a:lnRef>
+          <a:fillRef idx="1">
+            <a:schemeClr val="accent1"/>
+          </a:fillRef>
+          <a:effectRef idx="0">
+            <a:schemeClr val="accent1"/>
+          </a:effectRef>
+          <a:fontRef idx="minor">
+            <a:schemeClr val="lt1"/>
+          </a:fontRef>
+        </p:style>
+        <p:txBody>
+          <a:bodyPr rtlCol="0" anchor="ctr"/>
+          <a:lstStyle/>
+          <a:p>
+            <a:pPr algn="ctr"/>
+            <a:endParaRPr lang="en-GB"/>
+          </a:p>
+        </p:txBody>
+      </p:sp>
+      <p:sp>
+        <p:nvSpPr>
+          <p:cNvPr id="146" name="Rectangle 145">
+            <a:extLst>
+              <a:ext uri="{FF2B5EF4-FFF2-40B4-BE49-F238E27FC236}">
+                <a16:creationId xmlns:a16="http://schemas.microsoft.com/office/drawing/2014/main" id="{61E0A813-93B3-4BFC-B976-01B3C1915BA2}"/>
+              </a:ext>
+            </a:extLst>
+          </p:cNvPr>
+          <p:cNvSpPr/>
+          <p:nvPr/>
+        </p:nvSpPr>
+        <p:spPr>
+          <a:xfrm>
+            <a:off x="5136593" y="3279284"/>
+            <a:ext cx="1607108" cy="60174"/>
+          </a:xfrm>
+          <a:prstGeom prst="rect">
+            <a:avLst/>
+          </a:prstGeom>
+          <a:solidFill>
+            <a:srgbClr val="2A9D8F"/>
+          </a:solidFill>
+          <a:ln>
+            <a:noFill/>
+          </a:ln>
+        </p:spPr>
+        <p:style>
+          <a:lnRef idx="2">
+            <a:schemeClr val="accent1">
+              <a:shade val="50000"/>
+            </a:schemeClr>
+          </a:lnRef>
+          <a:fillRef idx="1">
+            <a:schemeClr val="accent1"/>
+          </a:fillRef>
+          <a:effectRef idx="0">
+            <a:schemeClr val="accent1"/>
+          </a:effectRef>
+          <a:fontRef idx="minor">
+            <a:schemeClr val="lt1"/>
+          </a:fontRef>
+        </p:style>
+        <p:txBody>
+          <a:bodyPr rtlCol="0" anchor="ctr"/>
+          <a:lstStyle/>
+          <a:p>
+            <a:pPr algn="ctr"/>
+            <a:endParaRPr lang="en-GB"/>
+          </a:p>
+        </p:txBody>
+      </p:sp>
+      <p:sp>
+        <p:nvSpPr>
+          <p:cNvPr id="149" name="Rectangle 148">
+            <a:extLst>
+              <a:ext uri="{FF2B5EF4-FFF2-40B4-BE49-F238E27FC236}">
+                <a16:creationId xmlns:a16="http://schemas.microsoft.com/office/drawing/2014/main" id="{8A8504BC-4BBC-4E27-9AEA-332F6498321A}"/>
+              </a:ext>
+            </a:extLst>
+          </p:cNvPr>
+          <p:cNvSpPr/>
+          <p:nvPr/>
+        </p:nvSpPr>
+        <p:spPr>
+          <a:xfrm>
+            <a:off x="1825803" y="3488615"/>
+            <a:ext cx="3596400" cy="60171"/>
+          </a:xfrm>
+          <a:prstGeom prst="rect">
+            <a:avLst/>
+          </a:prstGeom>
+          <a:solidFill>
+            <a:srgbClr val="264653"/>
+          </a:solidFill>
+          <a:ln>
+            <a:noFill/>
+          </a:ln>
+        </p:spPr>
+        <p:style>
+          <a:lnRef idx="2">
+            <a:schemeClr val="accent1">
+              <a:shade val="50000"/>
+            </a:schemeClr>
+          </a:lnRef>
+          <a:fillRef idx="1">
+            <a:schemeClr val="accent1"/>
+          </a:fillRef>
+          <a:effectRef idx="0">
+            <a:schemeClr val="accent1"/>
+          </a:effectRef>
+          <a:fontRef idx="minor">
+            <a:schemeClr val="lt1"/>
+          </a:fontRef>
+        </p:style>
+        <p:txBody>
+          <a:bodyPr rtlCol="0" anchor="ctr"/>
+          <a:lstStyle/>
+          <a:p>
+            <a:pPr algn="ctr"/>
+            <a:endParaRPr lang="en-GB"/>
+          </a:p>
+        </p:txBody>
+      </p:sp>
+      <p:sp>
+        <p:nvSpPr>
+          <p:cNvPr id="150" name="Rectangle 149">
+            <a:extLst>
+              <a:ext uri="{FF2B5EF4-FFF2-40B4-BE49-F238E27FC236}">
+                <a16:creationId xmlns:a16="http://schemas.microsoft.com/office/drawing/2014/main" id="{4D0FF1B7-F3D9-4911-8EB4-AFB58A72F189}"/>
+              </a:ext>
+            </a:extLst>
+          </p:cNvPr>
+          <p:cNvSpPr/>
+          <p:nvPr/>
+        </p:nvSpPr>
+        <p:spPr>
+          <a:xfrm>
+            <a:off x="5460703" y="3489789"/>
+            <a:ext cx="1477968" cy="60174"/>
+          </a:xfrm>
+          <a:prstGeom prst="rect">
+            <a:avLst/>
+          </a:prstGeom>
+          <a:solidFill>
+            <a:srgbClr val="2A9D8F"/>
+          </a:solidFill>
+          <a:ln>
+            <a:noFill/>
+          </a:ln>
+        </p:spPr>
+        <p:style>
+          <a:lnRef idx="2">
+            <a:schemeClr val="accent1">
+              <a:shade val="50000"/>
+            </a:schemeClr>
+          </a:lnRef>
+          <a:fillRef idx="1">
+            <a:schemeClr val="accent1"/>
+          </a:fillRef>
+          <a:effectRef idx="0">
+            <a:schemeClr val="accent1"/>
+          </a:effectRef>
+          <a:fontRef idx="minor">
+            <a:schemeClr val="lt1"/>
+          </a:fontRef>
+        </p:style>
+        <p:txBody>
+          <a:bodyPr rtlCol="0" anchor="ctr"/>
+          <a:lstStyle/>
+          <a:p>
+            <a:pPr algn="ctr"/>
+            <a:endParaRPr lang="en-GB"/>
+          </a:p>
+        </p:txBody>
+      </p:sp>
+      <p:sp>
+        <p:nvSpPr>
+          <p:cNvPr id="153" name="Rectangle 152">
+            <a:extLst>
+              <a:ext uri="{FF2B5EF4-FFF2-40B4-BE49-F238E27FC236}">
+                <a16:creationId xmlns:a16="http://schemas.microsoft.com/office/drawing/2014/main" id="{D4EB60D9-9589-43C3-A792-2BE48B536904}"/>
+              </a:ext>
+            </a:extLst>
+          </p:cNvPr>
+          <p:cNvSpPr/>
+          <p:nvPr/>
+        </p:nvSpPr>
+        <p:spPr>
+          <a:xfrm>
+            <a:off x="1825803" y="3702217"/>
+            <a:ext cx="3924000" cy="60171"/>
+          </a:xfrm>
+          <a:prstGeom prst="rect">
+            <a:avLst/>
+          </a:prstGeom>
+          <a:solidFill>
+            <a:srgbClr val="264653"/>
+          </a:solidFill>
+          <a:ln>
+            <a:noFill/>
+          </a:ln>
+        </p:spPr>
+        <p:style>
+          <a:lnRef idx="2">
+            <a:schemeClr val="accent1">
+              <a:shade val="50000"/>
+            </a:schemeClr>
+          </a:lnRef>
+          <a:fillRef idx="1">
+            <a:schemeClr val="accent1"/>
+          </a:fillRef>
+          <a:effectRef idx="0">
+            <a:schemeClr val="accent1"/>
+          </a:effectRef>
+          <a:fontRef idx="minor">
+            <a:schemeClr val="lt1"/>
+          </a:fontRef>
+        </p:style>
+        <p:txBody>
+          <a:bodyPr rtlCol="0" anchor="ctr"/>
+          <a:lstStyle/>
+          <a:p>
+            <a:pPr algn="ctr"/>
+            <a:endParaRPr lang="en-GB"/>
+          </a:p>
+        </p:txBody>
+      </p:sp>
+      <p:sp>
+        <p:nvSpPr>
+          <p:cNvPr id="154" name="Rectangle 153">
+            <a:extLst>
+              <a:ext uri="{FF2B5EF4-FFF2-40B4-BE49-F238E27FC236}">
+                <a16:creationId xmlns:a16="http://schemas.microsoft.com/office/drawing/2014/main" id="{DA2806BC-E66E-4B78-BA49-F300018B4601}"/>
+              </a:ext>
+            </a:extLst>
+          </p:cNvPr>
+          <p:cNvSpPr/>
+          <p:nvPr/>
+        </p:nvSpPr>
+        <p:spPr>
+          <a:xfrm>
+            <a:off x="5791199" y="3710507"/>
+            <a:ext cx="1421063" cy="60174"/>
+          </a:xfrm>
+          <a:prstGeom prst="rect">
+            <a:avLst/>
+          </a:prstGeom>
+          <a:solidFill>
+            <a:srgbClr val="2A9D8F"/>
+          </a:solidFill>
+          <a:ln>
+            <a:noFill/>
+          </a:ln>
+        </p:spPr>
+        <p:style>
+          <a:lnRef idx="2">
+            <a:schemeClr val="accent1">
+              <a:shade val="50000"/>
+            </a:schemeClr>
+          </a:lnRef>
+          <a:fillRef idx="1">
+            <a:schemeClr val="accent1"/>
+          </a:fillRef>
+          <a:effectRef idx="0">
+            <a:schemeClr val="accent1"/>
+          </a:effectRef>
+          <a:fontRef idx="minor">
+            <a:schemeClr val="lt1"/>
+          </a:fontRef>
+        </p:style>
+        <p:txBody>
+          <a:bodyPr rtlCol="0" anchor="ctr"/>
+          <a:lstStyle/>
+          <a:p>
+            <a:pPr algn="ctr"/>
+            <a:endParaRPr lang="en-GB"/>
+          </a:p>
+        </p:txBody>
+      </p:sp>
+      <p:sp>
+        <p:nvSpPr>
+          <p:cNvPr id="166" name="TextBox 165">
+            <a:extLst>
+              <a:ext uri="{FF2B5EF4-FFF2-40B4-BE49-F238E27FC236}">
+                <a16:creationId xmlns:a16="http://schemas.microsoft.com/office/drawing/2014/main" id="{5B07AA54-EF6E-4210-8E38-5BFBFAF6E3CE}"/>
+              </a:ext>
+            </a:extLst>
+          </p:cNvPr>
+          <p:cNvSpPr txBox="1"/>
+          <p:nvPr/>
+        </p:nvSpPr>
+        <p:spPr>
+          <a:xfrm>
+            <a:off x="4387748" y="2336507"/>
+            <a:ext cx="1477706" cy="307777"/>
+          </a:xfrm>
+          <a:prstGeom prst="rect">
+            <a:avLst/>
+          </a:prstGeom>
+          <a:noFill/>
+          <a:ln>
+            <a:noFill/>
+          </a:ln>
+        </p:spPr>
+        <p:txBody>
+          <a:bodyPr wrap="square" rtlCol="0">
+            <a:spAutoFit/>
+          </a:bodyPr>
+          <a:lstStyle/>
+          <a:p>
+            <a:r>
+              <a:rPr lang="nl-NL" sz="1400" dirty="0"/>
+              <a:t>***</a:t>
+            </a:r>
+            <a:endParaRPr lang="en-GB" sz="1400" dirty="0"/>
+          </a:p>
+        </p:txBody>
+      </p:sp>
+      <p:sp>
+        <p:nvSpPr>
+          <p:cNvPr id="107" name="Rectangle 106">
+            <a:extLst>
+              <a:ext uri="{FF2B5EF4-FFF2-40B4-BE49-F238E27FC236}">
+                <a16:creationId xmlns:a16="http://schemas.microsoft.com/office/drawing/2014/main" id="{8956AD73-B2E6-4844-96BF-2389F76B6622}"/>
+              </a:ext>
+            </a:extLst>
+          </p:cNvPr>
+          <p:cNvSpPr/>
+          <p:nvPr/>
+        </p:nvSpPr>
+        <p:spPr>
+          <a:xfrm>
+            <a:off x="4319793" y="1939956"/>
+            <a:ext cx="684000" cy="60171"/>
+          </a:xfrm>
+          <a:prstGeom prst="rect">
+            <a:avLst/>
+          </a:prstGeom>
+          <a:solidFill>
+            <a:srgbClr val="264653"/>
+          </a:solidFill>
+          <a:ln>
+            <a:noFill/>
+          </a:ln>
+        </p:spPr>
+        <p:style>
+          <a:lnRef idx="2">
+            <a:schemeClr val="accent1">
+              <a:shade val="50000"/>
+            </a:schemeClr>
+          </a:lnRef>
+          <a:fillRef idx="1">
+            <a:schemeClr val="accent1"/>
+          </a:fillRef>
+          <a:effectRef idx="0">
+            <a:schemeClr val="accent1"/>
+          </a:effectRef>
+          <a:fontRef idx="minor">
+            <a:schemeClr val="lt1"/>
+          </a:fontRef>
+        </p:style>
+        <p:txBody>
+          <a:bodyPr rtlCol="0" anchor="ctr"/>
+          <a:lstStyle/>
+          <a:p>
+            <a:pPr algn="ctr"/>
+            <a:endParaRPr lang="en-GB"/>
+          </a:p>
+        </p:txBody>
+      </p:sp>
+      <p:sp>
+        <p:nvSpPr>
+          <p:cNvPr id="109" name="Rectangle 108">
+            <a:extLst>
+              <a:ext uri="{FF2B5EF4-FFF2-40B4-BE49-F238E27FC236}">
+                <a16:creationId xmlns:a16="http://schemas.microsoft.com/office/drawing/2014/main" id="{444BA6D4-C9E9-475D-8176-A8D85023CF1D}"/>
+              </a:ext>
+            </a:extLst>
+          </p:cNvPr>
+          <p:cNvSpPr/>
+          <p:nvPr/>
+        </p:nvSpPr>
+        <p:spPr>
+          <a:xfrm>
+            <a:off x="4796529" y="1715814"/>
+            <a:ext cx="213173" cy="60171"/>
+          </a:xfrm>
+          <a:prstGeom prst="rect">
+            <a:avLst/>
+          </a:prstGeom>
+          <a:solidFill>
+            <a:srgbClr val="E9C46A"/>
+          </a:solidFill>
+          <a:ln>
+            <a:noFill/>
+          </a:ln>
+        </p:spPr>
+        <p:style>
+          <a:lnRef idx="2">
+            <a:schemeClr val="accent1">
+              <a:shade val="50000"/>
+            </a:schemeClr>
+          </a:lnRef>
+          <a:fillRef idx="1">
+            <a:schemeClr val="accent1"/>
+          </a:fillRef>
+          <a:effectRef idx="0">
+            <a:schemeClr val="accent1"/>
+          </a:effectRef>
+          <a:fontRef idx="minor">
+            <a:schemeClr val="lt1"/>
+          </a:fontRef>
+        </p:style>
+        <p:txBody>
+          <a:bodyPr rtlCol="0" anchor="ctr"/>
+          <a:lstStyle/>
+          <a:p>
+            <a:pPr algn="ctr"/>
+            <a:endParaRPr lang="en-GB"/>
+          </a:p>
+        </p:txBody>
+      </p:sp>
+      <p:sp>
+        <p:nvSpPr>
+          <p:cNvPr id="110" name="Rectangle 109">
+            <a:extLst>
+              <a:ext uri="{FF2B5EF4-FFF2-40B4-BE49-F238E27FC236}">
+                <a16:creationId xmlns:a16="http://schemas.microsoft.com/office/drawing/2014/main" id="{B7D04E1D-0DB8-4D2C-BFE3-1E105B31AB2A}"/>
+              </a:ext>
+            </a:extLst>
+          </p:cNvPr>
+          <p:cNvSpPr/>
+          <p:nvPr/>
+        </p:nvSpPr>
+        <p:spPr>
+          <a:xfrm>
+            <a:off x="5054868" y="1714429"/>
+            <a:ext cx="2443210" cy="60171"/>
+          </a:xfrm>
+          <a:prstGeom prst="rect">
+            <a:avLst/>
+          </a:prstGeom>
+          <a:solidFill>
+            <a:srgbClr val="264653"/>
+          </a:solidFill>
+          <a:ln>
+            <a:noFill/>
+          </a:ln>
+        </p:spPr>
+        <p:style>
+          <a:lnRef idx="2">
+            <a:schemeClr val="accent1">
+              <a:shade val="50000"/>
+            </a:schemeClr>
+          </a:lnRef>
+          <a:fillRef idx="1">
+            <a:schemeClr val="accent1"/>
+          </a:fillRef>
+          <a:effectRef idx="0">
+            <a:schemeClr val="accent1"/>
+          </a:effectRef>
+          <a:fontRef idx="minor">
+            <a:schemeClr val="lt1"/>
+          </a:fontRef>
+        </p:style>
+        <p:txBody>
+          <a:bodyPr rtlCol="0" anchor="ctr"/>
+          <a:lstStyle/>
+          <a:p>
+            <a:pPr algn="ctr"/>
+            <a:endParaRPr lang="en-GB"/>
+          </a:p>
+        </p:txBody>
+      </p:sp>
+      <p:sp>
+        <p:nvSpPr>
+          <p:cNvPr id="111" name="Rectangle 110">
+            <a:extLst>
+              <a:ext uri="{FF2B5EF4-FFF2-40B4-BE49-F238E27FC236}">
+                <a16:creationId xmlns:a16="http://schemas.microsoft.com/office/drawing/2014/main" id="{B992DBAB-029A-471E-B1E5-7B7133C89B6A}"/>
+              </a:ext>
+            </a:extLst>
+          </p:cNvPr>
+          <p:cNvSpPr/>
+          <p:nvPr/>
+        </p:nvSpPr>
+        <p:spPr>
+          <a:xfrm>
+            <a:off x="4037334" y="1806846"/>
+            <a:ext cx="3460744" cy="62670"/>
+          </a:xfrm>
+          <a:prstGeom prst="rect">
+            <a:avLst/>
+          </a:prstGeom>
+          <a:solidFill>
+            <a:srgbClr val="264653"/>
+          </a:solidFill>
+          <a:ln>
+            <a:noFill/>
+          </a:ln>
+        </p:spPr>
+        <p:style>
+          <a:lnRef idx="2">
+            <a:schemeClr val="accent1">
+              <a:shade val="50000"/>
+            </a:schemeClr>
+          </a:lnRef>
+          <a:fillRef idx="1">
+            <a:schemeClr val="accent1"/>
+          </a:fillRef>
+          <a:effectRef idx="0">
+            <a:schemeClr val="accent1"/>
+          </a:effectRef>
+          <a:fontRef idx="minor">
+            <a:schemeClr val="lt1"/>
+          </a:fontRef>
+        </p:style>
+        <p:txBody>
+          <a:bodyPr rtlCol="0" anchor="ctr"/>
+          <a:lstStyle/>
+          <a:p>
+            <a:pPr algn="ctr"/>
+            <a:endParaRPr lang="en-GB"/>
+          </a:p>
+        </p:txBody>
+      </p:sp>
+      <p:sp>
+        <p:nvSpPr>
+          <p:cNvPr id="112" name="Rectangle 111">
+            <a:extLst>
+              <a:ext uri="{FF2B5EF4-FFF2-40B4-BE49-F238E27FC236}">
+                <a16:creationId xmlns:a16="http://schemas.microsoft.com/office/drawing/2014/main" id="{CF56E456-C6C7-43F4-AAD0-D919ED6E2F7C}"/>
+              </a:ext>
+            </a:extLst>
+          </p:cNvPr>
+          <p:cNvSpPr/>
+          <p:nvPr/>
+        </p:nvSpPr>
+        <p:spPr>
+          <a:xfrm>
+            <a:off x="4037335" y="1715815"/>
+            <a:ext cx="720000" cy="60171"/>
+          </a:xfrm>
+          <a:prstGeom prst="rect">
+            <a:avLst/>
+          </a:prstGeom>
+          <a:solidFill>
+            <a:srgbClr val="264653"/>
+          </a:solidFill>
+          <a:ln>
+            <a:noFill/>
+          </a:ln>
+        </p:spPr>
+        <p:style>
+          <a:lnRef idx="2">
+            <a:schemeClr val="accent1">
+              <a:shade val="50000"/>
+            </a:schemeClr>
+          </a:lnRef>
+          <a:fillRef idx="1">
+            <a:schemeClr val="accent1"/>
+          </a:fillRef>
+          <a:effectRef idx="0">
+            <a:schemeClr val="accent1"/>
+          </a:effectRef>
+          <a:fontRef idx="minor">
+            <a:schemeClr val="lt1"/>
+          </a:fontRef>
+        </p:style>
+        <p:txBody>
+          <a:bodyPr rtlCol="0" anchor="ctr"/>
+          <a:lstStyle/>
+          <a:p>
+            <a:pPr algn="ctr"/>
+            <a:endParaRPr lang="en-GB"/>
+          </a:p>
+        </p:txBody>
+      </p:sp>
+      <p:sp>
+        <p:nvSpPr>
+          <p:cNvPr id="113" name="Rectangle 112">
+            <a:extLst>
+              <a:ext uri="{FF2B5EF4-FFF2-40B4-BE49-F238E27FC236}">
+                <a16:creationId xmlns:a16="http://schemas.microsoft.com/office/drawing/2014/main" id="{26289E50-942B-4F99-AEE6-5946DDE5D953}"/>
+              </a:ext>
+            </a:extLst>
+          </p:cNvPr>
+          <p:cNvSpPr/>
+          <p:nvPr/>
+        </p:nvSpPr>
+        <p:spPr>
+          <a:xfrm>
+            <a:off x="4544162" y="1464761"/>
+            <a:ext cx="213173" cy="60171"/>
+          </a:xfrm>
+          <a:prstGeom prst="rect">
+            <a:avLst/>
+          </a:prstGeom>
+          <a:solidFill>
+            <a:srgbClr val="E9C46A"/>
+          </a:solidFill>
+          <a:ln>
+            <a:noFill/>
+          </a:ln>
+        </p:spPr>
+        <p:style>
+          <a:lnRef idx="2">
+            <a:schemeClr val="accent1">
+              <a:shade val="50000"/>
+            </a:schemeClr>
+          </a:lnRef>
+          <a:fillRef idx="1">
+            <a:schemeClr val="accent1"/>
+          </a:fillRef>
+          <a:effectRef idx="0">
+            <a:schemeClr val="accent1"/>
+          </a:effectRef>
+          <a:fontRef idx="minor">
+            <a:schemeClr val="lt1"/>
+          </a:fontRef>
+        </p:style>
+        <p:txBody>
+          <a:bodyPr rtlCol="0" anchor="ctr"/>
+          <a:lstStyle/>
+          <a:p>
+            <a:pPr algn="ctr"/>
+            <a:endParaRPr lang="en-GB"/>
+          </a:p>
+        </p:txBody>
+      </p:sp>
+      <p:sp>
+        <p:nvSpPr>
+          <p:cNvPr id="114" name="Rectangle 113">
+            <a:extLst>
+              <a:ext uri="{FF2B5EF4-FFF2-40B4-BE49-F238E27FC236}">
+                <a16:creationId xmlns:a16="http://schemas.microsoft.com/office/drawing/2014/main" id="{109213E4-9ABD-47C1-9B76-5075CBD78D08}"/>
+              </a:ext>
+            </a:extLst>
+          </p:cNvPr>
+          <p:cNvSpPr/>
+          <p:nvPr/>
+        </p:nvSpPr>
+        <p:spPr>
+          <a:xfrm>
+            <a:off x="4796528" y="1467999"/>
+            <a:ext cx="2700000" cy="60171"/>
+          </a:xfrm>
+          <a:prstGeom prst="rect">
+            <a:avLst/>
+          </a:prstGeom>
+          <a:solidFill>
+            <a:srgbClr val="264653"/>
+          </a:solidFill>
+          <a:ln>
+            <a:noFill/>
+          </a:ln>
+        </p:spPr>
+        <p:style>
+          <a:lnRef idx="2">
+            <a:schemeClr val="accent1">
+              <a:shade val="50000"/>
+            </a:schemeClr>
+          </a:lnRef>
+          <a:fillRef idx="1">
+            <a:schemeClr val="accent1"/>
+          </a:fillRef>
+          <a:effectRef idx="0">
+            <a:schemeClr val="accent1"/>
+          </a:effectRef>
+          <a:fontRef idx="minor">
+            <a:schemeClr val="lt1"/>
+          </a:fontRef>
+        </p:style>
+        <p:txBody>
+          <a:bodyPr rtlCol="0" anchor="ctr"/>
+          <a:lstStyle/>
+          <a:p>
+            <a:pPr algn="ctr"/>
+            <a:endParaRPr lang="en-GB"/>
+          </a:p>
+        </p:txBody>
+      </p:sp>
+      <p:sp>
+        <p:nvSpPr>
+          <p:cNvPr id="115" name="Rectangle 114">
+            <a:extLst>
+              <a:ext uri="{FF2B5EF4-FFF2-40B4-BE49-F238E27FC236}">
+                <a16:creationId xmlns:a16="http://schemas.microsoft.com/office/drawing/2014/main" id="{F518D4EE-174E-4E7D-8648-A8A646318DC8}"/>
+              </a:ext>
+            </a:extLst>
+          </p:cNvPr>
+          <p:cNvSpPr/>
+          <p:nvPr/>
+        </p:nvSpPr>
+        <p:spPr>
+          <a:xfrm>
+            <a:off x="3794850" y="1555793"/>
+            <a:ext cx="3703228" cy="62670"/>
+          </a:xfrm>
+          <a:prstGeom prst="rect">
+            <a:avLst/>
+          </a:prstGeom>
+          <a:solidFill>
+            <a:srgbClr val="264653"/>
+          </a:solidFill>
+          <a:ln>
+            <a:noFill/>
+          </a:ln>
+        </p:spPr>
+        <p:style>
+          <a:lnRef idx="2">
+            <a:schemeClr val="accent1">
+              <a:shade val="50000"/>
+            </a:schemeClr>
+          </a:lnRef>
+          <a:fillRef idx="1">
+            <a:schemeClr val="accent1"/>
+          </a:fillRef>
+          <a:effectRef idx="0">
+            <a:schemeClr val="accent1"/>
+          </a:effectRef>
+          <a:fontRef idx="minor">
+            <a:schemeClr val="lt1"/>
+          </a:fontRef>
+        </p:style>
+        <p:txBody>
+          <a:bodyPr rtlCol="0" anchor="ctr"/>
+          <a:lstStyle/>
+          <a:p>
+            <a:pPr algn="ctr"/>
+            <a:endParaRPr lang="en-GB"/>
+          </a:p>
+        </p:txBody>
+      </p:sp>
+      <p:sp>
+        <p:nvSpPr>
+          <p:cNvPr id="116" name="Rectangle 115">
+            <a:extLst>
+              <a:ext uri="{FF2B5EF4-FFF2-40B4-BE49-F238E27FC236}">
+                <a16:creationId xmlns:a16="http://schemas.microsoft.com/office/drawing/2014/main" id="{F800B032-1E78-4EB4-AC3C-64A12503C690}"/>
+              </a:ext>
+            </a:extLst>
+          </p:cNvPr>
+          <p:cNvSpPr/>
+          <p:nvPr/>
+        </p:nvSpPr>
+        <p:spPr>
+          <a:xfrm>
+            <a:off x="3794850" y="1464762"/>
+            <a:ext cx="710117" cy="62670"/>
+          </a:xfrm>
+          <a:prstGeom prst="rect">
+            <a:avLst/>
+          </a:prstGeom>
+          <a:solidFill>
+            <a:srgbClr val="264653"/>
+          </a:solidFill>
+          <a:ln>
+            <a:noFill/>
+          </a:ln>
+        </p:spPr>
+        <p:style>
+          <a:lnRef idx="2">
+            <a:schemeClr val="accent1">
+              <a:shade val="50000"/>
+            </a:schemeClr>
+          </a:lnRef>
+          <a:fillRef idx="1">
+            <a:schemeClr val="accent1"/>
+          </a:fillRef>
+          <a:effectRef idx="0">
+            <a:schemeClr val="accent1"/>
+          </a:effectRef>
+          <a:fontRef idx="minor">
+            <a:schemeClr val="lt1"/>
+          </a:fontRef>
+        </p:style>
+        <p:txBody>
+          <a:bodyPr rtlCol="0" anchor="ctr"/>
+          <a:lstStyle/>
+          <a:p>
+            <a:pPr algn="ctr"/>
+            <a:endParaRPr lang="en-GB"/>
+          </a:p>
+        </p:txBody>
+      </p:sp>
+      <p:sp>
+        <p:nvSpPr>
+          <p:cNvPr id="117" name="Rectangle 116">
+            <a:extLst>
+              <a:ext uri="{FF2B5EF4-FFF2-40B4-BE49-F238E27FC236}">
+                <a16:creationId xmlns:a16="http://schemas.microsoft.com/office/drawing/2014/main" id="{22E430ED-0B63-4583-B0A4-5C1F68E968A0}"/>
+              </a:ext>
+            </a:extLst>
+          </p:cNvPr>
+          <p:cNvSpPr/>
+          <p:nvPr/>
+        </p:nvSpPr>
+        <p:spPr>
+          <a:xfrm>
+            <a:off x="4291794" y="1238627"/>
+            <a:ext cx="213173" cy="60171"/>
+          </a:xfrm>
+          <a:prstGeom prst="rect">
+            <a:avLst/>
+          </a:prstGeom>
+          <a:solidFill>
+            <a:srgbClr val="E9C46A"/>
+          </a:solidFill>
+          <a:ln>
+            <a:noFill/>
+          </a:ln>
+        </p:spPr>
+        <p:style>
+          <a:lnRef idx="2">
+            <a:schemeClr val="accent1">
+              <a:shade val="50000"/>
+            </a:schemeClr>
+          </a:lnRef>
+          <a:fillRef idx="1">
+            <a:schemeClr val="accent1"/>
+          </a:fillRef>
+          <a:effectRef idx="0">
+            <a:schemeClr val="accent1"/>
+          </a:effectRef>
+          <a:fontRef idx="minor">
+            <a:schemeClr val="lt1"/>
+          </a:fontRef>
+        </p:style>
+        <p:txBody>
+          <a:bodyPr rtlCol="0" anchor="ctr"/>
+          <a:lstStyle/>
+          <a:p>
+            <a:pPr algn="ctr"/>
+            <a:endParaRPr lang="en-GB"/>
+          </a:p>
+        </p:txBody>
+      </p:sp>
+      <p:sp>
+        <p:nvSpPr>
+          <p:cNvPr id="118" name="Rectangle 117">
+            <a:extLst>
+              <a:ext uri="{FF2B5EF4-FFF2-40B4-BE49-F238E27FC236}">
+                <a16:creationId xmlns:a16="http://schemas.microsoft.com/office/drawing/2014/main" id="{0C6A75D1-DA20-44C5-B8ED-D06E09F7B17A}"/>
+              </a:ext>
+            </a:extLst>
+          </p:cNvPr>
+          <p:cNvSpPr/>
+          <p:nvPr/>
+        </p:nvSpPr>
+        <p:spPr>
+          <a:xfrm>
+            <a:off x="4544162" y="1239792"/>
+            <a:ext cx="2952000" cy="60171"/>
+          </a:xfrm>
+          <a:prstGeom prst="rect">
+            <a:avLst/>
+          </a:prstGeom>
+          <a:solidFill>
+            <a:srgbClr val="264653"/>
+          </a:solidFill>
+          <a:ln>
+            <a:noFill/>
+          </a:ln>
+        </p:spPr>
+        <p:style>
+          <a:lnRef idx="2">
+            <a:schemeClr val="accent1">
+              <a:shade val="50000"/>
+            </a:schemeClr>
+          </a:lnRef>
+          <a:fillRef idx="1">
+            <a:schemeClr val="accent1"/>
+          </a:fillRef>
+          <a:effectRef idx="0">
+            <a:schemeClr val="accent1"/>
+          </a:effectRef>
+          <a:fontRef idx="minor">
+            <a:schemeClr val="lt1"/>
+          </a:fontRef>
+        </p:style>
+        <p:txBody>
+          <a:bodyPr rtlCol="0" anchor="ctr"/>
+          <a:lstStyle/>
+          <a:p>
+            <a:pPr algn="ctr"/>
+            <a:endParaRPr lang="en-GB"/>
+          </a:p>
+        </p:txBody>
+      </p:sp>
+      <p:sp>
+        <p:nvSpPr>
+          <p:cNvPr id="119" name="Rectangle 118">
+            <a:extLst>
+              <a:ext uri="{FF2B5EF4-FFF2-40B4-BE49-F238E27FC236}">
+                <a16:creationId xmlns:a16="http://schemas.microsoft.com/office/drawing/2014/main" id="{43CC75C1-DEC2-4FD9-8CB6-D9785F941FD7}"/>
+              </a:ext>
+            </a:extLst>
+          </p:cNvPr>
+          <p:cNvSpPr/>
+          <p:nvPr/>
+        </p:nvSpPr>
+        <p:spPr>
+          <a:xfrm>
+            <a:off x="3533846" y="1327586"/>
+            <a:ext cx="3960000" cy="62670"/>
+          </a:xfrm>
+          <a:prstGeom prst="rect">
+            <a:avLst/>
+          </a:prstGeom>
+          <a:solidFill>
+            <a:srgbClr val="264653"/>
+          </a:solidFill>
+          <a:ln>
+            <a:noFill/>
+          </a:ln>
+        </p:spPr>
+        <p:style>
+          <a:lnRef idx="2">
+            <a:schemeClr val="accent1">
+              <a:shade val="50000"/>
+            </a:schemeClr>
+          </a:lnRef>
+          <a:fillRef idx="1">
+            <a:schemeClr val="accent1"/>
+          </a:fillRef>
+          <a:effectRef idx="0">
+            <a:schemeClr val="accent1"/>
+          </a:effectRef>
+          <a:fontRef idx="minor">
+            <a:schemeClr val="lt1"/>
+          </a:fontRef>
+        </p:style>
+        <p:txBody>
+          <a:bodyPr rtlCol="0" anchor="ctr"/>
+          <a:lstStyle/>
+          <a:p>
+            <a:pPr algn="ctr"/>
+            <a:endParaRPr lang="en-GB"/>
+          </a:p>
+        </p:txBody>
+      </p:sp>
+      <p:sp>
+        <p:nvSpPr>
+          <p:cNvPr id="120" name="Rectangle 119">
+            <a:extLst>
+              <a:ext uri="{FF2B5EF4-FFF2-40B4-BE49-F238E27FC236}">
+                <a16:creationId xmlns:a16="http://schemas.microsoft.com/office/drawing/2014/main" id="{8C90EF89-F3B0-4A35-B3DD-3AAEF9B88E4A}"/>
+              </a:ext>
+            </a:extLst>
+          </p:cNvPr>
+          <p:cNvSpPr/>
+          <p:nvPr/>
+        </p:nvSpPr>
+        <p:spPr>
+          <a:xfrm>
+            <a:off x="3533846" y="1236555"/>
+            <a:ext cx="710117" cy="62670"/>
+          </a:xfrm>
+          <a:prstGeom prst="rect">
+            <a:avLst/>
+          </a:prstGeom>
+          <a:solidFill>
+            <a:srgbClr val="264653"/>
+          </a:solidFill>
+          <a:ln>
+            <a:noFill/>
+          </a:ln>
+        </p:spPr>
+        <p:style>
+          <a:lnRef idx="2">
+            <a:schemeClr val="accent1">
+              <a:shade val="50000"/>
+            </a:schemeClr>
+          </a:lnRef>
+          <a:fillRef idx="1">
+            <a:schemeClr val="accent1"/>
+          </a:fillRef>
+          <a:effectRef idx="0">
+            <a:schemeClr val="accent1"/>
+          </a:effectRef>
+          <a:fontRef idx="minor">
+            <a:schemeClr val="lt1"/>
+          </a:fontRef>
+        </p:style>
+        <p:txBody>
+          <a:bodyPr rtlCol="0" anchor="ctr"/>
+          <a:lstStyle/>
+          <a:p>
+            <a:pPr algn="ctr"/>
+            <a:endParaRPr lang="en-GB"/>
+          </a:p>
+        </p:txBody>
+      </p:sp>
+      <p:sp>
+        <p:nvSpPr>
+          <p:cNvPr id="121" name="Rectangle 120">
+            <a:extLst>
+              <a:ext uri="{FF2B5EF4-FFF2-40B4-BE49-F238E27FC236}">
+                <a16:creationId xmlns:a16="http://schemas.microsoft.com/office/drawing/2014/main" id="{8E8ACC17-9B4B-495F-9200-5ED9584DAB48}"/>
+              </a:ext>
+            </a:extLst>
+          </p:cNvPr>
+          <p:cNvSpPr/>
+          <p:nvPr/>
+        </p:nvSpPr>
+        <p:spPr>
+          <a:xfrm>
+            <a:off x="6229984" y="2759039"/>
+            <a:ext cx="710117" cy="61200"/>
+          </a:xfrm>
+          <a:prstGeom prst="rect">
+            <a:avLst/>
+          </a:prstGeom>
+          <a:solidFill>
+            <a:srgbClr val="264653"/>
+          </a:solidFill>
+          <a:ln>
+            <a:noFill/>
+          </a:ln>
+        </p:spPr>
+        <p:style>
+          <a:lnRef idx="2">
+            <a:schemeClr val="accent1">
+              <a:shade val="50000"/>
+            </a:schemeClr>
+          </a:lnRef>
+          <a:fillRef idx="1">
+            <a:schemeClr val="accent1"/>
+          </a:fillRef>
+          <a:effectRef idx="0">
+            <a:schemeClr val="accent1"/>
+          </a:effectRef>
+          <a:fontRef idx="minor">
+            <a:schemeClr val="lt1"/>
+          </a:fontRef>
+        </p:style>
+        <p:txBody>
+          <a:bodyPr rtlCol="0" anchor="ctr"/>
+          <a:lstStyle/>
+          <a:p>
+            <a:pPr algn="ctr"/>
+            <a:endParaRPr lang="en-GB"/>
+          </a:p>
+        </p:txBody>
+      </p:sp>
+      <p:sp>
+        <p:nvSpPr>
+          <p:cNvPr id="167" name="Rectangle 166">
+            <a:extLst>
+              <a:ext uri="{FF2B5EF4-FFF2-40B4-BE49-F238E27FC236}">
+                <a16:creationId xmlns:a16="http://schemas.microsoft.com/office/drawing/2014/main" id="{2A7469EC-C45C-4001-A3CB-208B2FBD4C80}"/>
+              </a:ext>
+            </a:extLst>
+          </p:cNvPr>
+          <p:cNvSpPr/>
+          <p:nvPr/>
+        </p:nvSpPr>
+        <p:spPr>
+          <a:xfrm>
+            <a:off x="6228554" y="2856891"/>
+            <a:ext cx="1254441" cy="61200"/>
+          </a:xfrm>
+          <a:prstGeom prst="rect">
+            <a:avLst/>
+          </a:prstGeom>
+          <a:solidFill>
+            <a:srgbClr val="264653"/>
+          </a:solidFill>
+          <a:ln>
+            <a:noFill/>
+          </a:ln>
+        </p:spPr>
+        <p:style>
+          <a:lnRef idx="2">
+            <a:schemeClr val="accent1">
+              <a:shade val="50000"/>
+            </a:schemeClr>
+          </a:lnRef>
+          <a:fillRef idx="1">
+            <a:schemeClr val="accent1"/>
+          </a:fillRef>
+          <a:effectRef idx="0">
+            <a:schemeClr val="accent1"/>
+          </a:effectRef>
+          <a:fontRef idx="minor">
+            <a:schemeClr val="lt1"/>
+          </a:fontRef>
+        </p:style>
+        <p:txBody>
+          <a:bodyPr rtlCol="0" anchor="ctr"/>
+          <a:lstStyle/>
+          <a:p>
+            <a:pPr algn="ctr"/>
+            <a:endParaRPr lang="en-GB"/>
+          </a:p>
+        </p:txBody>
+      </p:sp>
+      <p:sp>
+        <p:nvSpPr>
+          <p:cNvPr id="168" name="Rectangle 167">
+            <a:extLst>
+              <a:ext uri="{FF2B5EF4-FFF2-40B4-BE49-F238E27FC236}">
+                <a16:creationId xmlns:a16="http://schemas.microsoft.com/office/drawing/2014/main" id="{B091A4B3-4AE9-41FA-B5A6-A11B0E92D3A7}"/>
+              </a:ext>
+            </a:extLst>
+          </p:cNvPr>
+          <p:cNvSpPr/>
+          <p:nvPr/>
+        </p:nvSpPr>
+        <p:spPr>
+          <a:xfrm>
+            <a:off x="6505606" y="2968439"/>
+            <a:ext cx="710117" cy="61200"/>
+          </a:xfrm>
+          <a:prstGeom prst="rect">
+            <a:avLst/>
+          </a:prstGeom>
+          <a:solidFill>
+            <a:srgbClr val="264653"/>
+          </a:solidFill>
+          <a:ln>
+            <a:noFill/>
+          </a:ln>
+        </p:spPr>
+        <p:style>
+          <a:lnRef idx="2">
+            <a:schemeClr val="accent1">
+              <a:shade val="50000"/>
+            </a:schemeClr>
+          </a:lnRef>
+          <a:fillRef idx="1">
+            <a:schemeClr val="accent1"/>
+          </a:fillRef>
+          <a:effectRef idx="0">
+            <a:schemeClr val="accent1"/>
+          </a:effectRef>
+          <a:fontRef idx="minor">
+            <a:schemeClr val="lt1"/>
+          </a:fontRef>
+        </p:style>
+        <p:txBody>
+          <a:bodyPr rtlCol="0" anchor="ctr"/>
+          <a:lstStyle/>
+          <a:p>
+            <a:pPr algn="ctr"/>
+            <a:endParaRPr lang="en-GB"/>
+          </a:p>
+        </p:txBody>
+      </p:sp>
+      <p:sp>
+        <p:nvSpPr>
+          <p:cNvPr id="169" name="Rectangle 168">
+            <a:extLst>
+              <a:ext uri="{FF2B5EF4-FFF2-40B4-BE49-F238E27FC236}">
+                <a16:creationId xmlns:a16="http://schemas.microsoft.com/office/drawing/2014/main" id="{606EFEEB-314C-458A-B70E-351A06E4B868}"/>
+              </a:ext>
+            </a:extLst>
+          </p:cNvPr>
+          <p:cNvSpPr/>
+          <p:nvPr/>
+        </p:nvSpPr>
+        <p:spPr>
+          <a:xfrm>
+            <a:off x="6504176" y="3066291"/>
+            <a:ext cx="978819" cy="61200"/>
+          </a:xfrm>
+          <a:prstGeom prst="rect">
+            <a:avLst/>
+          </a:prstGeom>
+          <a:solidFill>
+            <a:srgbClr val="264653"/>
+          </a:solidFill>
+          <a:ln>
+            <a:noFill/>
+          </a:ln>
+        </p:spPr>
+        <p:style>
+          <a:lnRef idx="2">
+            <a:schemeClr val="accent1">
+              <a:shade val="50000"/>
+            </a:schemeClr>
+          </a:lnRef>
+          <a:fillRef idx="1">
+            <a:schemeClr val="accent1"/>
+          </a:fillRef>
+          <a:effectRef idx="0">
+            <a:schemeClr val="accent1"/>
+          </a:effectRef>
+          <a:fontRef idx="minor">
+            <a:schemeClr val="lt1"/>
+          </a:fontRef>
+        </p:style>
+        <p:txBody>
+          <a:bodyPr rtlCol="0" anchor="ctr"/>
+          <a:lstStyle/>
+          <a:p>
+            <a:pPr algn="ctr"/>
+            <a:endParaRPr lang="en-GB"/>
+          </a:p>
+        </p:txBody>
+      </p:sp>
+      <p:sp>
+        <p:nvSpPr>
+          <p:cNvPr id="170" name="Rectangle 169">
+            <a:extLst>
+              <a:ext uri="{FF2B5EF4-FFF2-40B4-BE49-F238E27FC236}">
+                <a16:creationId xmlns:a16="http://schemas.microsoft.com/office/drawing/2014/main" id="{48ED24A2-8558-4233-8EA2-85E330B83569}"/>
+              </a:ext>
+            </a:extLst>
+          </p:cNvPr>
+          <p:cNvSpPr/>
+          <p:nvPr/>
+        </p:nvSpPr>
+        <p:spPr>
+          <a:xfrm>
+            <a:off x="6774308" y="3180045"/>
+            <a:ext cx="710117" cy="61200"/>
+          </a:xfrm>
+          <a:prstGeom prst="rect">
+            <a:avLst/>
+          </a:prstGeom>
+          <a:solidFill>
+            <a:srgbClr val="264653"/>
+          </a:solidFill>
+          <a:ln>
+            <a:noFill/>
+          </a:ln>
+        </p:spPr>
+        <p:style>
+          <a:lnRef idx="2">
+            <a:schemeClr val="accent1">
+              <a:shade val="50000"/>
+            </a:schemeClr>
+          </a:lnRef>
+          <a:fillRef idx="1">
+            <a:schemeClr val="accent1"/>
+          </a:fillRef>
+          <a:effectRef idx="0">
+            <a:schemeClr val="accent1"/>
+          </a:effectRef>
+          <a:fontRef idx="minor">
+            <a:schemeClr val="lt1"/>
+          </a:fontRef>
+        </p:style>
+        <p:txBody>
+          <a:bodyPr rtlCol="0" anchor="ctr"/>
+          <a:lstStyle/>
+          <a:p>
+            <a:pPr algn="ctr"/>
+            <a:endParaRPr lang="en-GB"/>
+          </a:p>
+        </p:txBody>
+      </p:sp>
+      <p:sp>
+        <p:nvSpPr>
+          <p:cNvPr id="171" name="Rectangle 170">
+            <a:extLst>
+              <a:ext uri="{FF2B5EF4-FFF2-40B4-BE49-F238E27FC236}">
+                <a16:creationId xmlns:a16="http://schemas.microsoft.com/office/drawing/2014/main" id="{5AD8C0C3-87EA-45D6-82FC-F0BA89F1D625}"/>
+              </a:ext>
+            </a:extLst>
+          </p:cNvPr>
+          <p:cNvSpPr/>
+          <p:nvPr/>
+        </p:nvSpPr>
+        <p:spPr>
+          <a:xfrm>
+            <a:off x="6772878" y="3277897"/>
+            <a:ext cx="710117" cy="61200"/>
+          </a:xfrm>
+          <a:prstGeom prst="rect">
+            <a:avLst/>
+          </a:prstGeom>
+          <a:solidFill>
+            <a:srgbClr val="264653"/>
+          </a:solidFill>
+          <a:ln>
+            <a:noFill/>
+          </a:ln>
+        </p:spPr>
+        <p:style>
+          <a:lnRef idx="2">
+            <a:schemeClr val="accent1">
+              <a:shade val="50000"/>
+            </a:schemeClr>
+          </a:lnRef>
+          <a:fillRef idx="1">
+            <a:schemeClr val="accent1"/>
+          </a:fillRef>
+          <a:effectRef idx="0">
+            <a:schemeClr val="accent1"/>
+          </a:effectRef>
+          <a:fontRef idx="minor">
+            <a:schemeClr val="lt1"/>
+          </a:fontRef>
+        </p:style>
+        <p:txBody>
+          <a:bodyPr rtlCol="0" anchor="ctr"/>
+          <a:lstStyle/>
+          <a:p>
+            <a:pPr algn="ctr"/>
+            <a:endParaRPr lang="en-GB"/>
+          </a:p>
+        </p:txBody>
+      </p:sp>
+      <p:sp>
+        <p:nvSpPr>
+          <p:cNvPr id="172" name="Rectangle 171">
+            <a:extLst>
+              <a:ext uri="{FF2B5EF4-FFF2-40B4-BE49-F238E27FC236}">
+                <a16:creationId xmlns:a16="http://schemas.microsoft.com/office/drawing/2014/main" id="{D6EEBB7F-5386-499C-B9FA-F00A5F4AD810}"/>
+              </a:ext>
+            </a:extLst>
+          </p:cNvPr>
+          <p:cNvSpPr/>
+          <p:nvPr/>
+        </p:nvSpPr>
+        <p:spPr>
+          <a:xfrm>
+            <a:off x="6999090" y="3390931"/>
+            <a:ext cx="480078" cy="61200"/>
+          </a:xfrm>
+          <a:prstGeom prst="rect">
+            <a:avLst/>
+          </a:prstGeom>
+          <a:solidFill>
+            <a:srgbClr val="264653"/>
+          </a:solidFill>
+          <a:ln>
+            <a:noFill/>
+          </a:ln>
+        </p:spPr>
+        <p:style>
+          <a:lnRef idx="2">
+            <a:schemeClr val="accent1">
+              <a:shade val="50000"/>
+            </a:schemeClr>
+          </a:lnRef>
+          <a:fillRef idx="1">
+            <a:schemeClr val="accent1"/>
+          </a:fillRef>
+          <a:effectRef idx="0">
+            <a:schemeClr val="accent1"/>
+          </a:effectRef>
+          <a:fontRef idx="minor">
+            <a:schemeClr val="lt1"/>
+          </a:fontRef>
+        </p:style>
+        <p:txBody>
+          <a:bodyPr rtlCol="0" anchor="ctr"/>
+          <a:lstStyle/>
+          <a:p>
+            <a:pPr algn="ctr"/>
+            <a:endParaRPr lang="en-GB"/>
+          </a:p>
+        </p:txBody>
+      </p:sp>
+      <p:sp>
+        <p:nvSpPr>
+          <p:cNvPr id="173" name="Rectangle 172">
+            <a:extLst>
+              <a:ext uri="{FF2B5EF4-FFF2-40B4-BE49-F238E27FC236}">
+                <a16:creationId xmlns:a16="http://schemas.microsoft.com/office/drawing/2014/main" id="{CFD2EF6C-9D83-4554-ABB4-80E4595F0AEC}"/>
+              </a:ext>
+            </a:extLst>
+          </p:cNvPr>
+          <p:cNvSpPr/>
+          <p:nvPr/>
+        </p:nvSpPr>
+        <p:spPr>
+          <a:xfrm>
+            <a:off x="6997660" y="3488783"/>
+            <a:ext cx="480078" cy="61200"/>
+          </a:xfrm>
+          <a:prstGeom prst="rect">
+            <a:avLst/>
+          </a:prstGeom>
+          <a:solidFill>
+            <a:srgbClr val="264653"/>
+          </a:solidFill>
+          <a:ln>
+            <a:noFill/>
+          </a:ln>
+        </p:spPr>
+        <p:style>
+          <a:lnRef idx="2">
+            <a:schemeClr val="accent1">
+              <a:shade val="50000"/>
+            </a:schemeClr>
+          </a:lnRef>
+          <a:fillRef idx="1">
+            <a:schemeClr val="accent1"/>
+          </a:fillRef>
+          <a:effectRef idx="0">
+            <a:schemeClr val="accent1"/>
+          </a:effectRef>
+          <a:fontRef idx="minor">
+            <a:schemeClr val="lt1"/>
+          </a:fontRef>
+        </p:style>
+        <p:txBody>
+          <a:bodyPr rtlCol="0" anchor="ctr"/>
+          <a:lstStyle/>
+          <a:p>
+            <a:pPr algn="ctr"/>
+            <a:endParaRPr lang="en-GB"/>
+          </a:p>
+        </p:txBody>
+      </p:sp>
+      <p:sp>
+        <p:nvSpPr>
+          <p:cNvPr id="174" name="Rectangle 173">
+            <a:extLst>
+              <a:ext uri="{FF2B5EF4-FFF2-40B4-BE49-F238E27FC236}">
+                <a16:creationId xmlns:a16="http://schemas.microsoft.com/office/drawing/2014/main" id="{BC1BDDDA-4BEA-45F7-935F-2F325092713F}"/>
+              </a:ext>
+            </a:extLst>
+          </p:cNvPr>
+          <p:cNvSpPr/>
+          <p:nvPr/>
+        </p:nvSpPr>
+        <p:spPr>
+          <a:xfrm>
+            <a:off x="7266047" y="3614286"/>
+            <a:ext cx="211691" cy="61200"/>
+          </a:xfrm>
+          <a:prstGeom prst="rect">
+            <a:avLst/>
+          </a:prstGeom>
+          <a:solidFill>
+            <a:srgbClr val="264653"/>
+          </a:solidFill>
+          <a:ln>
+            <a:noFill/>
+          </a:ln>
+        </p:spPr>
+        <p:style>
+          <a:lnRef idx="2">
+            <a:schemeClr val="accent1">
+              <a:shade val="50000"/>
+            </a:schemeClr>
+          </a:lnRef>
+          <a:fillRef idx="1">
+            <a:schemeClr val="accent1"/>
+          </a:fillRef>
+          <a:effectRef idx="0">
+            <a:schemeClr val="accent1"/>
+          </a:effectRef>
+          <a:fontRef idx="minor">
+            <a:schemeClr val="lt1"/>
+          </a:fontRef>
+        </p:style>
+        <p:txBody>
+          <a:bodyPr rtlCol="0" anchor="ctr"/>
+          <a:lstStyle/>
+          <a:p>
+            <a:pPr algn="ctr"/>
+            <a:endParaRPr lang="en-GB"/>
+          </a:p>
+        </p:txBody>
+      </p:sp>
+      <p:sp>
+        <p:nvSpPr>
+          <p:cNvPr id="175" name="Rectangle 174">
+            <a:extLst>
+              <a:ext uri="{FF2B5EF4-FFF2-40B4-BE49-F238E27FC236}">
+                <a16:creationId xmlns:a16="http://schemas.microsoft.com/office/drawing/2014/main" id="{CB72B121-5386-4AA2-A8AD-97B01DBA0E64}"/>
+              </a:ext>
+            </a:extLst>
+          </p:cNvPr>
+          <p:cNvSpPr/>
+          <p:nvPr/>
+        </p:nvSpPr>
+        <p:spPr>
+          <a:xfrm>
+            <a:off x="7264617" y="3712138"/>
+            <a:ext cx="211691" cy="61200"/>
+          </a:xfrm>
+          <a:prstGeom prst="rect">
+            <a:avLst/>
+          </a:prstGeom>
+          <a:solidFill>
+            <a:srgbClr val="264653"/>
+          </a:solidFill>
+          <a:ln>
+            <a:noFill/>
+          </a:ln>
+        </p:spPr>
+        <p:style>
+          <a:lnRef idx="2">
+            <a:schemeClr val="accent1">
+              <a:shade val="50000"/>
+            </a:schemeClr>
+          </a:lnRef>
+          <a:fillRef idx="1">
+            <a:schemeClr val="accent1"/>
+          </a:fillRef>
+          <a:effectRef idx="0">
+            <a:schemeClr val="accent1"/>
+          </a:effectRef>
+          <a:fontRef idx="minor">
+            <a:schemeClr val="lt1"/>
+          </a:fontRef>
+        </p:style>
+        <p:txBody>
+          <a:bodyPr rtlCol="0" anchor="ctr"/>
+          <a:lstStyle/>
+          <a:p>
+            <a:pPr algn="ctr"/>
+            <a:endParaRPr lang="en-GB"/>
+          </a:p>
+        </p:txBody>
+      </p:sp>
+      <p:sp>
+        <p:nvSpPr>
+          <p:cNvPr id="176" name="Rectangle 175">
+            <a:extLst>
+              <a:ext uri="{FF2B5EF4-FFF2-40B4-BE49-F238E27FC236}">
+                <a16:creationId xmlns:a16="http://schemas.microsoft.com/office/drawing/2014/main" id="{C9AA83A0-2628-4A77-AF76-C960A886C59B}"/>
+              </a:ext>
+            </a:extLst>
+          </p:cNvPr>
+          <p:cNvSpPr/>
+          <p:nvPr/>
+        </p:nvSpPr>
+        <p:spPr>
+          <a:xfrm>
+            <a:off x="8354195" y="3831629"/>
+            <a:ext cx="213173" cy="60171"/>
+          </a:xfrm>
+          <a:prstGeom prst="rect">
+            <a:avLst/>
+          </a:prstGeom>
+          <a:solidFill>
+            <a:srgbClr val="E9C46A"/>
+          </a:solidFill>
+          <a:ln>
+            <a:noFill/>
+          </a:ln>
+        </p:spPr>
+        <p:style>
+          <a:lnRef idx="2">
+            <a:schemeClr val="accent1">
+              <a:shade val="50000"/>
+            </a:schemeClr>
+          </a:lnRef>
+          <a:fillRef idx="1">
+            <a:schemeClr val="accent1"/>
+          </a:fillRef>
+          <a:effectRef idx="0">
+            <a:schemeClr val="accent1"/>
+          </a:effectRef>
+          <a:fontRef idx="minor">
+            <a:schemeClr val="lt1"/>
+          </a:fontRef>
+        </p:style>
+        <p:txBody>
+          <a:bodyPr rtlCol="0" anchor="ctr"/>
+          <a:lstStyle/>
+          <a:p>
+            <a:pPr algn="ctr"/>
+            <a:endParaRPr lang="en-GB"/>
+          </a:p>
+        </p:txBody>
+      </p:sp>
+      <p:sp>
+        <p:nvSpPr>
+          <p:cNvPr id="177" name="Rectangle 176">
+            <a:extLst>
+              <a:ext uri="{FF2B5EF4-FFF2-40B4-BE49-F238E27FC236}">
+                <a16:creationId xmlns:a16="http://schemas.microsoft.com/office/drawing/2014/main" id="{1AA59294-83CA-424C-852A-97006F73E954}"/>
+              </a:ext>
+            </a:extLst>
+          </p:cNvPr>
+          <p:cNvSpPr/>
+          <p:nvPr/>
+        </p:nvSpPr>
+        <p:spPr>
+          <a:xfrm>
+            <a:off x="1825803" y="3817174"/>
+            <a:ext cx="4191616" cy="60171"/>
+          </a:xfrm>
+          <a:prstGeom prst="rect">
+            <a:avLst/>
+          </a:prstGeom>
+          <a:solidFill>
+            <a:srgbClr val="264653"/>
+          </a:solidFill>
+          <a:ln>
+            <a:noFill/>
+          </a:ln>
+        </p:spPr>
+        <p:style>
+          <a:lnRef idx="2">
+            <a:schemeClr val="accent1">
+              <a:shade val="50000"/>
+            </a:schemeClr>
+          </a:lnRef>
+          <a:fillRef idx="1">
+            <a:schemeClr val="accent1"/>
+          </a:fillRef>
+          <a:effectRef idx="0">
+            <a:schemeClr val="accent1"/>
+          </a:effectRef>
+          <a:fontRef idx="minor">
+            <a:schemeClr val="lt1"/>
+          </a:fontRef>
+        </p:style>
+        <p:txBody>
+          <a:bodyPr rtlCol="0" anchor="ctr"/>
+          <a:lstStyle/>
+          <a:p>
+            <a:pPr algn="ctr"/>
+            <a:endParaRPr lang="en-GB"/>
+          </a:p>
+        </p:txBody>
+      </p:sp>
+      <p:sp>
+        <p:nvSpPr>
+          <p:cNvPr id="178" name="Rectangle 177">
+            <a:extLst>
+              <a:ext uri="{FF2B5EF4-FFF2-40B4-BE49-F238E27FC236}">
+                <a16:creationId xmlns:a16="http://schemas.microsoft.com/office/drawing/2014/main" id="{C7522B5A-A353-4202-956F-D17153876134}"/>
+              </a:ext>
+            </a:extLst>
+          </p:cNvPr>
+          <p:cNvSpPr/>
+          <p:nvPr/>
+        </p:nvSpPr>
+        <p:spPr>
+          <a:xfrm>
+            <a:off x="6055245" y="3821071"/>
+            <a:ext cx="1421063" cy="60174"/>
+          </a:xfrm>
+          <a:prstGeom prst="rect">
+            <a:avLst/>
+          </a:prstGeom>
+          <a:solidFill>
+            <a:srgbClr val="2A9D8F"/>
+          </a:solidFill>
+          <a:ln>
+            <a:noFill/>
+          </a:ln>
+        </p:spPr>
+        <p:style>
+          <a:lnRef idx="2">
+            <a:schemeClr val="accent1">
+              <a:shade val="50000"/>
+            </a:schemeClr>
+          </a:lnRef>
+          <a:fillRef idx="1">
+            <a:schemeClr val="accent1"/>
+          </a:fillRef>
+          <a:effectRef idx="0">
+            <a:schemeClr val="accent1"/>
+          </a:effectRef>
+          <a:fontRef idx="minor">
+            <a:schemeClr val="lt1"/>
+          </a:fontRef>
+        </p:style>
+        <p:txBody>
+          <a:bodyPr rtlCol="0" anchor="ctr"/>
+          <a:lstStyle/>
+          <a:p>
+            <a:pPr algn="ctr"/>
+            <a:endParaRPr lang="en-GB"/>
+          </a:p>
+        </p:txBody>
+      </p:sp>
+      <p:sp>
+        <p:nvSpPr>
+          <p:cNvPr id="180" name="Rectangle 179">
+            <a:extLst>
+              <a:ext uri="{FF2B5EF4-FFF2-40B4-BE49-F238E27FC236}">
+                <a16:creationId xmlns:a16="http://schemas.microsoft.com/office/drawing/2014/main" id="{012EE6FD-6483-4C0B-BE98-FB567CD35684}"/>
+              </a:ext>
+            </a:extLst>
+          </p:cNvPr>
+          <p:cNvSpPr/>
+          <p:nvPr/>
+        </p:nvSpPr>
+        <p:spPr>
+          <a:xfrm>
+            <a:off x="1825803" y="3913154"/>
+            <a:ext cx="4191616" cy="60171"/>
+          </a:xfrm>
+          <a:prstGeom prst="rect">
+            <a:avLst/>
+          </a:prstGeom>
+          <a:solidFill>
+            <a:srgbClr val="264653"/>
+          </a:solidFill>
+          <a:ln>
+            <a:noFill/>
+          </a:ln>
+        </p:spPr>
+        <p:style>
+          <a:lnRef idx="2">
+            <a:schemeClr val="accent1">
+              <a:shade val="50000"/>
+            </a:schemeClr>
+          </a:lnRef>
+          <a:fillRef idx="1">
+            <a:schemeClr val="accent1"/>
+          </a:fillRef>
+          <a:effectRef idx="0">
+            <a:schemeClr val="accent1"/>
+          </a:effectRef>
+          <a:fontRef idx="minor">
+            <a:schemeClr val="lt1"/>
+          </a:fontRef>
+        </p:style>
+        <p:txBody>
+          <a:bodyPr rtlCol="0" anchor="ctr"/>
+          <a:lstStyle/>
+          <a:p>
+            <a:pPr algn="ctr"/>
+            <a:endParaRPr lang="en-GB"/>
+          </a:p>
+        </p:txBody>
+      </p:sp>
+      <p:sp>
+        <p:nvSpPr>
+          <p:cNvPr id="181" name="Rectangle 180">
+            <a:extLst>
+              <a:ext uri="{FF2B5EF4-FFF2-40B4-BE49-F238E27FC236}">
+                <a16:creationId xmlns:a16="http://schemas.microsoft.com/office/drawing/2014/main" id="{060DE032-9D86-4DCF-90F5-389B5D39472C}"/>
+              </a:ext>
+            </a:extLst>
+          </p:cNvPr>
+          <p:cNvSpPr/>
+          <p:nvPr/>
+        </p:nvSpPr>
+        <p:spPr>
+          <a:xfrm>
+            <a:off x="6055245" y="3911822"/>
+            <a:ext cx="1421063" cy="60174"/>
+          </a:xfrm>
+          <a:prstGeom prst="rect">
+            <a:avLst/>
+          </a:prstGeom>
+          <a:solidFill>
+            <a:srgbClr val="2A9D8F"/>
+          </a:solidFill>
+          <a:ln>
+            <a:noFill/>
+          </a:ln>
+        </p:spPr>
+        <p:style>
+          <a:lnRef idx="2">
+            <a:schemeClr val="accent1">
+              <a:shade val="50000"/>
+            </a:schemeClr>
+          </a:lnRef>
+          <a:fillRef idx="1">
+            <a:schemeClr val="accent1"/>
+          </a:fillRef>
+          <a:effectRef idx="0">
+            <a:schemeClr val="accent1"/>
+          </a:effectRef>
+          <a:fontRef idx="minor">
+            <a:schemeClr val="lt1"/>
+          </a:fontRef>
+        </p:style>
+        <p:txBody>
+          <a:bodyPr rtlCol="0" anchor="ctr"/>
+          <a:lstStyle/>
+          <a:p>
+            <a:pPr algn="ctr"/>
+            <a:endParaRPr lang="en-GB"/>
+          </a:p>
+        </p:txBody>
+      </p:sp>
+      <p:sp>
+        <p:nvSpPr>
+          <p:cNvPr id="184" name="TextBox 183">
+            <a:extLst>
+              <a:ext uri="{FF2B5EF4-FFF2-40B4-BE49-F238E27FC236}">
+                <a16:creationId xmlns:a16="http://schemas.microsoft.com/office/drawing/2014/main" id="{E9C0F9AC-43B9-441C-8225-585D073AA650}"/>
+              </a:ext>
+            </a:extLst>
+          </p:cNvPr>
+          <p:cNvSpPr txBox="1"/>
+          <p:nvPr/>
+        </p:nvSpPr>
+        <p:spPr>
+          <a:xfrm>
+            <a:off x="5425603" y="4152875"/>
+            <a:ext cx="2032453" cy="338554"/>
+          </a:xfrm>
+          <a:prstGeom prst="rect">
+            <a:avLst/>
+          </a:prstGeom>
+          <a:noFill/>
+          <a:ln>
+            <a:noFill/>
+          </a:ln>
+        </p:spPr>
+        <p:txBody>
+          <a:bodyPr wrap="square" rtlCol="0">
+            <a:spAutoFit/>
+          </a:bodyPr>
+          <a:lstStyle/>
+          <a:p>
+            <a:r>
+              <a:rPr lang="nl-NL" sz="1600" b="1" dirty="0">
+                <a:solidFill>
+                  <a:srgbClr val="E76F51"/>
+                </a:solidFill>
+              </a:rPr>
+              <a:t>Silding Time Window</a:t>
+            </a:r>
+            <a:endParaRPr lang="en-GB" b="1" dirty="0">
+              <a:solidFill>
+                <a:srgbClr val="E76F51"/>
+              </a:solidFill>
+            </a:endParaRPr>
+          </a:p>
+        </p:txBody>
+      </p:sp>
+      <p:sp>
+        <p:nvSpPr>
+          <p:cNvPr id="185" name="Rectangle 184">
+            <a:extLst>
+              <a:ext uri="{FF2B5EF4-FFF2-40B4-BE49-F238E27FC236}">
+                <a16:creationId xmlns:a16="http://schemas.microsoft.com/office/drawing/2014/main" id="{7A1DF200-F5F7-42F8-8837-BFC27A9C1D0D}"/>
+              </a:ext>
+            </a:extLst>
+          </p:cNvPr>
+          <p:cNvSpPr/>
+          <p:nvPr/>
+        </p:nvSpPr>
+        <p:spPr>
+          <a:xfrm>
+            <a:off x="1830152" y="4687520"/>
+            <a:ext cx="224483" cy="162633"/>
+          </a:xfrm>
+          <a:prstGeom prst="rect">
+            <a:avLst/>
+          </a:prstGeom>
+          <a:solidFill>
+            <a:srgbClr val="264653"/>
+          </a:solidFill>
+          <a:ln>
+            <a:noFill/>
+          </a:ln>
+        </p:spPr>
+        <p:style>
+          <a:lnRef idx="2">
+            <a:schemeClr val="accent1">
+              <a:shade val="50000"/>
+            </a:schemeClr>
+          </a:lnRef>
+          <a:fillRef idx="1">
+            <a:schemeClr val="accent1"/>
+          </a:fillRef>
+          <a:effectRef idx="0">
+            <a:schemeClr val="accent1"/>
+          </a:effectRef>
+          <a:fontRef idx="minor">
+            <a:schemeClr val="lt1"/>
+          </a:fontRef>
+        </p:style>
+        <p:txBody>
+          <a:bodyPr rtlCol="0" anchor="ctr"/>
+          <a:lstStyle/>
+          <a:p>
+            <a:pPr algn="ctr"/>
+            <a:endParaRPr lang="en-GB"/>
+          </a:p>
+        </p:txBody>
+      </p:sp>
+      <p:sp>
+        <p:nvSpPr>
+          <p:cNvPr id="186" name="TextBox 185">
+            <a:extLst>
+              <a:ext uri="{FF2B5EF4-FFF2-40B4-BE49-F238E27FC236}">
+                <a16:creationId xmlns:a16="http://schemas.microsoft.com/office/drawing/2014/main" id="{EB98FB6C-3EFB-46B5-99A6-0619C3A73119}"/>
+              </a:ext>
+            </a:extLst>
+          </p:cNvPr>
+          <p:cNvSpPr txBox="1"/>
+          <p:nvPr/>
+        </p:nvSpPr>
+        <p:spPr>
+          <a:xfrm>
+            <a:off x="2061034" y="4618199"/>
+            <a:ext cx="2677169" cy="307777"/>
+          </a:xfrm>
+          <a:prstGeom prst="rect">
+            <a:avLst/>
+          </a:prstGeom>
+          <a:noFill/>
+          <a:ln>
+            <a:noFill/>
+          </a:ln>
+        </p:spPr>
+        <p:txBody>
+          <a:bodyPr wrap="square" rtlCol="0">
+            <a:spAutoFit/>
+          </a:bodyPr>
+          <a:lstStyle/>
+          <a:p>
+            <a:r>
+              <a:rPr lang="nl-NL" sz="1400" dirty="0"/>
+              <a:t>Not considered observed values</a:t>
+            </a:r>
+          </a:p>
+        </p:txBody>
+      </p:sp>
+    </p:spTree>
+    <p:extLst>
+      <p:ext uri="{BB962C8B-B14F-4D97-AF65-F5344CB8AC3E}">
+        <p14:creationId xmlns:p14="http://schemas.microsoft.com/office/powerpoint/2010/main" val="3894696619"/>
+      </p:ext>
+    </p:extLst>
+  </p:cSld>
+  <p:clrMapOvr>
+    <a:masterClrMapping/>
+  </p:clrMapOvr>
+</p:sld>
+</file>
+
+<file path=ppt/slides/slide4.xml><?xml version="1.0" encoding="utf-8"?>
 <p:sld xmlns:a="http://schemas.openxmlformats.org/drawingml/2006/main" xmlns:r="http://schemas.openxmlformats.org/officeDocument/2006/relationships" xmlns:p="http://schemas.openxmlformats.org/presentationml/2006/main">
   <p:cSld>
     <p:bg>

</xml_diff>